<commit_message>
autodetect slide content overflow
</commit_message>
<xml_diff>
--- a/html-to-ppt/TextFormat.pptx
+++ b/html-to-ppt/TextFormat.pptx
@@ -6,6 +6,8 @@
   </p:sldMasterIdLst>
   <p:sldIdLst>
     <p:sldId id="256" r:id="rId6"/>
+    <p:sldId id="257" r:id="rId7"/>
+    <p:sldId id="258" r:id="rId8"/>
   </p:sldIdLst>
   <p:sldSz cx="9144000" cy="6858000" type="screen4x3"/>
   <p:notesSz cx="6858000" cy="9144000"/>
@@ -3101,43 +3103,80 @@
               <a:buNone/>
             </a:pPr>
             <a:r>
-              <a:rPr lang="en-US"/>
+              <a:rPr lang="en-US" sz="1400">
+                <a:latin typeface="Calibri"/>
+              </a:rPr>
+              <a:t>Hello mate! Hello mate! Hello mate! Hello mate! Hello mate! Hello mate! Hello mate! Hello mate! Hello mate!</a:t>
+            </a:r>
+            <a:r>
+              <a:rPr lang="en-US" sz="1400">
+                <a:latin typeface="Calibri"/>
+              </a:rPr>
+              <a:t> </a:t>
+            </a:r>
+          </a:p>
+          <a:p>
+            <a:pPr>
+              <a:buNone/>
+            </a:pPr>
+            <a:r>
+              <a:rPr lang="en-US" sz="1400">
+                <a:latin typeface="Calibri"/>
+              </a:rPr>
               <a:t>This is </a:t>
             </a:r>
             <a:r>
-              <a:rPr lang="en-US" b="true"/>
+              <a:rPr lang="en-US" sz="1400" b="true">
+                <a:latin typeface="Calibri"/>
+              </a:rPr>
               <a:t>bold</a:t>
             </a:r>
             <a:r>
-              <a:rPr lang="en-US"/>
+              <a:rPr lang="en-US" sz="1400">
+                <a:latin typeface="Calibri"/>
+              </a:rPr>
               <a:t> and</a:t>
             </a:r>
             <a:r>
-              <a:rPr lang="en-US" u="sng"/>
+              <a:rPr lang="en-US" sz="1400" u="sng">
+                <a:latin typeface="Calibri"/>
+              </a:rPr>
               <a:t> underscore</a:t>
             </a:r>
             <a:r>
-              <a:rPr lang="en-US"/>
+              <a:rPr lang="en-US" sz="1400">
+                <a:latin typeface="Calibri"/>
+              </a:rPr>
               <a:t> and</a:t>
             </a:r>
             <a:r>
-              <a:rPr lang="en-US" u="sng"/>
+              <a:rPr lang="en-US" sz="1400" u="sng">
+                <a:latin typeface="Calibri"/>
+              </a:rPr>
               <a:t> both</a:t>
             </a:r>
             <a:r>
-              <a:rPr lang="en-US"/>
+              <a:rPr lang="en-US" sz="1400">
+                <a:latin typeface="Calibri"/>
+              </a:rPr>
               <a:t> and </a:t>
             </a:r>
             <a:r>
-              <a:rPr lang="en-US" strike="sngStrike"/>
+              <a:rPr lang="en-US" sz="1400" strike="sngStrike">
+                <a:latin typeface="Calibri"/>
+              </a:rPr>
               <a:t>not true</a:t>
             </a:r>
             <a:r>
-              <a:rPr lang="en-US"/>
-              <a:t> false</a:t>
-            </a:r>
-            <a:r>
-              <a:rPr lang="en-US"/>
+              <a:rPr lang="en-US" sz="1400">
+                <a:latin typeface="Calibri"/>
+              </a:rPr>
+              <a:t> false PowerPoint documents are made up of a tree of records. A record may contain either other records (in which case it is a Container), or data (in which case it's an Atom). A record can't hold both. PowerPoint documents don't have one overall container record. Instead, there are a number of different container records to be found at the top level. Any numbers or strings stored in the records are always stored in Little Endian format (least important bytes first). This is the case no matter what platform the file was written on - be that a Little Endian or a Big Endian system. PowerPoint may have Escher (DDF) records embedded in it. These are always held as the children of a PPDrawing record (record type 1036). Escher records have the same format as PowerPoint records. </a:t>
+            </a:r>
+            <a:r>
+              <a:rPr lang="en-US" sz="1400">
+                <a:latin typeface="Calibri"/>
+              </a:rPr>
               <a:t> </a:t>
             </a:r>
           </a:p>
@@ -3146,15 +3185,21 @@
               <a:buNone/>
             </a:pPr>
             <a:r>
-              <a:rPr lang="en-US"/>
+              <a:rPr lang="en-US" sz="1400">
+                <a:latin typeface="Calibri"/>
+              </a:rPr>
               <a:t> </a:t>
             </a:r>
             <a:r>
-              <a:rPr lang="en-US"/>
+              <a:rPr lang="en-US" sz="1400">
+                <a:latin typeface="Calibri"/>
+              </a:rPr>
               <a:t> </a:t>
             </a:r>
             <a:r>
-              <a:rPr lang="en-US"/>
+              <a:rPr lang="en-US" sz="1400">
+                <a:latin typeface="Calibri"/>
+              </a:rPr>
               <a:t> </a:t>
             </a:r>
           </a:p>
@@ -3163,11 +3208,15 @@
               <a:buNone/>
             </a:pPr>
             <a:r>
-              <a:rPr lang="en-US"/>
+              <a:rPr lang="en-US" sz="1400">
+                <a:latin typeface="Calibri"/>
+              </a:rPr>
               <a:t>Testing list</a:t>
             </a:r>
             <a:r>
-              <a:rPr lang="en-US"/>
+              <a:rPr lang="en-US" sz="1400">
+                <a:latin typeface="Calibri"/>
+              </a:rPr>
               <a:t> </a:t>
             </a:r>
           </a:p>
@@ -3176,162 +3225,619 @@
               <a:buNone/>
             </a:pPr>
             <a:r>
-              <a:rPr lang="en-US"/>
+              <a:rPr lang="en-US" sz="1400">
+                <a:latin typeface="Calibri"/>
+              </a:rPr>
               <a:t> </a:t>
             </a:r>
             <a:r>
-              <a:rPr lang="en-US"/>
+              <a:rPr lang="en-US" sz="1400">
+                <a:latin typeface="Calibri"/>
+              </a:rPr>
               <a:t> </a:t>
             </a:r>
             <a:r>
-              <a:rPr lang="en-US"/>
+              <a:rPr lang="en-US" sz="1400">
+                <a:latin typeface="Calibri"/>
+              </a:rPr>
               <a:t> </a:t>
             </a:r>
             <a:r>
-              <a:rPr lang="en-US"/>
+              <a:rPr lang="en-US" sz="1400">
+                <a:latin typeface="Calibri"/>
+              </a:rPr>
               <a:t> </a:t>
             </a:r>
           </a:p>
           <a:p>
-            <a:r>
-              <a:rPr lang="en-US"/>
+            <a:pPr>
+              <a:buAutoNum type="arabicPlain" startAt="1"/>
+            </a:pPr>
+            <a:r>
+              <a:rPr lang="en-US" sz="1400">
+                <a:latin typeface="Calibri"/>
+              </a:rPr>
               <a:t>q</a:t>
             </a:r>
             <a:r>
-              <a:rPr lang="en-US"/>
+              <a:rPr lang="en-US" sz="1400">
+                <a:latin typeface="Calibri"/>
+              </a:rPr>
               <a:t> </a:t>
             </a:r>
           </a:p>
           <a:p>
-            <a:r>
-              <a:rPr lang="en-US"/>
+            <a:pPr>
+              <a:buAutoNum type="arabicPlain" startAt="1"/>
+            </a:pPr>
+            <a:r>
+              <a:rPr lang="en-US" sz="1400">
+                <a:latin typeface="Calibri"/>
+              </a:rPr>
               <a:t>w</a:t>
             </a:r>
             <a:r>
-              <a:rPr lang="en-US"/>
+              <a:rPr lang="en-US" sz="1400">
+                <a:latin typeface="Calibri"/>
+              </a:rPr>
               <a:t> </a:t>
             </a:r>
           </a:p>
           <a:p>
-            <a:r>
-              <a:rPr lang="en-US"/>
+            <a:pPr>
+              <a:buAutoNum type="arabicPlain" startAt="1"/>
+            </a:pPr>
+            <a:r>
+              <a:rPr lang="en-US" sz="1400">
+                <a:latin typeface="Calibri"/>
+              </a:rPr>
               <a:t>e</a:t>
             </a:r>
             <a:r>
-              <a:rPr lang="en-US"/>
+              <a:rPr lang="en-US" sz="1400">
+                <a:latin typeface="Calibri"/>
+              </a:rPr>
               <a:t> </a:t>
             </a:r>
           </a:p>
           <a:p>
-            <a:r>
-              <a:rPr lang="en-US"/>
+            <a:pPr>
+              <a:buAutoNum type="arabicPlain" startAt="1"/>
+            </a:pPr>
+            <a:r>
+              <a:rPr lang="en-US" sz="1400">
+                <a:latin typeface="Calibri"/>
+              </a:rPr>
               <a:t>r</a:t>
             </a:r>
             <a:r>
-              <a:rPr lang="en-US"/>
+              <a:rPr lang="en-US" sz="1400">
+                <a:latin typeface="Calibri"/>
+              </a:rPr>
               <a:t> </a:t>
             </a:r>
           </a:p>
           <a:p>
-            <a:r>
-              <a:rPr lang="en-US"/>
+            <a:pPr>
+              <a:buAutoNum type="arabicPlain" startAt="1"/>
+            </a:pPr>
+            <a:r>
+              <a:rPr lang="en-US" sz="1400">
+                <a:latin typeface="Calibri"/>
+              </a:rPr>
               <a:t>a</a:t>
             </a:r>
             <a:r>
-              <a:rPr lang="en-US"/>
+              <a:rPr lang="en-US" sz="1400">
+                <a:latin typeface="Calibri"/>
+              </a:rPr>
               <a:t> </a:t>
             </a:r>
           </a:p>
           <a:p>
-            <a:r>
-              <a:rPr lang="en-US"/>
+            <a:pPr>
+              <a:buAutoNum type="arabicPlain" startAt="1"/>
+            </a:pPr>
+            <a:r>
+              <a:rPr lang="en-US" sz="1400">
+                <a:latin typeface="Calibri"/>
+              </a:rPr>
               <a:t>s</a:t>
             </a:r>
             <a:r>
-              <a:rPr lang="en-US"/>
+              <a:rPr lang="en-US" sz="1400">
+                <a:latin typeface="Calibri"/>
+              </a:rPr>
               <a:t> </a:t>
             </a:r>
           </a:p>
-          <a:p>
-            <a:r>
-              <a:rPr lang="en-US"/>
+        </p:txBody>
+      </p:sp>
+    </p:spTree>
+  </p:cSld>
+  <p:clrMapOvr>
+    <a:masterClrMapping/>
+  </p:clrMapOvr>
+</p:sld>
+</file>
+
+<file path=ppt/slides/slide2.xml><?xml version="1.0" encoding="utf-8"?>
+<p:sld xmlns:p="http://schemas.openxmlformats.org/presentationml/2006/main" xmlns:a="http://schemas.openxmlformats.org/drawingml/2006/main">
+  <p:cSld>
+    <p:spTree>
+      <p:nvGrpSpPr>
+        <p:cNvPr id="1" name=""/>
+        <p:cNvGrpSpPr/>
+        <p:nvPr/>
+      </p:nvGrpSpPr>
+      <p:grpSpPr>
+        <a:xfrm>
+          <a:off x="0" y="0"/>
+          <a:ext cx="0" cy="0"/>
+          <a:chOff x="0" y="0"/>
+          <a:chExt cx="0" cy="0"/>
+        </a:xfrm>
+      </p:grpSpPr>
+      <p:sp xmlns:r="http://schemas.openxmlformats.org/officeDocument/2006/relationships">
+        <p:nvSpPr>
+          <p:cNvPr id="2" name="Title 1"/>
+          <p:cNvSpPr>
+            <a:spLocks noGrp="1"/>
+          </p:cNvSpPr>
+          <p:nvPr>
+            <p:ph type="title"/>
+          </p:nvPr>
+        </p:nvSpPr>
+        <p:spPr/>
+        <p:txBody>
+          <a:bodyPr/>
+          <a:lstStyle/>
+          <a:p>
+            <a:r>
+              <a:rPr lang="en-US" smtClean="0"/>
+              <a:t>Click to edit Master title style</a:t>
+            </a:r>
+            <a:endParaRPr lang="en-US"/>
+          </a:p>
+        </p:txBody>
+      </p:sp>
+      <p:sp xmlns:r="http://schemas.openxmlformats.org/officeDocument/2006/relationships">
+        <p:nvSpPr>
+          <p:cNvPr id="3" name="Content Placeholder 2"/>
+          <p:cNvSpPr>
+            <a:spLocks noGrp="1"/>
+          </p:cNvSpPr>
+          <p:nvPr>
+            <p:ph idx="1"/>
+          </p:nvPr>
+        </p:nvSpPr>
+        <p:spPr/>
+        <p:txBody>
+          <a:bodyPr/>
+          <a:lstStyle/>
+          <a:p>
+            <a:pPr>
+              <a:buAutoNum type="arabicPlain" startAt="1"/>
+            </a:pPr>
+            <a:r>
+              <a:rPr lang="en-US" sz="1400">
+                <a:latin typeface="Calibri"/>
+              </a:rPr>
               <a:t>d</a:t>
             </a:r>
             <a:r>
-              <a:rPr lang="en-US"/>
+              <a:rPr lang="en-US" sz="1400">
+                <a:latin typeface="Calibri"/>
+              </a:rPr>
               <a:t> </a:t>
             </a:r>
           </a:p>
           <a:p>
-            <a:r>
-              <a:rPr lang="en-US"/>
+            <a:pPr>
+              <a:buAutoNum type="arabicPlain" startAt="1"/>
+            </a:pPr>
+            <a:r>
+              <a:rPr lang="en-US" sz="1400">
+                <a:latin typeface="Calibri"/>
+              </a:rPr>
               <a:t>f</a:t>
             </a:r>
             <a:r>
-              <a:rPr lang="en-US"/>
+              <a:rPr lang="en-US" sz="1400">
+                <a:latin typeface="Calibri"/>
+              </a:rPr>
               <a:t> </a:t>
             </a:r>
           </a:p>
           <a:p>
-            <a:r>
-              <a:rPr lang="en-US"/>
+            <a:pPr>
+              <a:buAutoNum type="arabicPlain" startAt="1"/>
+            </a:pPr>
+            <a:r>
+              <a:rPr lang="en-US" sz="1400">
+                <a:latin typeface="Calibri"/>
+              </a:rPr>
               <a:t>sss</a:t>
             </a:r>
             <a:r>
-              <a:rPr lang="en-US"/>
+              <a:rPr lang="en-US" sz="1400">
+                <a:latin typeface="Calibri"/>
+              </a:rPr>
               <a:t> </a:t>
             </a:r>
             <a:r>
-              <a:rPr lang="en-US"/>
+              <a:rPr lang="en-US" sz="1400">
+                <a:latin typeface="Calibri"/>
+              </a:rPr>
               <a:t> </a:t>
             </a:r>
+            <a:r>
+              <a:rPr lang="en-US" sz="1400">
+                <a:latin typeface="Calibri"/>
+              </a:rPr>
+              <a:t> </a:t>
+            </a:r>
+          </a:p>
+          <a:p>
+            <a:r>
+              <a:rPr lang="en-US" sz="1400">
+                <a:latin typeface="Calibri"/>
+              </a:rPr>
+              <a:t>q</a:t>
+            </a:r>
+            <a:r>
+              <a:rPr lang="en-US" sz="1400">
+                <a:latin typeface="Calibri"/>
+              </a:rPr>
+              <a:t> </a:t>
+            </a:r>
+          </a:p>
+          <a:p>
+            <a:r>
+              <a:rPr lang="en-US" sz="1400">
+                <a:latin typeface="Calibri"/>
+              </a:rPr>
+              <a:t>sss</a:t>
+            </a:r>
+            <a:r>
+              <a:rPr lang="en-US" sz="1400">
+                <a:latin typeface="Calibri"/>
+              </a:rPr>
+              <a:t> </a:t>
+            </a:r>
+            <a:r>
+              <a:rPr lang="en-US" sz="1400">
+                <a:latin typeface="Calibri"/>
+              </a:rPr>
+              <a:t> </a:t>
+            </a:r>
+            <a:r>
+              <a:rPr lang="en-US" sz="1400">
+                <a:latin typeface="Calibri"/>
+              </a:rPr>
+              <a:t> </a:t>
+            </a:r>
           </a:p>
           <a:p>
             <a:pPr>
-              <a:buNone/>
+              <a:buAutoNum type="arabicPlain" startAt="1"/>
             </a:pPr>
             <a:r>
-              <a:rPr lang="en-US"/>
+              <a:rPr lang="en-US" sz="1400">
+                <a:latin typeface="Calibri"/>
+              </a:rPr>
+              <a:t>q</a:t>
+            </a:r>
+            <a:r>
+              <a:rPr lang="en-US" sz="1400">
+                <a:latin typeface="Calibri"/>
+              </a:rPr>
+              <a:t> </a:t>
+            </a:r>
+          </a:p>
+          <a:p>
+            <a:pPr>
+              <a:buAutoNum type="arabicPlain" startAt="1"/>
+            </a:pPr>
+            <a:r>
+              <a:rPr lang="en-US" sz="1400">
+                <a:latin typeface="Calibri"/>
+              </a:rPr>
+              <a:t>w</a:t>
+            </a:r>
+            <a:r>
+              <a:rPr lang="en-US" sz="1400">
+                <a:latin typeface="Calibri"/>
+              </a:rPr>
+              <a:t> </a:t>
+            </a:r>
+          </a:p>
+          <a:p>
+            <a:pPr>
+              <a:buAutoNum type="arabicPlain" startAt="1"/>
+            </a:pPr>
+            <a:r>
+              <a:rPr lang="en-US" sz="1400">
+                <a:latin typeface="Calibri"/>
+              </a:rPr>
+              <a:t>e</a:t>
+            </a:r>
+            <a:r>
+              <a:rPr lang="en-US" sz="1400">
+                <a:latin typeface="Calibri"/>
+              </a:rPr>
+              <a:t> </a:t>
+            </a:r>
+          </a:p>
+          <a:p>
+            <a:pPr>
+              <a:buAutoNum type="arabicPlain" startAt="1"/>
+            </a:pPr>
+            <a:r>
+              <a:rPr lang="en-US" sz="1400">
+                <a:latin typeface="Calibri"/>
+              </a:rPr>
+              <a:t>r</a:t>
+            </a:r>
+            <a:r>
+              <a:rPr lang="en-US" sz="1400">
+                <a:latin typeface="Calibri"/>
+              </a:rPr>
+              <a:t> </a:t>
+            </a:r>
+          </a:p>
+          <a:p>
+            <a:pPr>
+              <a:buAutoNum type="arabicPlain" startAt="1"/>
+            </a:pPr>
+            <a:r>
+              <a:rPr lang="en-US" sz="1400">
+                <a:latin typeface="Calibri"/>
+              </a:rPr>
+              <a:t>a</a:t>
+            </a:r>
+            <a:r>
+              <a:rPr lang="en-US" sz="1400">
+                <a:latin typeface="Calibri"/>
+              </a:rPr>
+              <a:t> </a:t>
+            </a:r>
+          </a:p>
+          <a:p>
+            <a:pPr>
+              <a:buAutoNum type="arabicPlain" startAt="1"/>
+            </a:pPr>
+            <a:r>
+              <a:rPr lang="en-US" sz="1400">
+                <a:latin typeface="Calibri"/>
+              </a:rPr>
+              <a:t>s</a:t>
+            </a:r>
+            <a:r>
+              <a:rPr lang="en-US" sz="1400">
+                <a:latin typeface="Calibri"/>
+              </a:rPr>
+              <a:t> </a:t>
+            </a:r>
+          </a:p>
+          <a:p>
+            <a:pPr>
+              <a:buAutoNum type="arabicPlain" startAt="1"/>
+            </a:pPr>
+            <a:r>
+              <a:rPr lang="en-US" sz="1400">
+                <a:latin typeface="Calibri"/>
+              </a:rPr>
+              <a:t>d</a:t>
+            </a:r>
+            <a:r>
+              <a:rPr lang="en-US" sz="1400">
+                <a:latin typeface="Calibri"/>
+              </a:rPr>
+              <a:t> </a:t>
+            </a:r>
+          </a:p>
+          <a:p>
+            <a:pPr>
+              <a:buAutoNum type="arabicPlain" startAt="1"/>
+            </a:pPr>
+            <a:r>
+              <a:rPr lang="en-US" sz="1400">
+                <a:latin typeface="Calibri"/>
+              </a:rPr>
+              <a:t>f</a:t>
+            </a:r>
+            <a:r>
+              <a:rPr lang="en-US" sz="1400">
+                <a:latin typeface="Calibri"/>
+              </a:rPr>
+              <a:t> </a:t>
+            </a:r>
+          </a:p>
+          <a:p>
+            <a:pPr>
+              <a:buAutoNum type="arabicPlain" startAt="1"/>
+            </a:pPr>
+            <a:r>
+              <a:rPr lang="en-US" sz="1400">
+                <a:latin typeface="Calibri"/>
+              </a:rPr>
+              <a:t>sss</a:t>
+            </a:r>
+            <a:r>
+              <a:rPr lang="en-US" sz="1400">
+                <a:latin typeface="Calibri"/>
+              </a:rPr>
+              <a:t> </a:t>
+            </a:r>
+            <a:r>
+              <a:rPr lang="en-US" sz="1400">
+                <a:latin typeface="Calibri"/>
+              </a:rPr>
+              <a:t> </a:t>
+            </a:r>
+            <a:r>
+              <a:rPr lang="en-US" sz="1400">
+                <a:latin typeface="Calibri"/>
+              </a:rPr>
+              <a:t> </a:t>
+            </a:r>
+          </a:p>
+          <a:p>
+            <a:r>
+              <a:rPr lang="en-US" sz="1400">
+                <a:latin typeface="Calibri"/>
+              </a:rPr>
+              <a:t>q</a:t>
+            </a:r>
+            <a:r>
+              <a:rPr lang="en-US" sz="1400">
+                <a:latin typeface="Calibri"/>
+              </a:rPr>
+              <a:t> </a:t>
+            </a:r>
+          </a:p>
+          <a:p>
+            <a:r>
+              <a:rPr lang="en-US" sz="1400">
+                <a:latin typeface="Calibri"/>
+              </a:rPr>
+              <a:t>sss</a:t>
+            </a:r>
+            <a:r>
+              <a:rPr lang="en-US" sz="1400">
+                <a:latin typeface="Calibri"/>
+              </a:rPr>
+              <a:t> </a:t>
+            </a:r>
+            <a:r>
+              <a:rPr lang="en-US" sz="1400">
+                <a:latin typeface="Calibri"/>
+              </a:rPr>
+              <a:t> </a:t>
+            </a:r>
+          </a:p>
+          <a:p>
+            <a:pPr>
+              <a:buNone/>
+            </a:pPr>
+            <a:r>
+              <a:rPr lang="en-US" sz="1400">
+                <a:latin typeface="Calibri"/>
+              </a:rPr>
               <a:t>Centered text</a:t>
             </a:r>
           </a:p>
+        </p:txBody>
+      </p:sp>
+    </p:spTree>
+  </p:cSld>
+  <p:clrMapOvr>
+    <a:masterClrMapping/>
+  </p:clrMapOvr>
+</p:sld>
+</file>
+
+<file path=ppt/slides/slide3.xml><?xml version="1.0" encoding="utf-8"?>
+<p:sld xmlns:p="http://schemas.openxmlformats.org/presentationml/2006/main" xmlns:a="http://schemas.openxmlformats.org/drawingml/2006/main">
+  <p:cSld>
+    <p:spTree>
+      <p:nvGrpSpPr>
+        <p:cNvPr id="1" name=""/>
+        <p:cNvGrpSpPr/>
+        <p:nvPr/>
+      </p:nvGrpSpPr>
+      <p:grpSpPr>
+        <a:xfrm>
+          <a:off x="0" y="0"/>
+          <a:ext cx="0" cy="0"/>
+          <a:chOff x="0" y="0"/>
+          <a:chExt cx="0" cy="0"/>
+        </a:xfrm>
+      </p:grpSpPr>
+      <p:sp xmlns:r="http://schemas.openxmlformats.org/officeDocument/2006/relationships">
+        <p:nvSpPr>
+          <p:cNvPr id="2" name="Title 1"/>
+          <p:cNvSpPr>
+            <a:spLocks noGrp="1"/>
+          </p:cNvSpPr>
+          <p:nvPr>
+            <p:ph type="title"/>
+          </p:nvPr>
+        </p:nvSpPr>
+        <p:spPr/>
+        <p:txBody>
+          <a:bodyPr/>
+          <a:lstStyle/>
+          <a:p>
+            <a:r>
+              <a:rPr lang="en-US" smtClean="0"/>
+              <a:t>Click to edit Master title style</a:t>
+            </a:r>
+            <a:endParaRPr lang="en-US"/>
+          </a:p>
+        </p:txBody>
+      </p:sp>
+      <p:sp xmlns:r="http://schemas.openxmlformats.org/officeDocument/2006/relationships">
+        <p:nvSpPr>
+          <p:cNvPr id="3" name="Content Placeholder 2"/>
+          <p:cNvSpPr>
+            <a:spLocks noGrp="1"/>
+          </p:cNvSpPr>
+          <p:nvPr>
+            <p:ph idx="1"/>
+          </p:nvPr>
+        </p:nvSpPr>
+        <p:spPr/>
+        <p:txBody>
+          <a:bodyPr/>
+          <a:lstStyle/>
           <a:p>
             <a:pPr>
               <a:buNone/>
             </a:pPr>
             <a:r>
-              <a:rPr lang="en-US"/>
+              <a:rPr lang="en-US" sz="1400">
+                <a:latin typeface="Calibri"/>
+              </a:rPr>
               <a:t>Color </a:t>
             </a:r>
             <a:r>
-              <a:rPr lang="en-US">
+              <a:rPr lang="en-US" sz="1400">
                 <a:solidFill>
                   <a:srgbClr val="E60000"/>
                 </a:solidFill>
+                <a:latin typeface="Calibri"/>
               </a:rPr>
               <a:t>red</a:t>
             </a:r>
             <a:r>
-              <a:rPr lang="en-US"/>
+              <a:rPr lang="en-US" sz="1400">
+                <a:latin typeface="Calibri"/>
+              </a:rPr>
               <a:t>,</a:t>
             </a:r>
             <a:r>
-              <a:rPr lang="en-US">
+              <a:rPr lang="en-US" sz="1400">
                 <a:solidFill>
                   <a:srgbClr val="0066CC"/>
                 </a:solidFill>
+                <a:latin typeface="Calibri"/>
               </a:rPr>
               <a:t> blue</a:t>
             </a:r>
             <a:r>
-              <a:rPr lang="en-US"/>
+              <a:rPr lang="en-US" sz="1400">
+                <a:latin typeface="Calibri"/>
+              </a:rPr>
               <a:t>, </a:t>
             </a:r>
             <a:r>
-              <a:rPr lang="en-US">
+              <a:rPr lang="en-US" sz="1400">
                 <a:solidFill>
                   <a:srgbClr val="EBD6FF"/>
                 </a:solidFill>
+                <a:latin typeface="Calibri"/>
               </a:rPr>
               <a:t>strange</a:t>
             </a:r>
@@ -3341,15 +3847,21 @@
               <a:buNone/>
             </a:pPr>
             <a:r>
-              <a:rPr lang="en-US"/>
+              <a:rPr lang="en-US" sz="1400">
+                <a:latin typeface="Calibri"/>
+              </a:rPr>
               <a:t> </a:t>
             </a:r>
             <a:r>
-              <a:rPr lang="en-US"/>
+              <a:rPr lang="en-US" sz="1400">
+                <a:latin typeface="Calibri"/>
+              </a:rPr>
               <a:t>And highlight</a:t>
             </a:r>
             <a:r>
-              <a:rPr lang="en-US"/>
+              <a:rPr lang="en-US" sz="1400">
+                <a:latin typeface="Calibri"/>
+              </a:rPr>
               <a:t> </a:t>
             </a:r>
           </a:p>

</xml_diff>

<commit_message>
refactor + checkpoint before changes
</commit_message>
<xml_diff>
--- a/html-to-ppt/TextFormat.pptx
+++ b/html-to-ppt/TextFormat.pptx
@@ -8,6 +8,10 @@
     <p:sldId id="256" r:id="rId6"/>
     <p:sldId id="257" r:id="rId7"/>
     <p:sldId id="258" r:id="rId8"/>
+    <p:sldId id="259" r:id="rId9"/>
+    <p:sldId id="260" r:id="rId10"/>
+    <p:sldId id="261" r:id="rId11"/>
+    <p:sldId id="262" r:id="rId12"/>
   </p:sldIdLst>
   <p:sldSz cx="9144000" cy="6858000" type="screen4x3"/>
   <p:notesSz cx="6858000" cy="9144000"/>
@@ -3863,6 +3867,912 @@
                 <a:latin typeface="Calibri"/>
               </a:rPr>
               <a:t> </a:t>
+            </a:r>
+          </a:p>
+        </p:txBody>
+      </p:sp>
+    </p:spTree>
+  </p:cSld>
+  <p:clrMapOvr>
+    <a:masterClrMapping/>
+  </p:clrMapOvr>
+</p:sld>
+</file>
+
+<file path=ppt/slides/slide4.xml><?xml version="1.0" encoding="utf-8"?>
+<p:sld xmlns:p="http://schemas.openxmlformats.org/presentationml/2006/main" xmlns:a="http://schemas.openxmlformats.org/drawingml/2006/main">
+  <p:cSld>
+    <p:spTree>
+      <p:nvGrpSpPr>
+        <p:cNvPr id="1" name=""/>
+        <p:cNvGrpSpPr/>
+        <p:nvPr/>
+      </p:nvGrpSpPr>
+      <p:grpSpPr>
+        <a:xfrm>
+          <a:off x="0" y="0"/>
+          <a:ext cx="0" cy="0"/>
+          <a:chOff x="0" y="0"/>
+          <a:chExt cx="0" cy="0"/>
+        </a:xfrm>
+      </p:grpSpPr>
+      <p:sp xmlns:r="http://schemas.openxmlformats.org/officeDocument/2006/relationships">
+        <p:nvSpPr>
+          <p:cNvPr id="2" name="Title 1"/>
+          <p:cNvSpPr>
+            <a:spLocks noGrp="1"/>
+          </p:cNvSpPr>
+          <p:nvPr>
+            <p:ph type="title"/>
+          </p:nvPr>
+        </p:nvSpPr>
+        <p:spPr/>
+        <p:txBody>
+          <a:bodyPr/>
+          <a:lstStyle/>
+          <a:p>
+            <a:r>
+              <a:rPr lang="en-US" smtClean="0"/>
+              <a:t>Click to edit Master title style</a:t>
+            </a:r>
+            <a:endParaRPr lang="en-US"/>
+          </a:p>
+        </p:txBody>
+      </p:sp>
+      <p:sp xmlns:r="http://schemas.openxmlformats.org/officeDocument/2006/relationships">
+        <p:nvSpPr>
+          <p:cNvPr id="3" name="Content Placeholder 2"/>
+          <p:cNvSpPr>
+            <a:spLocks noGrp="1"/>
+          </p:cNvSpPr>
+          <p:nvPr>
+            <p:ph idx="1"/>
+          </p:nvPr>
+        </p:nvSpPr>
+        <p:spPr/>
+        <p:txBody>
+          <a:bodyPr/>
+          <a:lstStyle/>
+          <a:p>
+            <a:pPr>
+              <a:buNone/>
+            </a:pPr>
+            <a:r>
+              <a:rPr lang="en-US" sz="1400">
+                <a:latin typeface="Calibri"/>
+              </a:rPr>
+              <a:t>Hello mate! Hello mate! Hello mate! Hello mate! Hello mate! Hello mate! Hello mate! Hello mate! Hello mate!</a:t>
+            </a:r>
+            <a:r>
+              <a:rPr lang="en-US" sz="1400">
+                <a:latin typeface="Calibri"/>
+              </a:rPr>
+              <a:t> </a:t>
+            </a:r>
+          </a:p>
+          <a:p>
+            <a:pPr>
+              <a:buNone/>
+            </a:pPr>
+            <a:r>
+              <a:rPr lang="en-US" sz="1400">
+                <a:latin typeface="Calibri"/>
+              </a:rPr>
+              <a:t>This is </a:t>
+            </a:r>
+            <a:r>
+              <a:rPr lang="en-US" sz="1400" b="true">
+                <a:latin typeface="Calibri"/>
+              </a:rPr>
+              <a:t>bold</a:t>
+            </a:r>
+            <a:r>
+              <a:rPr lang="en-US" sz="1400">
+                <a:latin typeface="Calibri"/>
+              </a:rPr>
+              <a:t> and</a:t>
+            </a:r>
+            <a:r>
+              <a:rPr lang="en-US" sz="1400" u="sng">
+                <a:latin typeface="Calibri"/>
+              </a:rPr>
+              <a:t> underscore</a:t>
+            </a:r>
+            <a:r>
+              <a:rPr lang="en-US" sz="1400">
+                <a:latin typeface="Calibri"/>
+              </a:rPr>
+              <a:t> and</a:t>
+            </a:r>
+            <a:r>
+              <a:rPr lang="en-US" sz="1400" u="sng">
+                <a:latin typeface="Calibri"/>
+              </a:rPr>
+              <a:t> both</a:t>
+            </a:r>
+            <a:r>
+              <a:rPr lang="en-US" sz="1400">
+                <a:latin typeface="Calibri"/>
+              </a:rPr>
+              <a:t> and </a:t>
+            </a:r>
+            <a:r>
+              <a:rPr lang="en-US" sz="1400" strike="sngStrike">
+                <a:latin typeface="Calibri"/>
+              </a:rPr>
+              <a:t>not true</a:t>
+            </a:r>
+            <a:r>
+              <a:rPr lang="en-US" sz="1400">
+                <a:latin typeface="Calibri"/>
+              </a:rPr>
+              <a:t> false PowerPoint documents are made up of a tree of records. A record may contain either other records (in which case it is a Container), or data (in which case it's an Atom). A record can't hold both. PowerPoint documents don't have one overall container record. Instead, there are a number of different container records to be found at the top level. Any numbers or strings stored in the records are always stored in Little Endian format (least important bytes first). This is the case no matter what platform the file was written on - be that a Little Endian or a Big Endian system. PowerPoint may have Escher (DDF) records embedded in it. These are always held as the children of a PPDrawing record (record type 1036). Escher records have the same format as PowerPoint records. </a:t>
+            </a:r>
+            <a:r>
+              <a:rPr lang="en-US" sz="1400">
+                <a:latin typeface="Calibri"/>
+              </a:rPr>
+              <a:t> </a:t>
+            </a:r>
+          </a:p>
+          <a:p>
+            <a:pPr>
+              <a:buNone/>
+            </a:pPr>
+            <a:r>
+              <a:rPr lang="en-US" sz="1400">
+                <a:latin typeface="Calibri"/>
+              </a:rPr>
+              <a:t> </a:t>
+            </a:r>
+            <a:r>
+              <a:rPr lang="en-US" sz="1400">
+                <a:latin typeface="Calibri"/>
+              </a:rPr>
+              <a:t> </a:t>
+            </a:r>
+            <a:r>
+              <a:rPr lang="en-US" sz="1400">
+                <a:latin typeface="Calibri"/>
+              </a:rPr>
+              <a:t> </a:t>
+            </a:r>
+          </a:p>
+          <a:p>
+            <a:pPr>
+              <a:buNone/>
+            </a:pPr>
+            <a:r>
+              <a:rPr lang="en-US" sz="1400">
+                <a:latin typeface="Calibri"/>
+              </a:rPr>
+              <a:t>Testing list</a:t>
+            </a:r>
+            <a:r>
+              <a:rPr lang="en-US" sz="1400">
+                <a:latin typeface="Calibri"/>
+              </a:rPr>
+              <a:t> </a:t>
+            </a:r>
+          </a:p>
+          <a:p>
+            <a:pPr>
+              <a:buNone/>
+            </a:pPr>
+            <a:r>
+              <a:rPr lang="en-US" sz="1400">
+                <a:latin typeface="Calibri"/>
+              </a:rPr>
+              <a:t> </a:t>
+            </a:r>
+            <a:r>
+              <a:rPr lang="en-US" sz="1400">
+                <a:latin typeface="Calibri"/>
+              </a:rPr>
+              <a:t> </a:t>
+            </a:r>
+            <a:r>
+              <a:rPr lang="en-US" sz="1400">
+                <a:latin typeface="Calibri"/>
+              </a:rPr>
+              <a:t> </a:t>
+            </a:r>
+            <a:r>
+              <a:rPr lang="en-US" sz="1400">
+                <a:latin typeface="Calibri"/>
+              </a:rPr>
+              <a:t> </a:t>
+            </a:r>
+          </a:p>
+          <a:p>
+            <a:pPr>
+              <a:buAutoNum type="arabicPlain" startAt="1"/>
+            </a:pPr>
+            <a:r>
+              <a:rPr lang="en-US" sz="1400">
+                <a:latin typeface="Calibri"/>
+              </a:rPr>
+              <a:t>q</a:t>
+            </a:r>
+            <a:r>
+              <a:rPr lang="en-US" sz="1400">
+                <a:latin typeface="Calibri"/>
+              </a:rPr>
+              <a:t> </a:t>
+            </a:r>
+          </a:p>
+          <a:p>
+            <a:pPr>
+              <a:buAutoNum type="arabicPlain" startAt="1"/>
+            </a:pPr>
+            <a:r>
+              <a:rPr lang="en-US" sz="1400">
+                <a:latin typeface="Calibri"/>
+              </a:rPr>
+              <a:t>w</a:t>
+            </a:r>
+            <a:r>
+              <a:rPr lang="en-US" sz="1400">
+                <a:latin typeface="Calibri"/>
+              </a:rPr>
+              <a:t> </a:t>
+            </a:r>
+          </a:p>
+          <a:p>
+            <a:pPr>
+              <a:buAutoNum type="arabicPlain" startAt="1"/>
+            </a:pPr>
+            <a:r>
+              <a:rPr lang="en-US" sz="1400">
+                <a:latin typeface="Calibri"/>
+              </a:rPr>
+              <a:t>e</a:t>
+            </a:r>
+            <a:r>
+              <a:rPr lang="en-US" sz="1400">
+                <a:latin typeface="Calibri"/>
+              </a:rPr>
+              <a:t> </a:t>
+            </a:r>
+          </a:p>
+          <a:p>
+            <a:pPr>
+              <a:buAutoNum type="arabicPlain" startAt="1"/>
+            </a:pPr>
+            <a:r>
+              <a:rPr lang="en-US" sz="1400">
+                <a:latin typeface="Calibri"/>
+              </a:rPr>
+              <a:t>r</a:t>
+            </a:r>
+            <a:r>
+              <a:rPr lang="en-US" sz="1400">
+                <a:latin typeface="Calibri"/>
+              </a:rPr>
+              <a:t> </a:t>
+            </a:r>
+          </a:p>
+          <a:p>
+            <a:pPr>
+              <a:buAutoNum type="arabicPlain" startAt="1"/>
+            </a:pPr>
+            <a:r>
+              <a:rPr lang="en-US" sz="1400">
+                <a:latin typeface="Calibri"/>
+              </a:rPr>
+              <a:t>a</a:t>
+            </a:r>
+            <a:r>
+              <a:rPr lang="en-US" sz="1400">
+                <a:latin typeface="Calibri"/>
+              </a:rPr>
+              <a:t> </a:t>
+            </a:r>
+          </a:p>
+          <a:p>
+            <a:pPr>
+              <a:buAutoNum type="arabicPlain" startAt="1"/>
+            </a:pPr>
+            <a:r>
+              <a:rPr lang="en-US" sz="1400">
+                <a:latin typeface="Calibri"/>
+              </a:rPr>
+              <a:t>s</a:t>
+            </a:r>
+            <a:r>
+              <a:rPr lang="en-US" sz="1400">
+                <a:latin typeface="Calibri"/>
+              </a:rPr>
+              <a:t> </a:t>
+            </a:r>
+          </a:p>
+        </p:txBody>
+      </p:sp>
+    </p:spTree>
+  </p:cSld>
+  <p:clrMapOvr>
+    <a:masterClrMapping/>
+  </p:clrMapOvr>
+</p:sld>
+</file>
+
+<file path=ppt/slides/slide5.xml><?xml version="1.0" encoding="utf-8"?>
+<p:sld xmlns:p="http://schemas.openxmlformats.org/presentationml/2006/main" xmlns:a="http://schemas.openxmlformats.org/drawingml/2006/main">
+  <p:cSld>
+    <p:spTree>
+      <p:nvGrpSpPr>
+        <p:cNvPr id="1" name=""/>
+        <p:cNvGrpSpPr/>
+        <p:nvPr/>
+      </p:nvGrpSpPr>
+      <p:grpSpPr>
+        <a:xfrm>
+          <a:off x="0" y="0"/>
+          <a:ext cx="0" cy="0"/>
+          <a:chOff x="0" y="0"/>
+          <a:chExt cx="0" cy="0"/>
+        </a:xfrm>
+      </p:grpSpPr>
+      <p:sp xmlns:r="http://schemas.openxmlformats.org/officeDocument/2006/relationships">
+        <p:nvSpPr>
+          <p:cNvPr id="2" name="Title 1"/>
+          <p:cNvSpPr>
+            <a:spLocks noGrp="1"/>
+          </p:cNvSpPr>
+          <p:nvPr>
+            <p:ph type="title"/>
+          </p:nvPr>
+        </p:nvSpPr>
+        <p:spPr/>
+        <p:txBody>
+          <a:bodyPr/>
+          <a:lstStyle/>
+          <a:p>
+            <a:r>
+              <a:rPr lang="en-US" smtClean="0"/>
+              <a:t>Click to edit Master title style</a:t>
+            </a:r>
+            <a:endParaRPr lang="en-US"/>
+          </a:p>
+        </p:txBody>
+      </p:sp>
+      <p:sp xmlns:r="http://schemas.openxmlformats.org/officeDocument/2006/relationships">
+        <p:nvSpPr>
+          <p:cNvPr id="3" name="Content Placeholder 2"/>
+          <p:cNvSpPr>
+            <a:spLocks noGrp="1"/>
+          </p:cNvSpPr>
+          <p:nvPr>
+            <p:ph idx="1"/>
+          </p:nvPr>
+        </p:nvSpPr>
+        <p:spPr/>
+        <p:txBody>
+          <a:bodyPr/>
+          <a:lstStyle/>
+          <a:p>
+            <a:pPr>
+              <a:buAutoNum type="arabicPlain" startAt="1"/>
+            </a:pPr>
+            <a:r>
+              <a:rPr lang="en-US" sz="1400">
+                <a:latin typeface="Calibri"/>
+              </a:rPr>
+              <a:t>d</a:t>
+            </a:r>
+            <a:r>
+              <a:rPr lang="en-US" sz="1400">
+                <a:latin typeface="Calibri"/>
+              </a:rPr>
+              <a:t> </a:t>
+            </a:r>
+          </a:p>
+          <a:p>
+            <a:pPr>
+              <a:buAutoNum type="arabicPlain" startAt="1"/>
+            </a:pPr>
+            <a:r>
+              <a:rPr lang="en-US" sz="1400">
+                <a:latin typeface="Calibri"/>
+              </a:rPr>
+              <a:t>f</a:t>
+            </a:r>
+            <a:r>
+              <a:rPr lang="en-US" sz="1400">
+                <a:latin typeface="Calibri"/>
+              </a:rPr>
+              <a:t> </a:t>
+            </a:r>
+          </a:p>
+          <a:p>
+            <a:pPr>
+              <a:buAutoNum type="arabicPlain" startAt="1"/>
+            </a:pPr>
+            <a:r>
+              <a:rPr lang="en-US" sz="1400">
+                <a:latin typeface="Calibri"/>
+              </a:rPr>
+              <a:t>sss</a:t>
+            </a:r>
+            <a:r>
+              <a:rPr lang="en-US" sz="1400">
+                <a:latin typeface="Calibri"/>
+              </a:rPr>
+              <a:t> </a:t>
+            </a:r>
+            <a:r>
+              <a:rPr lang="en-US" sz="1400">
+                <a:latin typeface="Calibri"/>
+              </a:rPr>
+              <a:t> </a:t>
+            </a:r>
+            <a:r>
+              <a:rPr lang="en-US" sz="1400">
+                <a:latin typeface="Calibri"/>
+              </a:rPr>
+              <a:t> </a:t>
+            </a:r>
+          </a:p>
+          <a:p>
+            <a:r>
+              <a:rPr lang="en-US" sz="1400">
+                <a:latin typeface="Calibri"/>
+              </a:rPr>
+              <a:t>q</a:t>
+            </a:r>
+            <a:r>
+              <a:rPr lang="en-US" sz="1400">
+                <a:latin typeface="Calibri"/>
+              </a:rPr>
+              <a:t> </a:t>
+            </a:r>
+          </a:p>
+          <a:p>
+            <a:r>
+              <a:rPr lang="en-US" sz="1400">
+                <a:latin typeface="Calibri"/>
+              </a:rPr>
+              <a:t>sss</a:t>
+            </a:r>
+            <a:r>
+              <a:rPr lang="en-US" sz="1400">
+                <a:latin typeface="Calibri"/>
+              </a:rPr>
+              <a:t> </a:t>
+            </a:r>
+            <a:r>
+              <a:rPr lang="en-US" sz="1400">
+                <a:latin typeface="Calibri"/>
+              </a:rPr>
+              <a:t> </a:t>
+            </a:r>
+            <a:r>
+              <a:rPr lang="en-US" sz="1400">
+                <a:latin typeface="Calibri"/>
+              </a:rPr>
+              <a:t> </a:t>
+            </a:r>
+          </a:p>
+          <a:p>
+            <a:pPr>
+              <a:buAutoNum type="arabicPlain" startAt="1"/>
+            </a:pPr>
+            <a:r>
+              <a:rPr lang="en-US" sz="1400">
+                <a:latin typeface="Calibri"/>
+              </a:rPr>
+              <a:t>q</a:t>
+            </a:r>
+            <a:r>
+              <a:rPr lang="en-US" sz="1400">
+                <a:latin typeface="Calibri"/>
+              </a:rPr>
+              <a:t> </a:t>
+            </a:r>
+          </a:p>
+          <a:p>
+            <a:pPr>
+              <a:buAutoNum type="arabicPlain" startAt="1"/>
+            </a:pPr>
+            <a:r>
+              <a:rPr lang="en-US" sz="1400">
+                <a:latin typeface="Calibri"/>
+              </a:rPr>
+              <a:t>w</a:t>
+            </a:r>
+            <a:r>
+              <a:rPr lang="en-US" sz="1400">
+                <a:latin typeface="Calibri"/>
+              </a:rPr>
+              <a:t> </a:t>
+            </a:r>
+          </a:p>
+          <a:p>
+            <a:pPr>
+              <a:buAutoNum type="arabicPlain" startAt="1"/>
+            </a:pPr>
+            <a:r>
+              <a:rPr lang="en-US" sz="1400">
+                <a:latin typeface="Calibri"/>
+              </a:rPr>
+              <a:t>e</a:t>
+            </a:r>
+            <a:r>
+              <a:rPr lang="en-US" sz="1400">
+                <a:latin typeface="Calibri"/>
+              </a:rPr>
+              <a:t> </a:t>
+            </a:r>
+          </a:p>
+          <a:p>
+            <a:pPr>
+              <a:buAutoNum type="arabicPlain" startAt="1"/>
+            </a:pPr>
+            <a:r>
+              <a:rPr lang="en-US" sz="1400">
+                <a:latin typeface="Calibri"/>
+              </a:rPr>
+              <a:t>r</a:t>
+            </a:r>
+            <a:r>
+              <a:rPr lang="en-US" sz="1400">
+                <a:latin typeface="Calibri"/>
+              </a:rPr>
+              <a:t> </a:t>
+            </a:r>
+          </a:p>
+          <a:p>
+            <a:pPr>
+              <a:buAutoNum type="arabicPlain" startAt="1"/>
+            </a:pPr>
+            <a:r>
+              <a:rPr lang="en-US" sz="1400">
+                <a:latin typeface="Calibri"/>
+              </a:rPr>
+              <a:t>a</a:t>
+            </a:r>
+            <a:r>
+              <a:rPr lang="en-US" sz="1400">
+                <a:latin typeface="Calibri"/>
+              </a:rPr>
+              <a:t> </a:t>
+            </a:r>
+          </a:p>
+          <a:p>
+            <a:pPr>
+              <a:buAutoNum type="arabicPlain" startAt="1"/>
+            </a:pPr>
+            <a:r>
+              <a:rPr lang="en-US" sz="1400">
+                <a:latin typeface="Calibri"/>
+              </a:rPr>
+              <a:t>s</a:t>
+            </a:r>
+            <a:r>
+              <a:rPr lang="en-US" sz="1400">
+                <a:latin typeface="Calibri"/>
+              </a:rPr>
+              <a:t> </a:t>
+            </a:r>
+          </a:p>
+          <a:p>
+            <a:pPr>
+              <a:buAutoNum type="arabicPlain" startAt="1"/>
+            </a:pPr>
+            <a:r>
+              <a:rPr lang="en-US" sz="1400">
+                <a:latin typeface="Calibri"/>
+              </a:rPr>
+              <a:t>d</a:t>
+            </a:r>
+            <a:r>
+              <a:rPr lang="en-US" sz="1400">
+                <a:latin typeface="Calibri"/>
+              </a:rPr>
+              <a:t> </a:t>
+            </a:r>
+          </a:p>
+          <a:p>
+            <a:pPr>
+              <a:buAutoNum type="arabicPlain" startAt="1"/>
+            </a:pPr>
+            <a:r>
+              <a:rPr lang="en-US" sz="1400">
+                <a:latin typeface="Calibri"/>
+              </a:rPr>
+              <a:t>f</a:t>
+            </a:r>
+            <a:r>
+              <a:rPr lang="en-US" sz="1400">
+                <a:latin typeface="Calibri"/>
+              </a:rPr>
+              <a:t> </a:t>
+            </a:r>
+          </a:p>
+          <a:p>
+            <a:pPr>
+              <a:buAutoNum type="arabicPlain" startAt="1"/>
+            </a:pPr>
+            <a:r>
+              <a:rPr lang="en-US" sz="1400">
+                <a:latin typeface="Calibri"/>
+              </a:rPr>
+              <a:t>sss</a:t>
+            </a:r>
+            <a:r>
+              <a:rPr lang="en-US" sz="1400">
+                <a:latin typeface="Calibri"/>
+              </a:rPr>
+              <a:t> </a:t>
+            </a:r>
+            <a:r>
+              <a:rPr lang="en-US" sz="1400">
+                <a:latin typeface="Calibri"/>
+              </a:rPr>
+              <a:t> </a:t>
+            </a:r>
+            <a:r>
+              <a:rPr lang="en-US" sz="1400">
+                <a:latin typeface="Calibri"/>
+              </a:rPr>
+              <a:t> </a:t>
+            </a:r>
+          </a:p>
+          <a:p>
+            <a:r>
+              <a:rPr lang="en-US" sz="1400">
+                <a:latin typeface="Calibri"/>
+              </a:rPr>
+              <a:t>q</a:t>
+            </a:r>
+            <a:r>
+              <a:rPr lang="en-US" sz="1400">
+                <a:latin typeface="Calibri"/>
+              </a:rPr>
+              <a:t> </a:t>
+            </a:r>
+          </a:p>
+          <a:p>
+            <a:r>
+              <a:rPr lang="en-US" sz="1400">
+                <a:latin typeface="Calibri"/>
+              </a:rPr>
+              <a:t>sss</a:t>
+            </a:r>
+            <a:r>
+              <a:rPr lang="en-US" sz="1400">
+                <a:latin typeface="Calibri"/>
+              </a:rPr>
+              <a:t> </a:t>
+            </a:r>
+            <a:r>
+              <a:rPr lang="en-US" sz="1400">
+                <a:latin typeface="Calibri"/>
+              </a:rPr>
+              <a:t> </a:t>
+            </a:r>
+          </a:p>
+          <a:p>
+            <a:pPr>
+              <a:buNone/>
+            </a:pPr>
+            <a:r>
+              <a:rPr lang="en-US" sz="1400">
+                <a:latin typeface="Calibri"/>
+              </a:rPr>
+              <a:t>Centered text</a:t>
+            </a:r>
+          </a:p>
+        </p:txBody>
+      </p:sp>
+    </p:spTree>
+  </p:cSld>
+  <p:clrMapOvr>
+    <a:masterClrMapping/>
+  </p:clrMapOvr>
+</p:sld>
+</file>
+
+<file path=ppt/slides/slide6.xml><?xml version="1.0" encoding="utf-8"?>
+<p:sld xmlns:p="http://schemas.openxmlformats.org/presentationml/2006/main" xmlns:a="http://schemas.openxmlformats.org/drawingml/2006/main">
+  <p:cSld>
+    <p:spTree>
+      <p:nvGrpSpPr>
+        <p:cNvPr id="1" name=""/>
+        <p:cNvGrpSpPr/>
+        <p:nvPr/>
+      </p:nvGrpSpPr>
+      <p:grpSpPr>
+        <a:xfrm>
+          <a:off x="0" y="0"/>
+          <a:ext cx="0" cy="0"/>
+          <a:chOff x="0" y="0"/>
+          <a:chExt cx="0" cy="0"/>
+        </a:xfrm>
+      </p:grpSpPr>
+      <p:sp xmlns:r="http://schemas.openxmlformats.org/officeDocument/2006/relationships">
+        <p:nvSpPr>
+          <p:cNvPr id="2" name="Title 1"/>
+          <p:cNvSpPr>
+            <a:spLocks noGrp="1"/>
+          </p:cNvSpPr>
+          <p:nvPr>
+            <p:ph type="title"/>
+          </p:nvPr>
+        </p:nvSpPr>
+        <p:spPr/>
+        <p:txBody>
+          <a:bodyPr/>
+          <a:lstStyle/>
+          <a:p>
+            <a:r>
+              <a:rPr lang="en-US" smtClean="0"/>
+              <a:t>Click to edit Master title style</a:t>
+            </a:r>
+            <a:endParaRPr lang="en-US"/>
+          </a:p>
+        </p:txBody>
+      </p:sp>
+      <p:sp xmlns:r="http://schemas.openxmlformats.org/officeDocument/2006/relationships">
+        <p:nvSpPr>
+          <p:cNvPr id="3" name="Content Placeholder 2"/>
+          <p:cNvSpPr>
+            <a:spLocks noGrp="1"/>
+          </p:cNvSpPr>
+          <p:nvPr>
+            <p:ph idx="1"/>
+          </p:nvPr>
+        </p:nvSpPr>
+        <p:spPr/>
+        <p:txBody>
+          <a:bodyPr/>
+          <a:lstStyle/>
+          <a:p>
+            <a:pPr>
+              <a:buNone/>
+            </a:pPr>
+            <a:r>
+              <a:rPr lang="en-US" sz="1400">
+                <a:latin typeface="Calibri"/>
+              </a:rPr>
+              <a:t>Color </a:t>
+            </a:r>
+            <a:r>
+              <a:rPr lang="en-US" sz="1400">
+                <a:solidFill>
+                  <a:srgbClr val="E60000"/>
+                </a:solidFill>
+                <a:latin typeface="Calibri"/>
+              </a:rPr>
+              <a:t>red</a:t>
+            </a:r>
+            <a:r>
+              <a:rPr lang="en-US" sz="1400">
+                <a:latin typeface="Calibri"/>
+              </a:rPr>
+              <a:t>,</a:t>
+            </a:r>
+            <a:r>
+              <a:rPr lang="en-US" sz="1400">
+                <a:solidFill>
+                  <a:srgbClr val="0066CC"/>
+                </a:solidFill>
+                <a:latin typeface="Calibri"/>
+              </a:rPr>
+              <a:t> blue</a:t>
+            </a:r>
+            <a:r>
+              <a:rPr lang="en-US" sz="1400">
+                <a:latin typeface="Calibri"/>
+              </a:rPr>
+              <a:t>, </a:t>
+            </a:r>
+            <a:r>
+              <a:rPr lang="en-US" sz="1400">
+                <a:solidFill>
+                  <a:srgbClr val="EBD6FF"/>
+                </a:solidFill>
+                <a:latin typeface="Calibri"/>
+              </a:rPr>
+              <a:t>strange</a:t>
+            </a:r>
+          </a:p>
+          <a:p>
+            <a:pPr>
+              <a:buNone/>
+            </a:pPr>
+            <a:r>
+              <a:rPr lang="en-US" sz="1400">
+                <a:latin typeface="Calibri"/>
+              </a:rPr>
+              <a:t> </a:t>
+            </a:r>
+            <a:r>
+              <a:rPr lang="en-US" sz="1400">
+                <a:latin typeface="Calibri"/>
+              </a:rPr>
+              <a:t>And highlight</a:t>
+            </a:r>
+            <a:r>
+              <a:rPr lang="en-US" sz="1400">
+                <a:latin typeface="Calibri"/>
+              </a:rPr>
+              <a:t> </a:t>
+            </a:r>
+          </a:p>
+        </p:txBody>
+      </p:sp>
+    </p:spTree>
+  </p:cSld>
+  <p:clrMapOvr>
+    <a:masterClrMapping/>
+  </p:clrMapOvr>
+</p:sld>
+</file>
+
+<file path=ppt/slides/slide7.xml><?xml version="1.0" encoding="utf-8"?>
+<p:sld xmlns:p="http://schemas.openxmlformats.org/presentationml/2006/main" xmlns:a="http://schemas.openxmlformats.org/drawingml/2006/main">
+  <p:cSld>
+    <p:spTree>
+      <p:nvGrpSpPr>
+        <p:cNvPr id="1" name=""/>
+        <p:cNvGrpSpPr/>
+        <p:nvPr/>
+      </p:nvGrpSpPr>
+      <p:grpSpPr>
+        <a:xfrm>
+          <a:off x="0" y="0"/>
+          <a:ext cx="0" cy="0"/>
+          <a:chOff x="0" y="0"/>
+          <a:chExt cx="0" cy="0"/>
+        </a:xfrm>
+      </p:grpSpPr>
+      <p:sp xmlns:r="http://schemas.openxmlformats.org/officeDocument/2006/relationships">
+        <p:nvSpPr>
+          <p:cNvPr id="2" name="Title 1"/>
+          <p:cNvSpPr>
+            <a:spLocks noGrp="1"/>
+          </p:cNvSpPr>
+          <p:nvPr>
+            <p:ph type="title"/>
+          </p:nvPr>
+        </p:nvSpPr>
+        <p:spPr/>
+        <p:txBody>
+          <a:bodyPr/>
+          <a:lstStyle/>
+          <a:p>
+            <a:r>
+              <a:rPr lang="en-US" smtClean="0"/>
+              <a:t>Click to edit Master title style</a:t>
+            </a:r>
+            <a:endParaRPr lang="en-US"/>
+          </a:p>
+        </p:txBody>
+      </p:sp>
+      <p:sp xmlns:r="http://schemas.openxmlformats.org/officeDocument/2006/relationships">
+        <p:nvSpPr>
+          <p:cNvPr id="3" name="Content Placeholder 2"/>
+          <p:cNvSpPr>
+            <a:spLocks noGrp="1"/>
+          </p:cNvSpPr>
+          <p:nvPr>
+            <p:ph idx="1"/>
+          </p:nvPr>
+        </p:nvSpPr>
+        <p:spPr/>
+        <p:txBody>
+          <a:bodyPr/>
+          <a:lstStyle/>
+          <a:p>
+            <a:pPr>
+              <a:buNone/>
+            </a:pPr>
+            <a:r>
+              <a:rPr lang="en-US" sz="1400" u="sng">
+                <a:latin typeface="Calibri"/>
+              </a:rPr>
+              <a:t> both</a:t>
             </a:r>
           </a:p>
         </p:txBody>

</xml_diff>

<commit_message>
all styles applies recursively
</commit_message>
<xml_diff>
--- a/html-to-ppt/TextFormat.pptx
+++ b/html-to-ppt/TextFormat.pptx
@@ -12,6 +12,7 @@
     <p:sldId id="260" r:id="rId10"/>
     <p:sldId id="261" r:id="rId11"/>
     <p:sldId id="262" r:id="rId12"/>
+    <p:sldId id="263" r:id="rId13"/>
   </p:sldIdLst>
   <p:sldSz cx="9144000" cy="6858000" type="screen4x3"/>
   <p:notesSz cx="6858000" cy="9144000"/>
@@ -3154,7 +3155,7 @@
               <a:t> and</a:t>
             </a:r>
             <a:r>
-              <a:rPr lang="en-US" sz="1400" u="sng">
+              <a:rPr lang="en-US" sz="1400" b="true" u="sng">
                 <a:latin typeface="Calibri"/>
               </a:rPr>
               <a:t> both</a:t>
@@ -3985,7 +3986,7 @@
               <a:t> and</a:t>
             </a:r>
             <a:r>
-              <a:rPr lang="en-US" sz="1400" u="sng">
+              <a:rPr lang="en-US" sz="1400" b="true" u="sng">
                 <a:latin typeface="Calibri"/>
               </a:rPr>
               <a:t> both</a:t>
@@ -4769,10 +4770,88 @@
               <a:buNone/>
             </a:pPr>
             <a:r>
-              <a:rPr lang="en-US" sz="1400" u="sng">
+              <a:rPr lang="en-US" sz="1400" b="true" u="sng">
                 <a:latin typeface="Calibri"/>
               </a:rPr>
               <a:t> both</a:t>
+            </a:r>
+          </a:p>
+        </p:txBody>
+      </p:sp>
+    </p:spTree>
+  </p:cSld>
+  <p:clrMapOvr>
+    <a:masterClrMapping/>
+  </p:clrMapOvr>
+</p:sld>
+</file>
+
+<file path=ppt/slides/slide8.xml><?xml version="1.0" encoding="utf-8"?>
+<p:sld xmlns:p="http://schemas.openxmlformats.org/presentationml/2006/main" xmlns:a="http://schemas.openxmlformats.org/drawingml/2006/main">
+  <p:cSld>
+    <p:spTree>
+      <p:nvGrpSpPr>
+        <p:cNvPr id="1" name=""/>
+        <p:cNvGrpSpPr/>
+        <p:nvPr/>
+      </p:nvGrpSpPr>
+      <p:grpSpPr>
+        <a:xfrm>
+          <a:off x="0" y="0"/>
+          <a:ext cx="0" cy="0"/>
+          <a:chOff x="0" y="0"/>
+          <a:chExt cx="0" cy="0"/>
+        </a:xfrm>
+      </p:grpSpPr>
+      <p:sp xmlns:r="http://schemas.openxmlformats.org/officeDocument/2006/relationships">
+        <p:nvSpPr>
+          <p:cNvPr id="2" name="Title 1"/>
+          <p:cNvSpPr>
+            <a:spLocks noGrp="1"/>
+          </p:cNvSpPr>
+          <p:nvPr>
+            <p:ph type="title"/>
+          </p:nvPr>
+        </p:nvSpPr>
+        <p:spPr/>
+        <p:txBody>
+          <a:bodyPr/>
+          <a:lstStyle/>
+          <a:p>
+            <a:r>
+              <a:rPr lang="en-US" smtClean="0"/>
+              <a:t>Click to edit Master title style</a:t>
+            </a:r>
+            <a:endParaRPr lang="en-US"/>
+          </a:p>
+        </p:txBody>
+      </p:sp>
+      <p:sp xmlns:r="http://schemas.openxmlformats.org/officeDocument/2006/relationships">
+        <p:nvSpPr>
+          <p:cNvPr id="3" name="Content Placeholder 2"/>
+          <p:cNvSpPr>
+            <a:spLocks noGrp="1"/>
+          </p:cNvSpPr>
+          <p:nvPr>
+            <p:ph idx="1"/>
+          </p:nvPr>
+        </p:nvSpPr>
+        <p:spPr/>
+        <p:txBody>
+          <a:bodyPr/>
+          <a:lstStyle/>
+          <a:p>
+            <a:pPr>
+              <a:buNone/>
+            </a:pPr>
+            <a:r>
+              <a:rPr lang="en-US" sz="1400" u="sng" b="true">
+                <a:solidFill>
+                  <a:srgbClr val="00FF00"/>
+                </a:solidFill>
+                <a:latin typeface="Calibri"/>
+              </a:rPr>
+              <a:t>That`s all, folks!</a:t>
             </a:r>
           </a:p>
         </p:txBody>

</xml_diff>

<commit_message>
refactor -> default slide template changed, new class added after refactor
</commit_message>
<xml_diff>
--- a/html-to-ppt/TextFormat.pptx
+++ b/html-to-ppt/TextFormat.pptx
@@ -7,14 +7,8 @@
   <p:sldIdLst>
     <p:sldId id="256" r:id="rId6"/>
     <p:sldId id="257" r:id="rId7"/>
-    <p:sldId id="258" r:id="rId8"/>
-    <p:sldId id="259" r:id="rId9"/>
-    <p:sldId id="260" r:id="rId10"/>
-    <p:sldId id="261" r:id="rId11"/>
-    <p:sldId id="262" r:id="rId12"/>
-    <p:sldId id="263" r:id="rId13"/>
   </p:sldIdLst>
-  <p:sldSz cx="9144000" cy="6858000" type="screen4x3"/>
+  <p:sldSz cx="16256000" cy="9144000"/>
   <p:notesSz cx="6858000" cy="9144000"/>
   <p:defaultTextStyle>
     <a:defPPr>
@@ -3066,52 +3060,181 @@
           <a:chExt cx="0" cy="0"/>
         </a:xfrm>
       </p:grpSpPr>
-      <p:sp xmlns:r="http://schemas.openxmlformats.org/officeDocument/2006/relationships">
-        <p:nvSpPr>
-          <p:cNvPr id="2" name="Title 1"/>
-          <p:cNvSpPr>
-            <a:spLocks noGrp="1"/>
-          </p:cNvSpPr>
-          <p:nvPr>
-            <p:ph type="title"/>
-          </p:nvPr>
-        </p:nvSpPr>
-        <p:spPr/>
-        <p:txBody>
-          <a:bodyPr/>
-          <a:lstStyle/>
-          <a:p>
-            <a:r>
-              <a:rPr lang="en-US" smtClean="0"/>
-              <a:t>Click to edit Master title style</a:t>
-            </a:r>
-            <a:endParaRPr lang="en-US"/>
-          </a:p>
-        </p:txBody>
-      </p:sp>
-      <p:sp xmlns:r="http://schemas.openxmlformats.org/officeDocument/2006/relationships">
-        <p:nvSpPr>
-          <p:cNvPr id="3" name="Content Placeholder 2"/>
-          <p:cNvSpPr>
-            <a:spLocks noGrp="1"/>
-          </p:cNvSpPr>
-          <p:nvPr>
-            <p:ph idx="1"/>
-          </p:nvPr>
-        </p:nvSpPr>
-        <p:spPr/>
-        <p:txBody>
-          <a:bodyPr/>
-          <a:lstStyle/>
+      <p:sp>
+        <p:nvSpPr>
+          <p:cNvPr name="TextBox 2" id="2"/>
+          <p:cNvSpPr txBox="true"/>
+          <p:nvPr/>
+        </p:nvSpPr>
+        <p:spPr>
+          <a:xfrm>
+            <a:off x="254000" y="254000"/>
+            <a:ext cx="14986000" cy="8890000"/>
+          </a:xfrm>
+          <a:prstGeom prst="rect">
+            <a:avLst/>
+          </a:prstGeom>
+        </p:spPr>
+        <p:txBody>
+          <a:bodyPr anchor="t" rtlCol="false"/>
+          <a:lstStyle/>
+          <a:p>
+            <a:pPr algn="l">
+              <a:defRPr/>
+            </a:pPr>
+            <a:r>
+              <a:rPr lang="en-US"/>
+              <a:t/>
+            </a:r>
+            <a:endParaRPr lang="ru-RU"/>
+          </a:p>
+          <a:p>
+            <a:r>
+              <a:rPr lang="en-US" sz="1400">
+                <a:latin typeface="Calibri"/>
+              </a:rPr>
+              <a:t>Hello mate! Hello mate! Hello mate! Hello mate! Hello mate! Hello mate! Hello mate! Hello mate! Hello mate!</a:t>
+            </a:r>
+            <a:r>
+              <a:rPr lang="en-US" sz="1400">
+                <a:latin typeface="Calibri"/>
+              </a:rPr>
+              <a:t> </a:t>
+            </a:r>
+          </a:p>
+          <a:p>
+            <a:r>
+              <a:rPr lang="en-US" sz="1400">
+                <a:latin typeface="Calibri"/>
+              </a:rPr>
+              <a:t>This is </a:t>
+            </a:r>
+            <a:r>
+              <a:rPr lang="en-US" sz="1400" b="true">
+                <a:latin typeface="Calibri"/>
+              </a:rPr>
+              <a:t>bold</a:t>
+            </a:r>
+            <a:r>
+              <a:rPr lang="en-US" sz="1400">
+                <a:latin typeface="Calibri"/>
+              </a:rPr>
+              <a:t> and</a:t>
+            </a:r>
+            <a:r>
+              <a:rPr lang="en-US" sz="1400" u="sng">
+                <a:latin typeface="Calibri"/>
+              </a:rPr>
+              <a:t> underscore</a:t>
+            </a:r>
+            <a:r>
+              <a:rPr lang="en-US" sz="1400">
+                <a:latin typeface="Calibri"/>
+              </a:rPr>
+              <a:t> and</a:t>
+            </a:r>
+            <a:r>
+              <a:rPr lang="en-US" sz="1400" b="true" u="sng">
+                <a:latin typeface="Calibri"/>
+              </a:rPr>
+              <a:t> both</a:t>
+            </a:r>
+            <a:r>
+              <a:rPr lang="en-US" sz="1400">
+                <a:latin typeface="Calibri"/>
+              </a:rPr>
+              <a:t> and </a:t>
+            </a:r>
+            <a:r>
+              <a:rPr lang="en-US" sz="1400" strike="sngStrike">
+                <a:latin typeface="Calibri"/>
+              </a:rPr>
+              <a:t>not true</a:t>
+            </a:r>
+            <a:r>
+              <a:rPr lang="en-US" sz="1400">
+                <a:latin typeface="Calibri"/>
+              </a:rPr>
+              <a:t> false PowerPoint documents are made up of a tree of records. A record may contain either other records (in which case it is a Container), or data (in which case it's an Atom). A record can't hold both. PowerPoint documents don't have one overall container record. Instead, there are a number of different container records to be found at the top level. Any numbers or strings stored in the records are always stored in Little Endian format (least important bytes first). This is the case no matter what platform the file was written on - be that a Little Endian or a Big Endian system. PowerPoint may have Escher (DDF) records embedded in it. These are always held as the children of a PPDrawing record (record type 1036). Escher records have the same format as PowerPoint records. </a:t>
+            </a:r>
+            <a:r>
+              <a:rPr lang="en-US" sz="1400">
+                <a:latin typeface="Calibri"/>
+              </a:rPr>
+              <a:t> </a:t>
+            </a:r>
+          </a:p>
+          <a:p>
+            <a:r>
+              <a:rPr lang="en-US" sz="1400">
+                <a:latin typeface="Calibri"/>
+              </a:rPr>
+              <a:t> </a:t>
+            </a:r>
+            <a:r>
+              <a:rPr lang="en-US" sz="1400">
+                <a:latin typeface="Calibri"/>
+              </a:rPr>
+              <a:t> </a:t>
+            </a:r>
+            <a:r>
+              <a:rPr lang="en-US" sz="1400">
+                <a:latin typeface="Calibri"/>
+              </a:rPr>
+              <a:t> </a:t>
+            </a:r>
+          </a:p>
+          <a:p>
+            <a:r>
+              <a:rPr lang="en-US" sz="1400">
+                <a:latin typeface="Calibri"/>
+              </a:rPr>
+              <a:t>Testing list</a:t>
+            </a:r>
+            <a:r>
+              <a:rPr lang="en-US" sz="1400">
+                <a:latin typeface="Calibri"/>
+              </a:rPr>
+              <a:t> </a:t>
+            </a:r>
+          </a:p>
+          <a:p>
+            <a:r>
+              <a:rPr lang="en-US" sz="1400">
+                <a:latin typeface="Calibri"/>
+              </a:rPr>
+              <a:t> </a:t>
+            </a:r>
+            <a:r>
+              <a:rPr lang="en-US" sz="1400">
+                <a:latin typeface="Calibri"/>
+              </a:rPr>
+              <a:t> </a:t>
+            </a:r>
+            <a:r>
+              <a:rPr lang="en-US" sz="1400">
+                <a:latin typeface="Calibri"/>
+              </a:rPr>
+              <a:t> </a:t>
+            </a:r>
+            <a:r>
+              <a:rPr lang="en-US" sz="1400">
+                <a:latin typeface="Calibri"/>
+              </a:rPr>
+              <a:t> </a:t>
+            </a:r>
+          </a:p>
           <a:p>
             <a:pPr>
-              <a:buNone/>
+              <a:buFont typeface="Arial"/>
+              <a:buAutoNum type="arabicPlain" startAt="1"/>
+              <a:buChar char="•"/>
             </a:pPr>
             <a:r>
               <a:rPr lang="en-US" sz="1400">
                 <a:latin typeface="Calibri"/>
               </a:rPr>
-              <a:t>Hello mate! Hello mate! Hello mate! Hello mate! Hello mate! Hello mate! Hello mate! Hello mate! Hello mate!</a:t>
+              <a:t>q</a:t>
             </a:r>
             <a:r>
               <a:rPr lang="en-US" sz="1400">
@@ -3122,61 +3245,15 @@
           </a:p>
           <a:p>
             <a:pPr>
-              <a:buNone/>
+              <a:buFont typeface="Arial"/>
+              <a:buAutoNum type="arabicPlain" startAt="1"/>
+              <a:buChar char="•"/>
             </a:pPr>
             <a:r>
               <a:rPr lang="en-US" sz="1400">
                 <a:latin typeface="Calibri"/>
               </a:rPr>
-              <a:t>This is </a:t>
-            </a:r>
-            <a:r>
-              <a:rPr lang="en-US" sz="1400" b="true">
-                <a:latin typeface="Calibri"/>
-              </a:rPr>
-              <a:t>bold</a:t>
-            </a:r>
-            <a:r>
-              <a:rPr lang="en-US" sz="1400">
-                <a:latin typeface="Calibri"/>
-              </a:rPr>
-              <a:t> and</a:t>
-            </a:r>
-            <a:r>
-              <a:rPr lang="en-US" sz="1400" u="sng">
-                <a:latin typeface="Calibri"/>
-              </a:rPr>
-              <a:t> underscore</a:t>
-            </a:r>
-            <a:r>
-              <a:rPr lang="en-US" sz="1400">
-                <a:latin typeface="Calibri"/>
-              </a:rPr>
-              <a:t> and</a:t>
-            </a:r>
-            <a:r>
-              <a:rPr lang="en-US" sz="1400" b="true" u="sng">
-                <a:latin typeface="Calibri"/>
-              </a:rPr>
-              <a:t> both</a:t>
-            </a:r>
-            <a:r>
-              <a:rPr lang="en-US" sz="1400">
-                <a:latin typeface="Calibri"/>
-              </a:rPr>
-              <a:t> and </a:t>
-            </a:r>
-            <a:r>
-              <a:rPr lang="en-US" sz="1400" strike="sngStrike">
-                <a:latin typeface="Calibri"/>
-              </a:rPr>
-              <a:t>not true</a:t>
-            </a:r>
-            <a:r>
-              <a:rPr lang="en-US" sz="1400">
-                <a:latin typeface="Calibri"/>
-              </a:rPr>
-              <a:t> false PowerPoint documents are made up of a tree of records. A record may contain either other records (in which case it is a Container), or data (in which case it's an Atom). A record can't hold both. PowerPoint documents don't have one overall container record. Instead, there are a number of different container records to be found at the top level. Any numbers or strings stored in the records are always stored in Little Endian format (least important bytes first). This is the case no matter what platform the file was written on - be that a Little Endian or a Big Endian system. PowerPoint may have Escher (DDF) records embedded in it. These are always held as the children of a PPDrawing record (record type 1036). Escher records have the same format as PowerPoint records. </a:t>
+              <a:t>w</a:t>
             </a:r>
             <a:r>
               <a:rPr lang="en-US" sz="1400">
@@ -3187,20 +3264,54 @@
           </a:p>
           <a:p>
             <a:pPr>
-              <a:buNone/>
+              <a:buFont typeface="Arial"/>
+              <a:buAutoNum type="arabicPlain" startAt="1"/>
+              <a:buChar char="•"/>
             </a:pPr>
             <a:r>
               <a:rPr lang="en-US" sz="1400">
                 <a:latin typeface="Calibri"/>
               </a:rPr>
+              <a:t>e</a:t>
+            </a:r>
+            <a:r>
+              <a:rPr lang="en-US" sz="1400">
+                <a:latin typeface="Calibri"/>
+              </a:rPr>
               <a:t> </a:t>
             </a:r>
+          </a:p>
+          <a:p>
+            <a:pPr>
+              <a:buFont typeface="Arial"/>
+              <a:buAutoNum type="arabicPlain" startAt="1"/>
+              <a:buChar char="•"/>
+            </a:pPr>
+            <a:r>
+              <a:rPr lang="en-US" sz="1400">
+                <a:latin typeface="Calibri"/>
+              </a:rPr>
+              <a:t>r</a:t>
+            </a:r>
             <a:r>
               <a:rPr lang="en-US" sz="1400">
                 <a:latin typeface="Calibri"/>
               </a:rPr>
               <a:t> </a:t>
             </a:r>
+          </a:p>
+          <a:p>
+            <a:pPr>
+              <a:buFont typeface="Arial"/>
+              <a:buAutoNum type="arabicPlain" startAt="1"/>
+              <a:buChar char="•"/>
+            </a:pPr>
+            <a:r>
+              <a:rPr lang="en-US" sz="1400">
+                <a:latin typeface="Calibri"/>
+              </a:rPr>
+              <a:t>a</a:t>
+            </a:r>
             <a:r>
               <a:rPr lang="en-US" sz="1400">
                 <a:latin typeface="Calibri"/>
@@ -3210,13 +3321,15 @@
           </a:p>
           <a:p>
             <a:pPr>
-              <a:buNone/>
+              <a:buFont typeface="Arial"/>
+              <a:buAutoNum type="arabicPlain" startAt="1"/>
+              <a:buChar char="•"/>
             </a:pPr>
             <a:r>
               <a:rPr lang="en-US" sz="1400">
                 <a:latin typeface="Calibri"/>
               </a:rPr>
-              <a:t>Testing list</a:t>
+              <a:t>s</a:t>
             </a:r>
             <a:r>
               <a:rPr lang="en-US" sz="1400">
@@ -3227,20 +3340,54 @@
           </a:p>
           <a:p>
             <a:pPr>
-              <a:buNone/>
+              <a:buFont typeface="Arial"/>
+              <a:buAutoNum type="arabicPlain" startAt="1"/>
+              <a:buChar char="•"/>
             </a:pPr>
             <a:r>
               <a:rPr lang="en-US" sz="1400">
                 <a:latin typeface="Calibri"/>
               </a:rPr>
+              <a:t>d</a:t>
+            </a:r>
+            <a:r>
+              <a:rPr lang="en-US" sz="1400">
+                <a:latin typeface="Calibri"/>
+              </a:rPr>
               <a:t> </a:t>
             </a:r>
+          </a:p>
+          <a:p>
+            <a:pPr>
+              <a:buFont typeface="Arial"/>
+              <a:buAutoNum type="arabicPlain" startAt="1"/>
+              <a:buChar char="•"/>
+            </a:pPr>
+            <a:r>
+              <a:rPr lang="en-US" sz="1400">
+                <a:latin typeface="Calibri"/>
+              </a:rPr>
+              <a:t>f</a:t>
+            </a:r>
             <a:r>
               <a:rPr lang="en-US" sz="1400">
                 <a:latin typeface="Calibri"/>
               </a:rPr>
               <a:t> </a:t>
             </a:r>
+          </a:p>
+          <a:p>
+            <a:pPr>
+              <a:buFont typeface="Arial"/>
+              <a:buAutoNum type="arabicPlain" startAt="1"/>
+              <a:buChar char="•"/>
+            </a:pPr>
+            <a:r>
+              <a:rPr lang="en-US" sz="1400">
+                <a:latin typeface="Calibri"/>
+              </a:rPr>
+              <a:t>sss</a:t>
+            </a:r>
             <a:r>
               <a:rPr lang="en-US" sz="1400">
                 <a:latin typeface="Calibri"/>
@@ -3253,101 +3400,23 @@
               </a:rPr>
               <a:t> </a:t>
             </a:r>
+            <a:r>
+              <a:rPr lang="en-US" sz="1400">
+                <a:latin typeface="Calibri"/>
+              </a:rPr>
+              <a:t> </a:t>
+            </a:r>
           </a:p>
           <a:p>
             <a:pPr>
-              <a:buAutoNum type="arabicPlain" startAt="1"/>
+              <a:buFont typeface="Arial"/>
+              <a:buChar char="•"/>
             </a:pPr>
             <a:r>
               <a:rPr lang="en-US" sz="1400">
                 <a:latin typeface="Calibri"/>
               </a:rPr>
               <a:t>q</a:t>
-            </a:r>
-            <a:r>
-              <a:rPr lang="en-US" sz="1400">
-                <a:latin typeface="Calibri"/>
-              </a:rPr>
-              <a:t> </a:t>
-            </a:r>
-          </a:p>
-          <a:p>
-            <a:pPr>
-              <a:buAutoNum type="arabicPlain" startAt="1"/>
-            </a:pPr>
-            <a:r>
-              <a:rPr lang="en-US" sz="1400">
-                <a:latin typeface="Calibri"/>
-              </a:rPr>
-              <a:t>w</a:t>
-            </a:r>
-            <a:r>
-              <a:rPr lang="en-US" sz="1400">
-                <a:latin typeface="Calibri"/>
-              </a:rPr>
-              <a:t> </a:t>
-            </a:r>
-          </a:p>
-          <a:p>
-            <a:pPr>
-              <a:buAutoNum type="arabicPlain" startAt="1"/>
-            </a:pPr>
-            <a:r>
-              <a:rPr lang="en-US" sz="1400">
-                <a:latin typeface="Calibri"/>
-              </a:rPr>
-              <a:t>e</a:t>
-            </a:r>
-            <a:r>
-              <a:rPr lang="en-US" sz="1400">
-                <a:latin typeface="Calibri"/>
-              </a:rPr>
-              <a:t> </a:t>
-            </a:r>
-          </a:p>
-          <a:p>
-            <a:pPr>
-              <a:buAutoNum type="arabicPlain" startAt="1"/>
-            </a:pPr>
-            <a:r>
-              <a:rPr lang="en-US" sz="1400">
-                <a:latin typeface="Calibri"/>
-              </a:rPr>
-              <a:t>r</a:t>
-            </a:r>
-            <a:r>
-              <a:rPr lang="en-US" sz="1400">
-                <a:latin typeface="Calibri"/>
-              </a:rPr>
-              <a:t> </a:t>
-            </a:r>
-          </a:p>
-          <a:p>
-            <a:pPr>
-              <a:buAutoNum type="arabicPlain" startAt="1"/>
-            </a:pPr>
-            <a:r>
-              <a:rPr lang="en-US" sz="1400">
-                <a:latin typeface="Calibri"/>
-              </a:rPr>
-              <a:t>a</a:t>
-            </a:r>
-            <a:r>
-              <a:rPr lang="en-US" sz="1400">
-                <a:latin typeface="Calibri"/>
-              </a:rPr>
-              <a:t> </a:t>
-            </a:r>
-          </a:p>
-          <a:p>
-            <a:pPr>
-              <a:buAutoNum type="arabicPlain" startAt="1"/>
-            </a:pPr>
-            <a:r>
-              <a:rPr lang="en-US" sz="1400">
-                <a:latin typeface="Calibri"/>
-              </a:rPr>
-              <a:t>s</a:t>
             </a:r>
             <a:r>
               <a:rPr lang="en-US" sz="1400">
@@ -3383,51 +3452,188 @@
           <a:chExt cx="0" cy="0"/>
         </a:xfrm>
       </p:grpSpPr>
-      <p:sp xmlns:r="http://schemas.openxmlformats.org/officeDocument/2006/relationships">
-        <p:nvSpPr>
-          <p:cNvPr id="2" name="Title 1"/>
-          <p:cNvSpPr>
-            <a:spLocks noGrp="1"/>
-          </p:cNvSpPr>
-          <p:nvPr>
-            <p:ph type="title"/>
-          </p:nvPr>
-        </p:nvSpPr>
-        <p:spPr/>
-        <p:txBody>
-          <a:bodyPr/>
-          <a:lstStyle/>
-          <a:p>
-            <a:r>
-              <a:rPr lang="en-US" smtClean="0"/>
-              <a:t>Click to edit Master title style</a:t>
-            </a:r>
-            <a:endParaRPr lang="en-US"/>
-          </a:p>
-        </p:txBody>
-      </p:sp>
-      <p:sp xmlns:r="http://schemas.openxmlformats.org/officeDocument/2006/relationships">
-        <p:nvSpPr>
-          <p:cNvPr id="3" name="Content Placeholder 2"/>
-          <p:cNvSpPr>
-            <a:spLocks noGrp="1"/>
-          </p:cNvSpPr>
-          <p:nvPr>
-            <p:ph idx="1"/>
-          </p:nvPr>
-        </p:nvSpPr>
-        <p:spPr/>
-        <p:txBody>
-          <a:bodyPr/>
-          <a:lstStyle/>
+      <p:sp>
+        <p:nvSpPr>
+          <p:cNvPr name="TextBox 2" id="2"/>
+          <p:cNvSpPr txBox="true"/>
+          <p:nvPr/>
+        </p:nvSpPr>
+        <p:spPr>
+          <a:xfrm>
+            <a:off x="254000" y="254000"/>
+            <a:ext cx="14986000" cy="8890000"/>
+          </a:xfrm>
+          <a:prstGeom prst="rect">
+            <a:avLst/>
+          </a:prstGeom>
+        </p:spPr>
+        <p:txBody>
+          <a:bodyPr anchor="t" rtlCol="false"/>
+          <a:lstStyle/>
+          <a:p>
+            <a:pPr algn="l">
+              <a:defRPr/>
+            </a:pPr>
+            <a:r>
+              <a:rPr lang="en-US"/>
+              <a:t/>
+            </a:r>
+            <a:endParaRPr lang="ru-RU"/>
+          </a:p>
           <a:p>
             <a:pPr>
+              <a:buFont typeface="Arial"/>
+              <a:buChar char="•"/>
+            </a:pPr>
+            <a:r>
+              <a:rPr lang="en-US" sz="1400">
+                <a:latin typeface="Calibri"/>
+              </a:rPr>
+              <a:t>sss</a:t>
+            </a:r>
+            <a:r>
+              <a:rPr lang="en-US" sz="1400">
+                <a:latin typeface="Calibri"/>
+              </a:rPr>
+              <a:t> </a:t>
+            </a:r>
+            <a:r>
+              <a:rPr lang="en-US" sz="1400">
+                <a:latin typeface="Calibri"/>
+              </a:rPr>
+              <a:t> </a:t>
+            </a:r>
+            <a:r>
+              <a:rPr lang="en-US" sz="1400">
+                <a:latin typeface="Calibri"/>
+              </a:rPr>
+              <a:t> </a:t>
+            </a:r>
+          </a:p>
+          <a:p>
+            <a:pPr>
+              <a:buFont typeface="Arial"/>
               <a:buAutoNum type="arabicPlain" startAt="1"/>
+              <a:buChar char="•"/>
             </a:pPr>
             <a:r>
               <a:rPr lang="en-US" sz="1400">
                 <a:latin typeface="Calibri"/>
               </a:rPr>
+              <a:t>q</a:t>
+            </a:r>
+            <a:r>
+              <a:rPr lang="en-US" sz="1400">
+                <a:latin typeface="Calibri"/>
+              </a:rPr>
+              <a:t> </a:t>
+            </a:r>
+          </a:p>
+          <a:p>
+            <a:pPr>
+              <a:buFont typeface="Arial"/>
+              <a:buAutoNum type="arabicPlain" startAt="1"/>
+              <a:buChar char="•"/>
+            </a:pPr>
+            <a:r>
+              <a:rPr lang="en-US" sz="1400">
+                <a:latin typeface="Calibri"/>
+              </a:rPr>
+              <a:t>w</a:t>
+            </a:r>
+            <a:r>
+              <a:rPr lang="en-US" sz="1400">
+                <a:latin typeface="Calibri"/>
+              </a:rPr>
+              <a:t> </a:t>
+            </a:r>
+          </a:p>
+          <a:p>
+            <a:pPr>
+              <a:buFont typeface="Arial"/>
+              <a:buAutoNum type="arabicPlain" startAt="1"/>
+              <a:buChar char="•"/>
+            </a:pPr>
+            <a:r>
+              <a:rPr lang="en-US" sz="1400">
+                <a:latin typeface="Calibri"/>
+              </a:rPr>
+              <a:t>e</a:t>
+            </a:r>
+            <a:r>
+              <a:rPr lang="en-US" sz="1400">
+                <a:latin typeface="Calibri"/>
+              </a:rPr>
+              <a:t> </a:t>
+            </a:r>
+          </a:p>
+          <a:p>
+            <a:pPr>
+              <a:buFont typeface="Arial"/>
+              <a:buAutoNum type="arabicPlain" startAt="1"/>
+              <a:buChar char="•"/>
+            </a:pPr>
+            <a:r>
+              <a:rPr lang="en-US" sz="1400">
+                <a:latin typeface="Calibri"/>
+              </a:rPr>
+              <a:t>r</a:t>
+            </a:r>
+            <a:r>
+              <a:rPr lang="en-US" sz="1400">
+                <a:latin typeface="Calibri"/>
+              </a:rPr>
+              <a:t> </a:t>
+            </a:r>
+          </a:p>
+          <a:p>
+            <a:pPr>
+              <a:buFont typeface="Arial"/>
+              <a:buAutoNum type="arabicPlain" startAt="1"/>
+              <a:buChar char="•"/>
+            </a:pPr>
+            <a:r>
+              <a:rPr lang="en-US" sz="1400">
+                <a:latin typeface="Calibri"/>
+              </a:rPr>
+              <a:t>a</a:t>
+            </a:r>
+            <a:r>
+              <a:rPr lang="en-US" sz="1400">
+                <a:latin typeface="Calibri"/>
+              </a:rPr>
+              <a:t> </a:t>
+            </a:r>
+          </a:p>
+          <a:p>
+            <a:pPr>
+              <a:buFont typeface="Arial"/>
+              <a:buAutoNum type="arabicPlain" startAt="1"/>
+              <a:buChar char="•"/>
+            </a:pPr>
+            <a:r>
+              <a:rPr lang="en-US" sz="1400">
+                <a:latin typeface="Calibri"/>
+              </a:rPr>
+              <a:t>s</a:t>
+            </a:r>
+            <a:r>
+              <a:rPr lang="en-US" sz="1400">
+                <a:latin typeface="Calibri"/>
+              </a:rPr>
+              <a:t> </a:t>
+            </a:r>
+          </a:p>
+          <a:p>
+            <a:pPr>
+              <a:buFont typeface="Arial"/>
+              <a:buAutoNum type="arabicPlain" startAt="1"/>
+              <a:buChar char="•"/>
+            </a:pPr>
+            <a:r>
+              <a:rPr lang="en-US" sz="1400">
+                <a:latin typeface="Calibri"/>
+              </a:rPr>
               <a:t>d</a:t>
             </a:r>
             <a:r>
@@ -3439,7 +3645,9 @@
           </a:p>
           <a:p>
             <a:pPr>
+              <a:buFont typeface="Arial"/>
               <a:buAutoNum type="arabicPlain" startAt="1"/>
+              <a:buChar char="•"/>
             </a:pPr>
             <a:r>
               <a:rPr lang="en-US" sz="1400">
@@ -3456,7 +3664,9 @@
           </a:p>
           <a:p>
             <a:pPr>
+              <a:buFont typeface="Arial"/>
               <a:buAutoNum type="arabicPlain" startAt="1"/>
+              <a:buChar char="•"/>
             </a:pPr>
             <a:r>
               <a:rPr lang="en-US" sz="1400">
@@ -3484,6 +3694,10 @@
             </a:r>
           </a:p>
           <a:p>
+            <a:pPr>
+              <a:buFont typeface="Arial"/>
+              <a:buChar char="•"/>
+            </a:pPr>
             <a:r>
               <a:rPr lang="en-US" sz="1400">
                 <a:latin typeface="Calibri"/>
@@ -3498,6 +3712,10 @@
             </a:r>
           </a:p>
           <a:p>
+            <a:pPr>
+              <a:buFont typeface="Arial"/>
+              <a:buChar char="•"/>
+            </a:pPr>
             <a:r>
               <a:rPr lang="en-US" sz="1400">
                 <a:latin typeface="Calibri"/>
@@ -3516,216 +3734,8 @@
               </a:rPr>
               <a:t> </a:t>
             </a:r>
-            <a:r>
-              <a:rPr lang="en-US" sz="1400">
-                <a:latin typeface="Calibri"/>
-              </a:rPr>
-              <a:t> </a:t>
-            </a:r>
-          </a:p>
-          <a:p>
-            <a:pPr>
-              <a:buAutoNum type="arabicPlain" startAt="1"/>
-            </a:pPr>
-            <a:r>
-              <a:rPr lang="en-US" sz="1400">
-                <a:latin typeface="Calibri"/>
-              </a:rPr>
-              <a:t>q</a:t>
-            </a:r>
-            <a:r>
-              <a:rPr lang="en-US" sz="1400">
-                <a:latin typeface="Calibri"/>
-              </a:rPr>
-              <a:t> </a:t>
-            </a:r>
-          </a:p>
-          <a:p>
-            <a:pPr>
-              <a:buAutoNum type="arabicPlain" startAt="1"/>
-            </a:pPr>
-            <a:r>
-              <a:rPr lang="en-US" sz="1400">
-                <a:latin typeface="Calibri"/>
-              </a:rPr>
-              <a:t>w</a:t>
-            </a:r>
-            <a:r>
-              <a:rPr lang="en-US" sz="1400">
-                <a:latin typeface="Calibri"/>
-              </a:rPr>
-              <a:t> </a:t>
-            </a:r>
-          </a:p>
-          <a:p>
-            <a:pPr>
-              <a:buAutoNum type="arabicPlain" startAt="1"/>
-            </a:pPr>
-            <a:r>
-              <a:rPr lang="en-US" sz="1400">
-                <a:latin typeface="Calibri"/>
-              </a:rPr>
-              <a:t>e</a:t>
-            </a:r>
-            <a:r>
-              <a:rPr lang="en-US" sz="1400">
-                <a:latin typeface="Calibri"/>
-              </a:rPr>
-              <a:t> </a:t>
-            </a:r>
-          </a:p>
-          <a:p>
-            <a:pPr>
-              <a:buAutoNum type="arabicPlain" startAt="1"/>
-            </a:pPr>
-            <a:r>
-              <a:rPr lang="en-US" sz="1400">
-                <a:latin typeface="Calibri"/>
-              </a:rPr>
-              <a:t>r</a:t>
-            </a:r>
-            <a:r>
-              <a:rPr lang="en-US" sz="1400">
-                <a:latin typeface="Calibri"/>
-              </a:rPr>
-              <a:t> </a:t>
-            </a:r>
-          </a:p>
-          <a:p>
-            <a:pPr>
-              <a:buAutoNum type="arabicPlain" startAt="1"/>
-            </a:pPr>
-            <a:r>
-              <a:rPr lang="en-US" sz="1400">
-                <a:latin typeface="Calibri"/>
-              </a:rPr>
-              <a:t>a</a:t>
-            </a:r>
-            <a:r>
-              <a:rPr lang="en-US" sz="1400">
-                <a:latin typeface="Calibri"/>
-              </a:rPr>
-              <a:t> </a:t>
-            </a:r>
-          </a:p>
-          <a:p>
-            <a:pPr>
-              <a:buAutoNum type="arabicPlain" startAt="1"/>
-            </a:pPr>
-            <a:r>
-              <a:rPr lang="en-US" sz="1400">
-                <a:latin typeface="Calibri"/>
-              </a:rPr>
-              <a:t>s</a:t>
-            </a:r>
-            <a:r>
-              <a:rPr lang="en-US" sz="1400">
-                <a:latin typeface="Calibri"/>
-              </a:rPr>
-              <a:t> </a:t>
-            </a:r>
-          </a:p>
-          <a:p>
-            <a:pPr>
-              <a:buAutoNum type="arabicPlain" startAt="1"/>
-            </a:pPr>
-            <a:r>
-              <a:rPr lang="en-US" sz="1400">
-                <a:latin typeface="Calibri"/>
-              </a:rPr>
-              <a:t>d</a:t>
-            </a:r>
-            <a:r>
-              <a:rPr lang="en-US" sz="1400">
-                <a:latin typeface="Calibri"/>
-              </a:rPr>
-              <a:t> </a:t>
-            </a:r>
-          </a:p>
-          <a:p>
-            <a:pPr>
-              <a:buAutoNum type="arabicPlain" startAt="1"/>
-            </a:pPr>
-            <a:r>
-              <a:rPr lang="en-US" sz="1400">
-                <a:latin typeface="Calibri"/>
-              </a:rPr>
-              <a:t>f</a:t>
-            </a:r>
-            <a:r>
-              <a:rPr lang="en-US" sz="1400">
-                <a:latin typeface="Calibri"/>
-              </a:rPr>
-              <a:t> </a:t>
-            </a:r>
-          </a:p>
-          <a:p>
-            <a:pPr>
-              <a:buAutoNum type="arabicPlain" startAt="1"/>
-            </a:pPr>
-            <a:r>
-              <a:rPr lang="en-US" sz="1400">
-                <a:latin typeface="Calibri"/>
-              </a:rPr>
-              <a:t>sss</a:t>
-            </a:r>
-            <a:r>
-              <a:rPr lang="en-US" sz="1400">
-                <a:latin typeface="Calibri"/>
-              </a:rPr>
-              <a:t> </a:t>
-            </a:r>
-            <a:r>
-              <a:rPr lang="en-US" sz="1400">
-                <a:latin typeface="Calibri"/>
-              </a:rPr>
-              <a:t> </a:t>
-            </a:r>
-            <a:r>
-              <a:rPr lang="en-US" sz="1400">
-                <a:latin typeface="Calibri"/>
-              </a:rPr>
-              <a:t> </a:t>
-            </a:r>
-          </a:p>
-          <a:p>
-            <a:r>
-              <a:rPr lang="en-US" sz="1400">
-                <a:latin typeface="Calibri"/>
-              </a:rPr>
-              <a:t>q</a:t>
-            </a:r>
-            <a:r>
-              <a:rPr lang="en-US" sz="1400">
-                <a:latin typeface="Calibri"/>
-              </a:rPr>
-              <a:t> </a:t>
-            </a:r>
-          </a:p>
-          <a:p>
-            <a:r>
-              <a:rPr lang="en-US" sz="1400">
-                <a:latin typeface="Calibri"/>
-              </a:rPr>
-              <a:t>sss</a:t>
-            </a:r>
-            <a:r>
-              <a:rPr lang="en-US" sz="1400">
-                <a:latin typeface="Calibri"/>
-              </a:rPr>
-              <a:t> </a:t>
-            </a:r>
-            <a:r>
-              <a:rPr lang="en-US" sz="1400">
-                <a:latin typeface="Calibri"/>
-              </a:rPr>
-              <a:t> </a:t>
-            </a:r>
-          </a:p>
-          <a:p>
-            <a:pPr>
-              <a:buNone/>
-            </a:pPr>
+          </a:p>
+          <a:p>
             <a:r>
               <a:rPr lang="en-US" sz="1400">
                 <a:latin typeface="Calibri"/>
@@ -3733,74 +3743,7 @@
               <a:t>Centered text</a:t>
             </a:r>
           </a:p>
-        </p:txBody>
-      </p:sp>
-    </p:spTree>
-  </p:cSld>
-  <p:clrMapOvr>
-    <a:masterClrMapping/>
-  </p:clrMapOvr>
-</p:sld>
-</file>
-
-<file path=ppt/slides/slide3.xml><?xml version="1.0" encoding="utf-8"?>
-<p:sld xmlns:p="http://schemas.openxmlformats.org/presentationml/2006/main" xmlns:a="http://schemas.openxmlformats.org/drawingml/2006/main">
-  <p:cSld>
-    <p:spTree>
-      <p:nvGrpSpPr>
-        <p:cNvPr id="1" name=""/>
-        <p:cNvGrpSpPr/>
-        <p:nvPr/>
-      </p:nvGrpSpPr>
-      <p:grpSpPr>
-        <a:xfrm>
-          <a:off x="0" y="0"/>
-          <a:ext cx="0" cy="0"/>
-          <a:chOff x="0" y="0"/>
-          <a:chExt cx="0" cy="0"/>
-        </a:xfrm>
-      </p:grpSpPr>
-      <p:sp xmlns:r="http://schemas.openxmlformats.org/officeDocument/2006/relationships">
-        <p:nvSpPr>
-          <p:cNvPr id="2" name="Title 1"/>
-          <p:cNvSpPr>
-            <a:spLocks noGrp="1"/>
-          </p:cNvSpPr>
-          <p:nvPr>
-            <p:ph type="title"/>
-          </p:nvPr>
-        </p:nvSpPr>
-        <p:spPr/>
-        <p:txBody>
-          <a:bodyPr/>
-          <a:lstStyle/>
-          <a:p>
-            <a:r>
-              <a:rPr lang="en-US" smtClean="0"/>
-              <a:t>Click to edit Master title style</a:t>
-            </a:r>
-            <a:endParaRPr lang="en-US"/>
-          </a:p>
-        </p:txBody>
-      </p:sp>
-      <p:sp xmlns:r="http://schemas.openxmlformats.org/officeDocument/2006/relationships">
-        <p:nvSpPr>
-          <p:cNvPr id="3" name="Content Placeholder 2"/>
-          <p:cNvSpPr>
-            <a:spLocks noGrp="1"/>
-          </p:cNvSpPr>
-          <p:nvPr>
-            <p:ph idx="1"/>
-          </p:nvPr>
-        </p:nvSpPr>
-        <p:spPr/>
-        <p:txBody>
-          <a:bodyPr/>
-          <a:lstStyle/>
-          <a:p>
-            <a:pPr>
-              <a:buNone/>
-            </a:pPr>
+          <a:p>
             <a:r>
               <a:rPr lang="en-US" sz="1400">
                 <a:latin typeface="Calibri"/>
@@ -3848,9 +3791,6 @@
             </a:r>
           </a:p>
           <a:p>
-            <a:pPr>
-              <a:buNone/>
-            </a:pPr>
             <a:r>
               <a:rPr lang="en-US" sz="1400">
                 <a:latin typeface="Calibri"/>
@@ -3868,990 +3808,6 @@
                 <a:latin typeface="Calibri"/>
               </a:rPr>
               <a:t> </a:t>
-            </a:r>
-          </a:p>
-        </p:txBody>
-      </p:sp>
-    </p:spTree>
-  </p:cSld>
-  <p:clrMapOvr>
-    <a:masterClrMapping/>
-  </p:clrMapOvr>
-</p:sld>
-</file>
-
-<file path=ppt/slides/slide4.xml><?xml version="1.0" encoding="utf-8"?>
-<p:sld xmlns:p="http://schemas.openxmlformats.org/presentationml/2006/main" xmlns:a="http://schemas.openxmlformats.org/drawingml/2006/main">
-  <p:cSld>
-    <p:spTree>
-      <p:nvGrpSpPr>
-        <p:cNvPr id="1" name=""/>
-        <p:cNvGrpSpPr/>
-        <p:nvPr/>
-      </p:nvGrpSpPr>
-      <p:grpSpPr>
-        <a:xfrm>
-          <a:off x="0" y="0"/>
-          <a:ext cx="0" cy="0"/>
-          <a:chOff x="0" y="0"/>
-          <a:chExt cx="0" cy="0"/>
-        </a:xfrm>
-      </p:grpSpPr>
-      <p:sp xmlns:r="http://schemas.openxmlformats.org/officeDocument/2006/relationships">
-        <p:nvSpPr>
-          <p:cNvPr id="2" name="Title 1"/>
-          <p:cNvSpPr>
-            <a:spLocks noGrp="1"/>
-          </p:cNvSpPr>
-          <p:nvPr>
-            <p:ph type="title"/>
-          </p:nvPr>
-        </p:nvSpPr>
-        <p:spPr/>
-        <p:txBody>
-          <a:bodyPr/>
-          <a:lstStyle/>
-          <a:p>
-            <a:r>
-              <a:rPr lang="en-US" smtClean="0"/>
-              <a:t>Click to edit Master title style</a:t>
-            </a:r>
-            <a:endParaRPr lang="en-US"/>
-          </a:p>
-        </p:txBody>
-      </p:sp>
-      <p:sp xmlns:r="http://schemas.openxmlformats.org/officeDocument/2006/relationships">
-        <p:nvSpPr>
-          <p:cNvPr id="3" name="Content Placeholder 2"/>
-          <p:cNvSpPr>
-            <a:spLocks noGrp="1"/>
-          </p:cNvSpPr>
-          <p:nvPr>
-            <p:ph idx="1"/>
-          </p:nvPr>
-        </p:nvSpPr>
-        <p:spPr/>
-        <p:txBody>
-          <a:bodyPr/>
-          <a:lstStyle/>
-          <a:p>
-            <a:pPr>
-              <a:buNone/>
-            </a:pPr>
-            <a:r>
-              <a:rPr lang="en-US" sz="1400">
-                <a:latin typeface="Calibri"/>
-              </a:rPr>
-              <a:t>Hello mate! Hello mate! Hello mate! Hello mate! Hello mate! Hello mate! Hello mate! Hello mate! Hello mate!</a:t>
-            </a:r>
-            <a:r>
-              <a:rPr lang="en-US" sz="1400">
-                <a:latin typeface="Calibri"/>
-              </a:rPr>
-              <a:t> </a:t>
-            </a:r>
-          </a:p>
-          <a:p>
-            <a:pPr>
-              <a:buNone/>
-            </a:pPr>
-            <a:r>
-              <a:rPr lang="en-US" sz="1400">
-                <a:latin typeface="Calibri"/>
-              </a:rPr>
-              <a:t>This is </a:t>
-            </a:r>
-            <a:r>
-              <a:rPr lang="en-US" sz="1400" b="true">
-                <a:latin typeface="Calibri"/>
-              </a:rPr>
-              <a:t>bold</a:t>
-            </a:r>
-            <a:r>
-              <a:rPr lang="en-US" sz="1400">
-                <a:latin typeface="Calibri"/>
-              </a:rPr>
-              <a:t> and</a:t>
-            </a:r>
-            <a:r>
-              <a:rPr lang="en-US" sz="1400" u="sng">
-                <a:latin typeface="Calibri"/>
-              </a:rPr>
-              <a:t> underscore</a:t>
-            </a:r>
-            <a:r>
-              <a:rPr lang="en-US" sz="1400">
-                <a:latin typeface="Calibri"/>
-              </a:rPr>
-              <a:t> and</a:t>
-            </a:r>
-            <a:r>
-              <a:rPr lang="en-US" sz="1400" b="true" u="sng">
-                <a:latin typeface="Calibri"/>
-              </a:rPr>
-              <a:t> both</a:t>
-            </a:r>
-            <a:r>
-              <a:rPr lang="en-US" sz="1400">
-                <a:latin typeface="Calibri"/>
-              </a:rPr>
-              <a:t> and </a:t>
-            </a:r>
-            <a:r>
-              <a:rPr lang="en-US" sz="1400" strike="sngStrike">
-                <a:latin typeface="Calibri"/>
-              </a:rPr>
-              <a:t>not true</a:t>
-            </a:r>
-            <a:r>
-              <a:rPr lang="en-US" sz="1400">
-                <a:latin typeface="Calibri"/>
-              </a:rPr>
-              <a:t> false PowerPoint documents are made up of a tree of records. A record may contain either other records (in which case it is a Container), or data (in which case it's an Atom). A record can't hold both. PowerPoint documents don't have one overall container record. Instead, there are a number of different container records to be found at the top level. Any numbers or strings stored in the records are always stored in Little Endian format (least important bytes first). This is the case no matter what platform the file was written on - be that a Little Endian or a Big Endian system. PowerPoint may have Escher (DDF) records embedded in it. These are always held as the children of a PPDrawing record (record type 1036). Escher records have the same format as PowerPoint records. </a:t>
-            </a:r>
-            <a:r>
-              <a:rPr lang="en-US" sz="1400">
-                <a:latin typeface="Calibri"/>
-              </a:rPr>
-              <a:t> </a:t>
-            </a:r>
-          </a:p>
-          <a:p>
-            <a:pPr>
-              <a:buNone/>
-            </a:pPr>
-            <a:r>
-              <a:rPr lang="en-US" sz="1400">
-                <a:latin typeface="Calibri"/>
-              </a:rPr>
-              <a:t> </a:t>
-            </a:r>
-            <a:r>
-              <a:rPr lang="en-US" sz="1400">
-                <a:latin typeface="Calibri"/>
-              </a:rPr>
-              <a:t> </a:t>
-            </a:r>
-            <a:r>
-              <a:rPr lang="en-US" sz="1400">
-                <a:latin typeface="Calibri"/>
-              </a:rPr>
-              <a:t> </a:t>
-            </a:r>
-          </a:p>
-          <a:p>
-            <a:pPr>
-              <a:buNone/>
-            </a:pPr>
-            <a:r>
-              <a:rPr lang="en-US" sz="1400">
-                <a:latin typeface="Calibri"/>
-              </a:rPr>
-              <a:t>Testing list</a:t>
-            </a:r>
-            <a:r>
-              <a:rPr lang="en-US" sz="1400">
-                <a:latin typeface="Calibri"/>
-              </a:rPr>
-              <a:t> </a:t>
-            </a:r>
-          </a:p>
-          <a:p>
-            <a:pPr>
-              <a:buNone/>
-            </a:pPr>
-            <a:r>
-              <a:rPr lang="en-US" sz="1400">
-                <a:latin typeface="Calibri"/>
-              </a:rPr>
-              <a:t> </a:t>
-            </a:r>
-            <a:r>
-              <a:rPr lang="en-US" sz="1400">
-                <a:latin typeface="Calibri"/>
-              </a:rPr>
-              <a:t> </a:t>
-            </a:r>
-            <a:r>
-              <a:rPr lang="en-US" sz="1400">
-                <a:latin typeface="Calibri"/>
-              </a:rPr>
-              <a:t> </a:t>
-            </a:r>
-            <a:r>
-              <a:rPr lang="en-US" sz="1400">
-                <a:latin typeface="Calibri"/>
-              </a:rPr>
-              <a:t> </a:t>
-            </a:r>
-          </a:p>
-          <a:p>
-            <a:pPr>
-              <a:buAutoNum type="arabicPlain" startAt="1"/>
-            </a:pPr>
-            <a:r>
-              <a:rPr lang="en-US" sz="1400">
-                <a:latin typeface="Calibri"/>
-              </a:rPr>
-              <a:t>q</a:t>
-            </a:r>
-            <a:r>
-              <a:rPr lang="en-US" sz="1400">
-                <a:latin typeface="Calibri"/>
-              </a:rPr>
-              <a:t> </a:t>
-            </a:r>
-          </a:p>
-          <a:p>
-            <a:pPr>
-              <a:buAutoNum type="arabicPlain" startAt="1"/>
-            </a:pPr>
-            <a:r>
-              <a:rPr lang="en-US" sz="1400">
-                <a:latin typeface="Calibri"/>
-              </a:rPr>
-              <a:t>w</a:t>
-            </a:r>
-            <a:r>
-              <a:rPr lang="en-US" sz="1400">
-                <a:latin typeface="Calibri"/>
-              </a:rPr>
-              <a:t> </a:t>
-            </a:r>
-          </a:p>
-          <a:p>
-            <a:pPr>
-              <a:buAutoNum type="arabicPlain" startAt="1"/>
-            </a:pPr>
-            <a:r>
-              <a:rPr lang="en-US" sz="1400">
-                <a:latin typeface="Calibri"/>
-              </a:rPr>
-              <a:t>e</a:t>
-            </a:r>
-            <a:r>
-              <a:rPr lang="en-US" sz="1400">
-                <a:latin typeface="Calibri"/>
-              </a:rPr>
-              <a:t> </a:t>
-            </a:r>
-          </a:p>
-          <a:p>
-            <a:pPr>
-              <a:buAutoNum type="arabicPlain" startAt="1"/>
-            </a:pPr>
-            <a:r>
-              <a:rPr lang="en-US" sz="1400">
-                <a:latin typeface="Calibri"/>
-              </a:rPr>
-              <a:t>r</a:t>
-            </a:r>
-            <a:r>
-              <a:rPr lang="en-US" sz="1400">
-                <a:latin typeface="Calibri"/>
-              </a:rPr>
-              <a:t> </a:t>
-            </a:r>
-          </a:p>
-          <a:p>
-            <a:pPr>
-              <a:buAutoNum type="arabicPlain" startAt="1"/>
-            </a:pPr>
-            <a:r>
-              <a:rPr lang="en-US" sz="1400">
-                <a:latin typeface="Calibri"/>
-              </a:rPr>
-              <a:t>a</a:t>
-            </a:r>
-            <a:r>
-              <a:rPr lang="en-US" sz="1400">
-                <a:latin typeface="Calibri"/>
-              </a:rPr>
-              <a:t> </a:t>
-            </a:r>
-          </a:p>
-          <a:p>
-            <a:pPr>
-              <a:buAutoNum type="arabicPlain" startAt="1"/>
-            </a:pPr>
-            <a:r>
-              <a:rPr lang="en-US" sz="1400">
-                <a:latin typeface="Calibri"/>
-              </a:rPr>
-              <a:t>s</a:t>
-            </a:r>
-            <a:r>
-              <a:rPr lang="en-US" sz="1400">
-                <a:latin typeface="Calibri"/>
-              </a:rPr>
-              <a:t> </a:t>
-            </a:r>
-          </a:p>
-        </p:txBody>
-      </p:sp>
-    </p:spTree>
-  </p:cSld>
-  <p:clrMapOvr>
-    <a:masterClrMapping/>
-  </p:clrMapOvr>
-</p:sld>
-</file>
-
-<file path=ppt/slides/slide5.xml><?xml version="1.0" encoding="utf-8"?>
-<p:sld xmlns:p="http://schemas.openxmlformats.org/presentationml/2006/main" xmlns:a="http://schemas.openxmlformats.org/drawingml/2006/main">
-  <p:cSld>
-    <p:spTree>
-      <p:nvGrpSpPr>
-        <p:cNvPr id="1" name=""/>
-        <p:cNvGrpSpPr/>
-        <p:nvPr/>
-      </p:nvGrpSpPr>
-      <p:grpSpPr>
-        <a:xfrm>
-          <a:off x="0" y="0"/>
-          <a:ext cx="0" cy="0"/>
-          <a:chOff x="0" y="0"/>
-          <a:chExt cx="0" cy="0"/>
-        </a:xfrm>
-      </p:grpSpPr>
-      <p:sp xmlns:r="http://schemas.openxmlformats.org/officeDocument/2006/relationships">
-        <p:nvSpPr>
-          <p:cNvPr id="2" name="Title 1"/>
-          <p:cNvSpPr>
-            <a:spLocks noGrp="1"/>
-          </p:cNvSpPr>
-          <p:nvPr>
-            <p:ph type="title"/>
-          </p:nvPr>
-        </p:nvSpPr>
-        <p:spPr/>
-        <p:txBody>
-          <a:bodyPr/>
-          <a:lstStyle/>
-          <a:p>
-            <a:r>
-              <a:rPr lang="en-US" smtClean="0"/>
-              <a:t>Click to edit Master title style</a:t>
-            </a:r>
-            <a:endParaRPr lang="en-US"/>
-          </a:p>
-        </p:txBody>
-      </p:sp>
-      <p:sp xmlns:r="http://schemas.openxmlformats.org/officeDocument/2006/relationships">
-        <p:nvSpPr>
-          <p:cNvPr id="3" name="Content Placeholder 2"/>
-          <p:cNvSpPr>
-            <a:spLocks noGrp="1"/>
-          </p:cNvSpPr>
-          <p:nvPr>
-            <p:ph idx="1"/>
-          </p:nvPr>
-        </p:nvSpPr>
-        <p:spPr/>
-        <p:txBody>
-          <a:bodyPr/>
-          <a:lstStyle/>
-          <a:p>
-            <a:pPr>
-              <a:buAutoNum type="arabicPlain" startAt="1"/>
-            </a:pPr>
-            <a:r>
-              <a:rPr lang="en-US" sz="1400">
-                <a:latin typeface="Calibri"/>
-              </a:rPr>
-              <a:t>d</a:t>
-            </a:r>
-            <a:r>
-              <a:rPr lang="en-US" sz="1400">
-                <a:latin typeface="Calibri"/>
-              </a:rPr>
-              <a:t> </a:t>
-            </a:r>
-          </a:p>
-          <a:p>
-            <a:pPr>
-              <a:buAutoNum type="arabicPlain" startAt="1"/>
-            </a:pPr>
-            <a:r>
-              <a:rPr lang="en-US" sz="1400">
-                <a:latin typeface="Calibri"/>
-              </a:rPr>
-              <a:t>f</a:t>
-            </a:r>
-            <a:r>
-              <a:rPr lang="en-US" sz="1400">
-                <a:latin typeface="Calibri"/>
-              </a:rPr>
-              <a:t> </a:t>
-            </a:r>
-          </a:p>
-          <a:p>
-            <a:pPr>
-              <a:buAutoNum type="arabicPlain" startAt="1"/>
-            </a:pPr>
-            <a:r>
-              <a:rPr lang="en-US" sz="1400">
-                <a:latin typeface="Calibri"/>
-              </a:rPr>
-              <a:t>sss</a:t>
-            </a:r>
-            <a:r>
-              <a:rPr lang="en-US" sz="1400">
-                <a:latin typeface="Calibri"/>
-              </a:rPr>
-              <a:t> </a:t>
-            </a:r>
-            <a:r>
-              <a:rPr lang="en-US" sz="1400">
-                <a:latin typeface="Calibri"/>
-              </a:rPr>
-              <a:t> </a:t>
-            </a:r>
-            <a:r>
-              <a:rPr lang="en-US" sz="1400">
-                <a:latin typeface="Calibri"/>
-              </a:rPr>
-              <a:t> </a:t>
-            </a:r>
-          </a:p>
-          <a:p>
-            <a:r>
-              <a:rPr lang="en-US" sz="1400">
-                <a:latin typeface="Calibri"/>
-              </a:rPr>
-              <a:t>q</a:t>
-            </a:r>
-            <a:r>
-              <a:rPr lang="en-US" sz="1400">
-                <a:latin typeface="Calibri"/>
-              </a:rPr>
-              <a:t> </a:t>
-            </a:r>
-          </a:p>
-          <a:p>
-            <a:r>
-              <a:rPr lang="en-US" sz="1400">
-                <a:latin typeface="Calibri"/>
-              </a:rPr>
-              <a:t>sss</a:t>
-            </a:r>
-            <a:r>
-              <a:rPr lang="en-US" sz="1400">
-                <a:latin typeface="Calibri"/>
-              </a:rPr>
-              <a:t> </a:t>
-            </a:r>
-            <a:r>
-              <a:rPr lang="en-US" sz="1400">
-                <a:latin typeface="Calibri"/>
-              </a:rPr>
-              <a:t> </a:t>
-            </a:r>
-            <a:r>
-              <a:rPr lang="en-US" sz="1400">
-                <a:latin typeface="Calibri"/>
-              </a:rPr>
-              <a:t> </a:t>
-            </a:r>
-          </a:p>
-          <a:p>
-            <a:pPr>
-              <a:buAutoNum type="arabicPlain" startAt="1"/>
-            </a:pPr>
-            <a:r>
-              <a:rPr lang="en-US" sz="1400">
-                <a:latin typeface="Calibri"/>
-              </a:rPr>
-              <a:t>q</a:t>
-            </a:r>
-            <a:r>
-              <a:rPr lang="en-US" sz="1400">
-                <a:latin typeface="Calibri"/>
-              </a:rPr>
-              <a:t> </a:t>
-            </a:r>
-          </a:p>
-          <a:p>
-            <a:pPr>
-              <a:buAutoNum type="arabicPlain" startAt="1"/>
-            </a:pPr>
-            <a:r>
-              <a:rPr lang="en-US" sz="1400">
-                <a:latin typeface="Calibri"/>
-              </a:rPr>
-              <a:t>w</a:t>
-            </a:r>
-            <a:r>
-              <a:rPr lang="en-US" sz="1400">
-                <a:latin typeface="Calibri"/>
-              </a:rPr>
-              <a:t> </a:t>
-            </a:r>
-          </a:p>
-          <a:p>
-            <a:pPr>
-              <a:buAutoNum type="arabicPlain" startAt="1"/>
-            </a:pPr>
-            <a:r>
-              <a:rPr lang="en-US" sz="1400">
-                <a:latin typeface="Calibri"/>
-              </a:rPr>
-              <a:t>e</a:t>
-            </a:r>
-            <a:r>
-              <a:rPr lang="en-US" sz="1400">
-                <a:latin typeface="Calibri"/>
-              </a:rPr>
-              <a:t> </a:t>
-            </a:r>
-          </a:p>
-          <a:p>
-            <a:pPr>
-              <a:buAutoNum type="arabicPlain" startAt="1"/>
-            </a:pPr>
-            <a:r>
-              <a:rPr lang="en-US" sz="1400">
-                <a:latin typeface="Calibri"/>
-              </a:rPr>
-              <a:t>r</a:t>
-            </a:r>
-            <a:r>
-              <a:rPr lang="en-US" sz="1400">
-                <a:latin typeface="Calibri"/>
-              </a:rPr>
-              <a:t> </a:t>
-            </a:r>
-          </a:p>
-          <a:p>
-            <a:pPr>
-              <a:buAutoNum type="arabicPlain" startAt="1"/>
-            </a:pPr>
-            <a:r>
-              <a:rPr lang="en-US" sz="1400">
-                <a:latin typeface="Calibri"/>
-              </a:rPr>
-              <a:t>a</a:t>
-            </a:r>
-            <a:r>
-              <a:rPr lang="en-US" sz="1400">
-                <a:latin typeface="Calibri"/>
-              </a:rPr>
-              <a:t> </a:t>
-            </a:r>
-          </a:p>
-          <a:p>
-            <a:pPr>
-              <a:buAutoNum type="arabicPlain" startAt="1"/>
-            </a:pPr>
-            <a:r>
-              <a:rPr lang="en-US" sz="1400">
-                <a:latin typeface="Calibri"/>
-              </a:rPr>
-              <a:t>s</a:t>
-            </a:r>
-            <a:r>
-              <a:rPr lang="en-US" sz="1400">
-                <a:latin typeface="Calibri"/>
-              </a:rPr>
-              <a:t> </a:t>
-            </a:r>
-          </a:p>
-          <a:p>
-            <a:pPr>
-              <a:buAutoNum type="arabicPlain" startAt="1"/>
-            </a:pPr>
-            <a:r>
-              <a:rPr lang="en-US" sz="1400">
-                <a:latin typeface="Calibri"/>
-              </a:rPr>
-              <a:t>d</a:t>
-            </a:r>
-            <a:r>
-              <a:rPr lang="en-US" sz="1400">
-                <a:latin typeface="Calibri"/>
-              </a:rPr>
-              <a:t> </a:t>
-            </a:r>
-          </a:p>
-          <a:p>
-            <a:pPr>
-              <a:buAutoNum type="arabicPlain" startAt="1"/>
-            </a:pPr>
-            <a:r>
-              <a:rPr lang="en-US" sz="1400">
-                <a:latin typeface="Calibri"/>
-              </a:rPr>
-              <a:t>f</a:t>
-            </a:r>
-            <a:r>
-              <a:rPr lang="en-US" sz="1400">
-                <a:latin typeface="Calibri"/>
-              </a:rPr>
-              <a:t> </a:t>
-            </a:r>
-          </a:p>
-          <a:p>
-            <a:pPr>
-              <a:buAutoNum type="arabicPlain" startAt="1"/>
-            </a:pPr>
-            <a:r>
-              <a:rPr lang="en-US" sz="1400">
-                <a:latin typeface="Calibri"/>
-              </a:rPr>
-              <a:t>sss</a:t>
-            </a:r>
-            <a:r>
-              <a:rPr lang="en-US" sz="1400">
-                <a:latin typeface="Calibri"/>
-              </a:rPr>
-              <a:t> </a:t>
-            </a:r>
-            <a:r>
-              <a:rPr lang="en-US" sz="1400">
-                <a:latin typeface="Calibri"/>
-              </a:rPr>
-              <a:t> </a:t>
-            </a:r>
-            <a:r>
-              <a:rPr lang="en-US" sz="1400">
-                <a:latin typeface="Calibri"/>
-              </a:rPr>
-              <a:t> </a:t>
-            </a:r>
-          </a:p>
-          <a:p>
-            <a:r>
-              <a:rPr lang="en-US" sz="1400">
-                <a:latin typeface="Calibri"/>
-              </a:rPr>
-              <a:t>q</a:t>
-            </a:r>
-            <a:r>
-              <a:rPr lang="en-US" sz="1400">
-                <a:latin typeface="Calibri"/>
-              </a:rPr>
-              <a:t> </a:t>
-            </a:r>
-          </a:p>
-          <a:p>
-            <a:r>
-              <a:rPr lang="en-US" sz="1400">
-                <a:latin typeface="Calibri"/>
-              </a:rPr>
-              <a:t>sss</a:t>
-            </a:r>
-            <a:r>
-              <a:rPr lang="en-US" sz="1400">
-                <a:latin typeface="Calibri"/>
-              </a:rPr>
-              <a:t> </a:t>
-            </a:r>
-            <a:r>
-              <a:rPr lang="en-US" sz="1400">
-                <a:latin typeface="Calibri"/>
-              </a:rPr>
-              <a:t> </a:t>
-            </a:r>
-          </a:p>
-          <a:p>
-            <a:pPr>
-              <a:buNone/>
-            </a:pPr>
-            <a:r>
-              <a:rPr lang="en-US" sz="1400">
-                <a:latin typeface="Calibri"/>
-              </a:rPr>
-              <a:t>Centered text</a:t>
-            </a:r>
-          </a:p>
-        </p:txBody>
-      </p:sp>
-    </p:spTree>
-  </p:cSld>
-  <p:clrMapOvr>
-    <a:masterClrMapping/>
-  </p:clrMapOvr>
-</p:sld>
-</file>
-
-<file path=ppt/slides/slide6.xml><?xml version="1.0" encoding="utf-8"?>
-<p:sld xmlns:p="http://schemas.openxmlformats.org/presentationml/2006/main" xmlns:a="http://schemas.openxmlformats.org/drawingml/2006/main">
-  <p:cSld>
-    <p:spTree>
-      <p:nvGrpSpPr>
-        <p:cNvPr id="1" name=""/>
-        <p:cNvGrpSpPr/>
-        <p:nvPr/>
-      </p:nvGrpSpPr>
-      <p:grpSpPr>
-        <a:xfrm>
-          <a:off x="0" y="0"/>
-          <a:ext cx="0" cy="0"/>
-          <a:chOff x="0" y="0"/>
-          <a:chExt cx="0" cy="0"/>
-        </a:xfrm>
-      </p:grpSpPr>
-      <p:sp xmlns:r="http://schemas.openxmlformats.org/officeDocument/2006/relationships">
-        <p:nvSpPr>
-          <p:cNvPr id="2" name="Title 1"/>
-          <p:cNvSpPr>
-            <a:spLocks noGrp="1"/>
-          </p:cNvSpPr>
-          <p:nvPr>
-            <p:ph type="title"/>
-          </p:nvPr>
-        </p:nvSpPr>
-        <p:spPr/>
-        <p:txBody>
-          <a:bodyPr/>
-          <a:lstStyle/>
-          <a:p>
-            <a:r>
-              <a:rPr lang="en-US" smtClean="0"/>
-              <a:t>Click to edit Master title style</a:t>
-            </a:r>
-            <a:endParaRPr lang="en-US"/>
-          </a:p>
-        </p:txBody>
-      </p:sp>
-      <p:sp xmlns:r="http://schemas.openxmlformats.org/officeDocument/2006/relationships">
-        <p:nvSpPr>
-          <p:cNvPr id="3" name="Content Placeholder 2"/>
-          <p:cNvSpPr>
-            <a:spLocks noGrp="1"/>
-          </p:cNvSpPr>
-          <p:nvPr>
-            <p:ph idx="1"/>
-          </p:nvPr>
-        </p:nvSpPr>
-        <p:spPr/>
-        <p:txBody>
-          <a:bodyPr/>
-          <a:lstStyle/>
-          <a:p>
-            <a:pPr>
-              <a:buNone/>
-            </a:pPr>
-            <a:r>
-              <a:rPr lang="en-US" sz="1400">
-                <a:latin typeface="Calibri"/>
-              </a:rPr>
-              <a:t>Color </a:t>
-            </a:r>
-            <a:r>
-              <a:rPr lang="en-US" sz="1400">
-                <a:solidFill>
-                  <a:srgbClr val="E60000"/>
-                </a:solidFill>
-                <a:latin typeface="Calibri"/>
-              </a:rPr>
-              <a:t>red</a:t>
-            </a:r>
-            <a:r>
-              <a:rPr lang="en-US" sz="1400">
-                <a:latin typeface="Calibri"/>
-              </a:rPr>
-              <a:t>,</a:t>
-            </a:r>
-            <a:r>
-              <a:rPr lang="en-US" sz="1400">
-                <a:solidFill>
-                  <a:srgbClr val="0066CC"/>
-                </a:solidFill>
-                <a:latin typeface="Calibri"/>
-              </a:rPr>
-              <a:t> blue</a:t>
-            </a:r>
-            <a:r>
-              <a:rPr lang="en-US" sz="1400">
-                <a:latin typeface="Calibri"/>
-              </a:rPr>
-              <a:t>, </a:t>
-            </a:r>
-            <a:r>
-              <a:rPr lang="en-US" sz="1400">
-                <a:solidFill>
-                  <a:srgbClr val="EBD6FF"/>
-                </a:solidFill>
-                <a:latin typeface="Calibri"/>
-              </a:rPr>
-              <a:t>strange</a:t>
-            </a:r>
-          </a:p>
-          <a:p>
-            <a:pPr>
-              <a:buNone/>
-            </a:pPr>
-            <a:r>
-              <a:rPr lang="en-US" sz="1400">
-                <a:latin typeface="Calibri"/>
-              </a:rPr>
-              <a:t> </a:t>
-            </a:r>
-            <a:r>
-              <a:rPr lang="en-US" sz="1400">
-                <a:latin typeface="Calibri"/>
-              </a:rPr>
-              <a:t>And highlight</a:t>
-            </a:r>
-            <a:r>
-              <a:rPr lang="en-US" sz="1400">
-                <a:latin typeface="Calibri"/>
-              </a:rPr>
-              <a:t> </a:t>
-            </a:r>
-          </a:p>
-        </p:txBody>
-      </p:sp>
-    </p:spTree>
-  </p:cSld>
-  <p:clrMapOvr>
-    <a:masterClrMapping/>
-  </p:clrMapOvr>
-</p:sld>
-</file>
-
-<file path=ppt/slides/slide7.xml><?xml version="1.0" encoding="utf-8"?>
-<p:sld xmlns:p="http://schemas.openxmlformats.org/presentationml/2006/main" xmlns:a="http://schemas.openxmlformats.org/drawingml/2006/main">
-  <p:cSld>
-    <p:spTree>
-      <p:nvGrpSpPr>
-        <p:cNvPr id="1" name=""/>
-        <p:cNvGrpSpPr/>
-        <p:nvPr/>
-      </p:nvGrpSpPr>
-      <p:grpSpPr>
-        <a:xfrm>
-          <a:off x="0" y="0"/>
-          <a:ext cx="0" cy="0"/>
-          <a:chOff x="0" y="0"/>
-          <a:chExt cx="0" cy="0"/>
-        </a:xfrm>
-      </p:grpSpPr>
-      <p:sp xmlns:r="http://schemas.openxmlformats.org/officeDocument/2006/relationships">
-        <p:nvSpPr>
-          <p:cNvPr id="2" name="Title 1"/>
-          <p:cNvSpPr>
-            <a:spLocks noGrp="1"/>
-          </p:cNvSpPr>
-          <p:nvPr>
-            <p:ph type="title"/>
-          </p:nvPr>
-        </p:nvSpPr>
-        <p:spPr/>
-        <p:txBody>
-          <a:bodyPr/>
-          <a:lstStyle/>
-          <a:p>
-            <a:r>
-              <a:rPr lang="en-US" smtClean="0"/>
-              <a:t>Click to edit Master title style</a:t>
-            </a:r>
-            <a:endParaRPr lang="en-US"/>
-          </a:p>
-        </p:txBody>
-      </p:sp>
-      <p:sp xmlns:r="http://schemas.openxmlformats.org/officeDocument/2006/relationships">
-        <p:nvSpPr>
-          <p:cNvPr id="3" name="Content Placeholder 2"/>
-          <p:cNvSpPr>
-            <a:spLocks noGrp="1"/>
-          </p:cNvSpPr>
-          <p:nvPr>
-            <p:ph idx="1"/>
-          </p:nvPr>
-        </p:nvSpPr>
-        <p:spPr/>
-        <p:txBody>
-          <a:bodyPr/>
-          <a:lstStyle/>
-          <a:p>
-            <a:pPr>
-              <a:buNone/>
-            </a:pPr>
-            <a:r>
-              <a:rPr lang="en-US" sz="1400" b="true" u="sng">
-                <a:latin typeface="Calibri"/>
-              </a:rPr>
-              <a:t> both</a:t>
-            </a:r>
-          </a:p>
-        </p:txBody>
-      </p:sp>
-    </p:spTree>
-  </p:cSld>
-  <p:clrMapOvr>
-    <a:masterClrMapping/>
-  </p:clrMapOvr>
-</p:sld>
-</file>
-
-<file path=ppt/slides/slide8.xml><?xml version="1.0" encoding="utf-8"?>
-<p:sld xmlns:p="http://schemas.openxmlformats.org/presentationml/2006/main" xmlns:a="http://schemas.openxmlformats.org/drawingml/2006/main">
-  <p:cSld>
-    <p:spTree>
-      <p:nvGrpSpPr>
-        <p:cNvPr id="1" name=""/>
-        <p:cNvGrpSpPr/>
-        <p:nvPr/>
-      </p:nvGrpSpPr>
-      <p:grpSpPr>
-        <a:xfrm>
-          <a:off x="0" y="0"/>
-          <a:ext cx="0" cy="0"/>
-          <a:chOff x="0" y="0"/>
-          <a:chExt cx="0" cy="0"/>
-        </a:xfrm>
-      </p:grpSpPr>
-      <p:sp xmlns:r="http://schemas.openxmlformats.org/officeDocument/2006/relationships">
-        <p:nvSpPr>
-          <p:cNvPr id="2" name="Title 1"/>
-          <p:cNvSpPr>
-            <a:spLocks noGrp="1"/>
-          </p:cNvSpPr>
-          <p:nvPr>
-            <p:ph type="title"/>
-          </p:nvPr>
-        </p:nvSpPr>
-        <p:spPr/>
-        <p:txBody>
-          <a:bodyPr/>
-          <a:lstStyle/>
-          <a:p>
-            <a:r>
-              <a:rPr lang="en-US" smtClean="0"/>
-              <a:t>Click to edit Master title style</a:t>
-            </a:r>
-            <a:endParaRPr lang="en-US"/>
-          </a:p>
-        </p:txBody>
-      </p:sp>
-      <p:sp xmlns:r="http://schemas.openxmlformats.org/officeDocument/2006/relationships">
-        <p:nvSpPr>
-          <p:cNvPr id="3" name="Content Placeholder 2"/>
-          <p:cNvSpPr>
-            <a:spLocks noGrp="1"/>
-          </p:cNvSpPr>
-          <p:nvPr>
-            <p:ph idx="1"/>
-          </p:nvPr>
-        </p:nvSpPr>
-        <p:spPr/>
-        <p:txBody>
-          <a:bodyPr/>
-          <a:lstStyle/>
-          <a:p>
-            <a:pPr>
-              <a:buNone/>
-            </a:pPr>
-            <a:r>
-              <a:rPr lang="en-US" sz="1400" u="sng" b="true">
-                <a:solidFill>
-                  <a:srgbClr val="00FF00"/>
-                </a:solidFill>
-                <a:latin typeface="Calibri"/>
-              </a:rPr>
-              <a:t>That`s all, folks!</a:t>
             </a:r>
           </a:p>
         </p:txBody>

</xml_diff>

<commit_message>
header info + indicators table
</commit_message>
<xml_diff>
--- a/html-to-ppt/TextFormat.pptx
+++ b/html-to-ppt/TextFormat.pptx
@@ -3069,7 +3069,7 @@
         <p:spPr>
           <a:xfrm>
             <a:off x="254000" y="254000"/>
-            <a:ext cx="14986000" cy="8890000"/>
+            <a:ext cx="6350000" cy="952500"/>
           </a:xfrm>
           <a:prstGeom prst="rect">
             <a:avLst/>
@@ -3083,10 +3083,86 @@
               <a:defRPr/>
             </a:pPr>
             <a:r>
-              <a:rPr lang="en-US"/>
+              <a:rPr lang="ru-RU"/>
               <a:t/>
             </a:r>
-            <a:endParaRPr lang="ru-RU"/>
+            <a:r>
+              <a:rPr lang="en-US" sz="1400" b="true">
+                <a:latin typeface="Calibri"/>
+              </a:rPr>
+              <a:t>Project name: </a:t>
+            </a:r>
+            <a:r>
+              <a:rPr lang="en-US" sz="1400">
+                <a:latin typeface="Calibri"/>
+              </a:rPr>
+              <a:t>Project Pineapple</a:t>
+            </a:r>
+            <a:br>
+              <a:rPr lang="en-US" sz="1400">
+                <a:latin typeface="Calibri"/>
+              </a:rPr>
+            </a:br>
+            <a:r>
+              <a:rPr lang="en-US" sz="1400" b="true">
+                <a:latin typeface="Calibri"/>
+              </a:rPr>
+              <a:t>Project manager: </a:t>
+            </a:r>
+            <a:r>
+              <a:rPr lang="en-US" sz="1400">
+                <a:latin typeface="Calibri"/>
+              </a:rPr>
+              <a:t>IKSANOV Aleksandr</a:t>
+            </a:r>
+            <a:br>
+              <a:rPr lang="en-US" sz="1400">
+                <a:latin typeface="Calibri"/>
+              </a:rPr>
+            </a:br>
+            <a:r>
+              <a:rPr lang="en-US" sz="1400" b="true">
+                <a:latin typeface="Calibri"/>
+              </a:rPr>
+              <a:t>Last Updated: </a:t>
+            </a:r>
+            <a:r>
+              <a:rPr lang="en-US" sz="1400">
+                <a:latin typeface="Calibri"/>
+              </a:rPr>
+              <a:t>2020-04-08</a:t>
+            </a:r>
+            <a:endParaRPr lang="en-US" sz="1100"/>
+          </a:p>
+        </p:txBody>
+      </p:sp>
+      <p:sp>
+        <p:nvSpPr>
+          <p:cNvPr name="TextBox 3" id="3"/>
+          <p:cNvSpPr txBox="true"/>
+          <p:nvPr/>
+        </p:nvSpPr>
+        <p:spPr>
+          <a:xfrm>
+            <a:off x="254000" y="901700"/>
+            <a:ext cx="15748000" cy="8382000"/>
+          </a:xfrm>
+          <a:prstGeom prst="rect">
+            <a:avLst/>
+          </a:prstGeom>
+        </p:spPr>
+        <p:txBody>
+          <a:bodyPr anchor="t" rtlCol="false"/>
+          <a:lstStyle/>
+          <a:p>
+            <a:pPr algn="l">
+              <a:defRPr/>
+            </a:pPr>
+            <a:r>
+              <a:rPr lang="ru-RU"/>
+              <a:t/>
+            </a:r>
+            <a:endParaRPr lang="en-US" sz="1100"/>
           </a:p>
           <a:p>
             <a:r>
@@ -3155,7 +3231,7 @@
               <a:rPr lang="en-US" sz="1400">
                 <a:latin typeface="Calibri"/>
               </a:rPr>
-              <a:t> false PowerPoint documents are made up of a tree of records. A record may contain either other records (in which case it is a Container), or data (in which case it's an Atom). A record can't hold both. PowerPoint documents don't have one overall container record. Instead, there are a number of different container records to be found at the top level. Any numbers or strings stored in the records are always stored in Little Endian format (least important bytes first). This is the case no matter what platform the file was written on - be that a Little Endian or a Big Endian system. PowerPoint may have Escher (DDF) records embedded in it. These are always held as the children of a PPDrawing record (record type 1036). Escher records have the same format as PowerPoint records. </a:t>
+              <a:t> false </a:t>
             </a:r>
             <a:r>
               <a:rPr lang="en-US" sz="1400">
@@ -3169,14 +3245,36 @@
               <a:rPr lang="en-US" sz="1400">
                 <a:latin typeface="Calibri"/>
               </a:rPr>
+              <a:t> PowerPoint documents are made up of a tree of records. A record may contain either other records (in which case it is a Container), or data (in which case it's an Atom). A record can't hold both. PowerPoint documents don't have one overall container record. Instead, there are a number of different container records to be found at the top level. Any numbers or strings stored in the records are always stored in Little Endian format (least important bytes first). This is the case no matter what platform the file was written on - be that a Little Endian or a Big Endian system. PowerPoint may have Escher (DDF) records embedded in it. These are always held as the children of a PPDrawing record (record type 1036). Escher records have the same format as PowerPoint records. Hello mate! Hello mate! Hello mate! Hello mate! Hello mate! Hello mate! Hello mate! Hello mate! Hello mate! This is bold and underscore and both and not true false PowerPoint documents are made up of a tree of records. A record may contain either other records (in which case it is a Container), or data (in which case it's an Atom). A record can't hold both. PowerPoint documents don't have one overall container record. Instead, there are a number of different container records to be found at the top level. Any numbers or strings stored in the records are always stored in Little Endian format (least important bytes first). This is the case no matter what platform the file was written on - be that a Little Endian or a Big Endian system. PowerPoint may have Escher (DDF) records embedded in it. These are always held as the children of a PPDrawing record (record type 1036). Escher records have the same format as PowerPoint records. Hello mate! Hello mate! Hello mate! Hello mate! Hello mate! Hello mate! Hello mate! Hello mate! Hello mate! This is bold and underscore and both and not true false PowerPoint documents are made up of a tree of records. A record may contain either other records (in which case it is a Container), or data (in which case it's an Atom). A record can't hold both. PowerPoint documents don't have one overall container record </a:t>
+            </a:r>
+            <a:r>
+              <a:rPr lang="en-US" sz="1400">
+                <a:latin typeface="Calibri"/>
+              </a:rPr>
               <a:t> </a:t>
             </a:r>
+          </a:p>
+          <a:p>
+            <a:r>
+              <a:rPr lang="en-US" sz="1400">
+                <a:latin typeface="Calibri"/>
+              </a:rPr>
+              <a:t> PowerPoint documents are made up of a tree of records. A record may contain either other records (in which case it is a Container), or data (in which case it's an Atom). A record can't hold both. PowerPoint documents don't have one overall container record. Instead, there are a number of different container records to be found at the top level. Any numbers or strings stored in the records are always stored in Little Endian format (least important bytes first). This is the case no matter what platform the file was written on - be that a Little Endian or a Big Endian system. PowerPoint may have Escher (DDF) records embedded in it. These are always held as the children of a PPDrawing record (record type 1036). Escher records have the same format as PowerPoint records. Hello mate! Hello mate! Hello mate! Hello mate! Hello mate! Hello mate! Hello mate! Hello mate! Hello mate! This is bold and underscore and both and not true false PowerPoint documents are made up of a tree of records. A record may contain either other records (in which case it is a Container), or data (in which case it's an Atom). A record can't hold both. PowerPoint documents don't have one overall container record. Instead, there are a number of different container records to be found at the top level. Any numbers or strings stored in the records are always stored in Little Endian format (least important bytes first). This is the case no matter what platform the file was written on - be that a Little Endian or a Big Endian system. PowerPoint may have Escher (DDF) records embedded in it. These are always held as the children of a PPDrawing record (record type 1036). Escher records have the same format as PowerPoint records. Hello mate! Hello mate! Hello mate! Hello mate! Hello mate! Hello mate! Hello mate! Hello mate! Hello mate! This is bold and underscore and both and not true false PowerPoint documents are made up of a tree of records. A record may contain either other records (in which case it is a Container), or data (in which case it's an Atom). A record can't hold both. PowerPoint documents don't have one overall container record </a:t>
+            </a:r>
             <a:r>
               <a:rPr lang="en-US" sz="1400">
                 <a:latin typeface="Calibri"/>
               </a:rPr>
               <a:t> </a:t>
             </a:r>
+          </a:p>
+          <a:p>
+            <a:r>
+              <a:rPr lang="en-US" sz="1400">
+                <a:latin typeface="Calibri"/>
+              </a:rPr>
+              <a:t> PowerPoint documents are made up of a tree of records. A record may contain either other records (in which case it is a Container), or data (in which case it's an Atom). A record can't hold both. PowerPoint documents don't have one overall container record. Instead, there are a number of different container records to be found at the top level. Any numbers or strings stored in the records are always stored in Little Endian format (least important bytes first). This is the case no matter what platform the file was written on - be that a Little Endian or a Big Endian system. PowerPoint may have Escher (DDF) records embedded in it. These are always held as the children of a PPDrawing record (record type 1036). Escher records have the same format as PowerPoint records. Hello mate! Hello mate! Hello mate! Hello mate! Hello mate! Hello mate! Hello mate! Hello mate! Hello mate! This is bold and underscore and both and not true false PowerPoint documents are made up of a tree of records. A record may contain either other records (in which case it is a Container), or data (in which case it's an Atom). A record can't hold both. PowerPoint documents don't have one overall container record. Instead, there are a number of different container records to be found at the top level. Any numbers or strings stored in the records are always stored in Little Endian format (least important bytes first). This is the case no matter what platform the file was written on - be that a Little Endian or a Big Endian system. PowerPoint may have Escher (DDF) records embedded in it. These are always held as the children of a PPDrawing record (record type 1036). Escher records have the same format as PowerPoint records. Hello mate! Hello mate! Hello mate! Hello mate! Hello mate! Hello mate! Hello mate! Hello mate! Hello mate! This is bold and underscore and both and not true false PowerPoint documents are made up of a tree of records. A record may contain either other records (in which case it is a Container), or data (in which case it's an Atom). A record can't hold both. PowerPoint documents don't have one overall container record </a:t>
+            </a:r>
             <a:r>
               <a:rPr lang="en-US" sz="1400">
                 <a:latin typeface="Calibri"/>
@@ -3189,6 +3287,26 @@
               <a:rPr lang="en-US" sz="1400">
                 <a:latin typeface="Calibri"/>
               </a:rPr>
+              <a:t> </a:t>
+            </a:r>
+            <a:r>
+              <a:rPr lang="en-US" sz="1400">
+                <a:latin typeface="Calibri"/>
+              </a:rPr>
+              <a:t> </a:t>
+            </a:r>
+            <a:r>
+              <a:rPr lang="en-US" sz="1400">
+                <a:latin typeface="Calibri"/>
+              </a:rPr>
+              <a:t> </a:t>
+            </a:r>
+          </a:p>
+          <a:p>
+            <a:r>
+              <a:rPr lang="en-US" sz="1400">
+                <a:latin typeface="Calibri"/>
+              </a:rPr>
               <a:t>Testing list</a:t>
             </a:r>
             <a:r>
@@ -3204,189 +3322,6 @@
                 <a:latin typeface="Calibri"/>
               </a:rPr>
               <a:t> </a:t>
-            </a:r>
-            <a:r>
-              <a:rPr lang="en-US" sz="1400">
-                <a:latin typeface="Calibri"/>
-              </a:rPr>
-              <a:t> </a:t>
-            </a:r>
-            <a:r>
-              <a:rPr lang="en-US" sz="1400">
-                <a:latin typeface="Calibri"/>
-              </a:rPr>
-              <a:t> </a:t>
-            </a:r>
-            <a:r>
-              <a:rPr lang="en-US" sz="1400">
-                <a:latin typeface="Calibri"/>
-              </a:rPr>
-              <a:t> </a:t>
-            </a:r>
-          </a:p>
-          <a:p>
-            <a:pPr>
-              <a:buFont typeface="Arial"/>
-              <a:buAutoNum type="arabicPlain" startAt="1"/>
-              <a:buChar char="•"/>
-            </a:pPr>
-            <a:r>
-              <a:rPr lang="en-US" sz="1400">
-                <a:latin typeface="Calibri"/>
-              </a:rPr>
-              <a:t>q</a:t>
-            </a:r>
-            <a:r>
-              <a:rPr lang="en-US" sz="1400">
-                <a:latin typeface="Calibri"/>
-              </a:rPr>
-              <a:t> </a:t>
-            </a:r>
-          </a:p>
-          <a:p>
-            <a:pPr>
-              <a:buFont typeface="Arial"/>
-              <a:buAutoNum type="arabicPlain" startAt="1"/>
-              <a:buChar char="•"/>
-            </a:pPr>
-            <a:r>
-              <a:rPr lang="en-US" sz="1400">
-                <a:latin typeface="Calibri"/>
-              </a:rPr>
-              <a:t>w</a:t>
-            </a:r>
-            <a:r>
-              <a:rPr lang="en-US" sz="1400">
-                <a:latin typeface="Calibri"/>
-              </a:rPr>
-              <a:t> </a:t>
-            </a:r>
-          </a:p>
-          <a:p>
-            <a:pPr>
-              <a:buFont typeface="Arial"/>
-              <a:buAutoNum type="arabicPlain" startAt="1"/>
-              <a:buChar char="•"/>
-            </a:pPr>
-            <a:r>
-              <a:rPr lang="en-US" sz="1400">
-                <a:latin typeface="Calibri"/>
-              </a:rPr>
-              <a:t>e</a:t>
-            </a:r>
-            <a:r>
-              <a:rPr lang="en-US" sz="1400">
-                <a:latin typeface="Calibri"/>
-              </a:rPr>
-              <a:t> </a:t>
-            </a:r>
-          </a:p>
-          <a:p>
-            <a:pPr>
-              <a:buFont typeface="Arial"/>
-              <a:buAutoNum type="arabicPlain" startAt="1"/>
-              <a:buChar char="•"/>
-            </a:pPr>
-            <a:r>
-              <a:rPr lang="en-US" sz="1400">
-                <a:latin typeface="Calibri"/>
-              </a:rPr>
-              <a:t>r</a:t>
-            </a:r>
-            <a:r>
-              <a:rPr lang="en-US" sz="1400">
-                <a:latin typeface="Calibri"/>
-              </a:rPr>
-              <a:t> </a:t>
-            </a:r>
-          </a:p>
-          <a:p>
-            <a:pPr>
-              <a:buFont typeface="Arial"/>
-              <a:buAutoNum type="arabicPlain" startAt="1"/>
-              <a:buChar char="•"/>
-            </a:pPr>
-            <a:r>
-              <a:rPr lang="en-US" sz="1400">
-                <a:latin typeface="Calibri"/>
-              </a:rPr>
-              <a:t>a</a:t>
-            </a:r>
-            <a:r>
-              <a:rPr lang="en-US" sz="1400">
-                <a:latin typeface="Calibri"/>
-              </a:rPr>
-              <a:t> </a:t>
-            </a:r>
-          </a:p>
-          <a:p>
-            <a:pPr>
-              <a:buFont typeface="Arial"/>
-              <a:buAutoNum type="arabicPlain" startAt="1"/>
-              <a:buChar char="•"/>
-            </a:pPr>
-            <a:r>
-              <a:rPr lang="en-US" sz="1400">
-                <a:latin typeface="Calibri"/>
-              </a:rPr>
-              <a:t>s</a:t>
-            </a:r>
-            <a:r>
-              <a:rPr lang="en-US" sz="1400">
-                <a:latin typeface="Calibri"/>
-              </a:rPr>
-              <a:t> </a:t>
-            </a:r>
-          </a:p>
-          <a:p>
-            <a:pPr>
-              <a:buFont typeface="Arial"/>
-              <a:buAutoNum type="arabicPlain" startAt="1"/>
-              <a:buChar char="•"/>
-            </a:pPr>
-            <a:r>
-              <a:rPr lang="en-US" sz="1400">
-                <a:latin typeface="Calibri"/>
-              </a:rPr>
-              <a:t>d</a:t>
-            </a:r>
-            <a:r>
-              <a:rPr lang="en-US" sz="1400">
-                <a:latin typeface="Calibri"/>
-              </a:rPr>
-              <a:t> </a:t>
-            </a:r>
-          </a:p>
-          <a:p>
-            <a:pPr>
-              <a:buFont typeface="Arial"/>
-              <a:buAutoNum type="arabicPlain" startAt="1"/>
-              <a:buChar char="•"/>
-            </a:pPr>
-            <a:r>
-              <a:rPr lang="en-US" sz="1400">
-                <a:latin typeface="Calibri"/>
-              </a:rPr>
-              <a:t>f</a:t>
-            </a:r>
-            <a:r>
-              <a:rPr lang="en-US" sz="1400">
-                <a:latin typeface="Calibri"/>
-              </a:rPr>
-              <a:t> </a:t>
-            </a:r>
-          </a:p>
-          <a:p>
-            <a:pPr>
-              <a:buFont typeface="Arial"/>
-              <a:buAutoNum type="arabicPlain" startAt="1"/>
-              <a:buChar char="•"/>
-            </a:pPr>
-            <a:r>
-              <a:rPr lang="en-US" sz="1400">
-                <a:latin typeface="Calibri"/>
-              </a:rPr>
-              <a:t>sss</a:t>
             </a:r>
             <a:r>
               <a:rPr lang="en-US" sz="1400">
@@ -3425,8 +3360,500 @@
               <a:t> </a:t>
             </a:r>
           </a:p>
-        </p:txBody>
-      </p:sp>
+          <a:p>
+            <a:pPr>
+              <a:buFont typeface="Arial"/>
+              <a:buChar char="•"/>
+            </a:pPr>
+            <a:r>
+              <a:rPr lang="en-US" sz="1400">
+                <a:latin typeface="Calibri"/>
+              </a:rPr>
+              <a:t>w</a:t>
+            </a:r>
+            <a:r>
+              <a:rPr lang="en-US" sz="1400">
+                <a:latin typeface="Calibri"/>
+              </a:rPr>
+              <a:t> </a:t>
+            </a:r>
+          </a:p>
+        </p:txBody>
+      </p:sp>
+      <p:graphicFrame>
+        <p:nvGraphicFramePr>
+          <p:cNvPr name="Table 4" id="4"/>
+          <p:cNvGraphicFramePr>
+            <a:graphicFrameLocks noGrp="true"/>
+          </p:cNvGraphicFramePr>
+          <p:nvPr/>
+        </p:nvGraphicFramePr>
+        <p:xfrm>
+          <a:off x="10922000" y="254000"/>
+          <a:ext cx="4445000" cy="952500"/>
+        </p:xfrm>
+        <a:graphic>
+          <a:graphicData uri="http://schemas.openxmlformats.org/drawingml/2006/table">
+            <a:tbl>
+              <a:tblPr/>
+              <a:tblGrid>
+                <a:gridCol w="1270000"/>
+                <a:gridCol w="1270000"/>
+                <a:gridCol w="1270000"/>
+                <a:gridCol w="1270000"/>
+              </a:tblGrid>
+              <a:tr h="254000">
+                <a:tc>
+                  <a:txBody>
+                    <a:bodyPr anchor="t" rtlCol="false"/>
+                    <a:lstStyle/>
+                    <a:p>
+                      <a:pPr algn="ctr">
+                        <a:defRPr/>
+                      </a:pPr>
+                      <a:r>
+                        <a:rPr lang="en-US"/>
+                        <a:t>Schedule</a:t>
+                      </a:r>
+                      <a:endParaRPr lang="en-US" sz="1100"/>
+                    </a:p>
+                  </a:txBody>
+                  <a:tcPr>
+                    <a:lnL cmpd="sng" algn="ctr" cap="flat">
+                      <a:solidFill>
+                        <a:srgbClr val="000000"/>
+                      </a:solidFill>
+                      <a:prstDash val="solid"/>
+                      <a:round/>
+                      <a:headEnd type="none" w="med" len="med"/>
+                      <a:tailEnd type="none" w="med" len="med"/>
+                    </a:lnL>
+                    <a:lnR cmpd="sng" algn="ctr" cap="flat">
+                      <a:solidFill>
+                        <a:srgbClr val="000000"/>
+                      </a:solidFill>
+                      <a:prstDash val="solid"/>
+                      <a:round/>
+                      <a:headEnd type="none" w="med" len="med"/>
+                      <a:tailEnd type="none" w="med" len="med"/>
+                    </a:lnR>
+                    <a:lnT cmpd="sng" algn="ctr" cap="flat">
+                      <a:solidFill>
+                        <a:srgbClr val="000000"/>
+                      </a:solidFill>
+                      <a:prstDash val="solid"/>
+                      <a:round/>
+                      <a:headEnd type="none" w="med" len="med"/>
+                      <a:tailEnd type="none" w="med" len="med"/>
+                    </a:lnT>
+                    <a:lnB cmpd="sng" algn="ctr" cap="flat">
+                      <a:solidFill>
+                        <a:srgbClr val="000000"/>
+                      </a:solidFill>
+                      <a:prstDash val="solid"/>
+                      <a:round/>
+                      <a:headEnd type="none" w="med" len="med"/>
+                      <a:tailEnd type="none" w="med" len="med"/>
+                    </a:lnB>
+                  </a:tcPr>
+                </a:tc>
+                <a:tc>
+                  <a:txBody>
+                    <a:bodyPr anchor="t" rtlCol="false"/>
+                    <a:lstStyle/>
+                    <a:p>
+                      <a:pPr algn="ctr">
+                        <a:defRPr/>
+                      </a:pPr>
+                      <a:r>
+                        <a:rPr lang="en-US"/>
+                        <a:t>Scope</a:t>
+                      </a:r>
+                      <a:endParaRPr lang="en-US" sz="1100"/>
+                    </a:p>
+                  </a:txBody>
+                  <a:tcPr>
+                    <a:lnL cmpd="sng" algn="ctr" cap="flat">
+                      <a:solidFill>
+                        <a:srgbClr val="000000"/>
+                      </a:solidFill>
+                      <a:prstDash val="solid"/>
+                      <a:round/>
+                      <a:headEnd type="none" w="med" len="med"/>
+                      <a:tailEnd type="none" w="med" len="med"/>
+                    </a:lnL>
+                    <a:lnR cmpd="sng" algn="ctr" cap="flat">
+                      <a:solidFill>
+                        <a:srgbClr val="000000"/>
+                      </a:solidFill>
+                      <a:prstDash val="solid"/>
+                      <a:round/>
+                      <a:headEnd type="none" w="med" len="med"/>
+                      <a:tailEnd type="none" w="med" len="med"/>
+                    </a:lnR>
+                    <a:lnT cmpd="sng" algn="ctr" cap="flat">
+                      <a:solidFill>
+                        <a:srgbClr val="000000"/>
+                      </a:solidFill>
+                      <a:prstDash val="solid"/>
+                      <a:round/>
+                      <a:headEnd type="none" w="med" len="med"/>
+                      <a:tailEnd type="none" w="med" len="med"/>
+                    </a:lnT>
+                    <a:lnB cmpd="sng" algn="ctr" cap="flat">
+                      <a:solidFill>
+                        <a:srgbClr val="000000"/>
+                      </a:solidFill>
+                      <a:prstDash val="solid"/>
+                      <a:round/>
+                      <a:headEnd type="none" w="med" len="med"/>
+                      <a:tailEnd type="none" w="med" len="med"/>
+                    </a:lnB>
+                  </a:tcPr>
+                </a:tc>
+                <a:tc>
+                  <a:txBody>
+                    <a:bodyPr anchor="t" rtlCol="false"/>
+                    <a:lstStyle/>
+                    <a:p>
+                      <a:pPr algn="ctr">
+                        <a:defRPr/>
+                      </a:pPr>
+                      <a:r>
+                        <a:rPr lang="en-US"/>
+                        <a:t>Quality</a:t>
+                      </a:r>
+                      <a:endParaRPr lang="en-US" sz="1100"/>
+                    </a:p>
+                  </a:txBody>
+                  <a:tcPr>
+                    <a:lnL cmpd="sng" algn="ctr" cap="flat">
+                      <a:solidFill>
+                        <a:srgbClr val="000000"/>
+                      </a:solidFill>
+                      <a:prstDash val="solid"/>
+                      <a:round/>
+                      <a:headEnd type="none" w="med" len="med"/>
+                      <a:tailEnd type="none" w="med" len="med"/>
+                    </a:lnL>
+                    <a:lnR cmpd="sng" algn="ctr" cap="flat">
+                      <a:solidFill>
+                        <a:srgbClr val="000000"/>
+                      </a:solidFill>
+                      <a:prstDash val="solid"/>
+                      <a:round/>
+                      <a:headEnd type="none" w="med" len="med"/>
+                      <a:tailEnd type="none" w="med" len="med"/>
+                    </a:lnR>
+                    <a:lnT cmpd="sng" algn="ctr" cap="flat">
+                      <a:solidFill>
+                        <a:srgbClr val="000000"/>
+                      </a:solidFill>
+                      <a:prstDash val="solid"/>
+                      <a:round/>
+                      <a:headEnd type="none" w="med" len="med"/>
+                      <a:tailEnd type="none" w="med" len="med"/>
+                    </a:lnT>
+                    <a:lnB cmpd="sng" algn="ctr" cap="flat">
+                      <a:solidFill>
+                        <a:srgbClr val="000000"/>
+                      </a:solidFill>
+                      <a:prstDash val="solid"/>
+                      <a:round/>
+                      <a:headEnd type="none" w="med" len="med"/>
+                      <a:tailEnd type="none" w="med" len="med"/>
+                    </a:lnB>
+                  </a:tcPr>
+                </a:tc>
+                <a:tc>
+                  <a:txBody>
+                    <a:bodyPr anchor="t" rtlCol="false"/>
+                    <a:lstStyle/>
+                    <a:p>
+                      <a:pPr algn="ctr">
+                        <a:defRPr/>
+                      </a:pPr>
+                      <a:r>
+                        <a:rPr lang="en-US"/>
+                        <a:t>Cost</a:t>
+                      </a:r>
+                      <a:endParaRPr lang="en-US" sz="1100"/>
+                    </a:p>
+                  </a:txBody>
+                  <a:tcPr>
+                    <a:lnL cmpd="sng" algn="ctr" cap="flat">
+                      <a:solidFill>
+                        <a:srgbClr val="000000"/>
+                      </a:solidFill>
+                      <a:prstDash val="solid"/>
+                      <a:round/>
+                      <a:headEnd type="none" w="med" len="med"/>
+                      <a:tailEnd type="none" w="med" len="med"/>
+                    </a:lnL>
+                    <a:lnR cmpd="sng" algn="ctr" cap="flat">
+                      <a:solidFill>
+                        <a:srgbClr val="000000"/>
+                      </a:solidFill>
+                      <a:prstDash val="solid"/>
+                      <a:round/>
+                      <a:headEnd type="none" w="med" len="med"/>
+                      <a:tailEnd type="none" w="med" len="med"/>
+                    </a:lnR>
+                    <a:lnT cmpd="sng" algn="ctr" cap="flat">
+                      <a:solidFill>
+                        <a:srgbClr val="000000"/>
+                      </a:solidFill>
+                      <a:prstDash val="solid"/>
+                      <a:round/>
+                      <a:headEnd type="none" w="med" len="med"/>
+                      <a:tailEnd type="none" w="med" len="med"/>
+                    </a:lnT>
+                    <a:lnB cmpd="sng" algn="ctr" cap="flat">
+                      <a:solidFill>
+                        <a:srgbClr val="000000"/>
+                      </a:solidFill>
+                      <a:prstDash val="solid"/>
+                      <a:round/>
+                      <a:headEnd type="none" w="med" len="med"/>
+                      <a:tailEnd type="none" w="med" len="med"/>
+                    </a:lnB>
+                  </a:tcPr>
+                </a:tc>
+              </a:tr>
+              <a:tr h="254000">
+                <a:tc>
+                  <a:txBody>
+                    <a:bodyPr anchor="t" rtlCol="false"/>
+                    <a:lstStyle/>
+                    <a:p>
+                      <a:pPr algn="ctr">
+                        <a:defRPr/>
+                      </a:pPr>
+                      <a:r>
+                        <a:rPr lang="en-US"/>
+                        <a:t>GREEN</a:t>
+                      </a:r>
+                      <a:endParaRPr lang="en-US" sz="1100"/>
+                    </a:p>
+                  </a:txBody>
+                  <a:tcPr>
+                    <a:lnL cmpd="sng" algn="ctr" cap="flat">
+                      <a:solidFill>
+                        <a:srgbClr val="000000"/>
+                      </a:solidFill>
+                      <a:prstDash val="solid"/>
+                      <a:round/>
+                      <a:headEnd type="none" w="med" len="med"/>
+                      <a:tailEnd type="none" w="med" len="med"/>
+                    </a:lnL>
+                    <a:lnR cmpd="sng" algn="ctr" cap="flat">
+                      <a:solidFill>
+                        <a:srgbClr val="000000"/>
+                      </a:solidFill>
+                      <a:prstDash val="solid"/>
+                      <a:round/>
+                      <a:headEnd type="none" w="med" len="med"/>
+                      <a:tailEnd type="none" w="med" len="med"/>
+                    </a:lnR>
+                    <a:lnT cmpd="sng" algn="ctr" cap="flat">
+                      <a:solidFill>
+                        <a:srgbClr val="000000"/>
+                      </a:solidFill>
+                      <a:prstDash val="solid"/>
+                      <a:round/>
+                      <a:headEnd type="none" w="med" len="med"/>
+                      <a:tailEnd type="none" w="med" len="med"/>
+                    </a:lnT>
+                    <a:lnB cmpd="sng" algn="ctr" cap="flat">
+                      <a:solidFill>
+                        <a:srgbClr val="000000"/>
+                      </a:solidFill>
+                      <a:prstDash val="solid"/>
+                      <a:round/>
+                      <a:headEnd type="none" w="med" len="med"/>
+                      <a:tailEnd type="none" w="med" len="med"/>
+                    </a:lnB>
+                    <a:solidFill>
+                      <a:srgbClr val="00FF00"/>
+                    </a:solidFill>
+                  </a:tcPr>
+                </a:tc>
+                <a:tc>
+                  <a:txBody>
+                    <a:bodyPr anchor="t" rtlCol="false"/>
+                    <a:lstStyle/>
+                    <a:p>
+                      <a:pPr algn="ctr">
+                        <a:defRPr/>
+                      </a:pPr>
+                      <a:r>
+                        <a:rPr lang="en-US"/>
+                        <a:t>GREEN</a:t>
+                      </a:r>
+                      <a:endParaRPr lang="en-US" sz="1100"/>
+                    </a:p>
+                  </a:txBody>
+                  <a:tcPr>
+                    <a:lnL cmpd="sng" algn="ctr" cap="flat">
+                      <a:solidFill>
+                        <a:srgbClr val="000000"/>
+                      </a:solidFill>
+                      <a:prstDash val="solid"/>
+                      <a:round/>
+                      <a:headEnd type="none" w="med" len="med"/>
+                      <a:tailEnd type="none" w="med" len="med"/>
+                    </a:lnL>
+                    <a:lnR cmpd="sng" algn="ctr" cap="flat">
+                      <a:solidFill>
+                        <a:srgbClr val="000000"/>
+                      </a:solidFill>
+                      <a:prstDash val="solid"/>
+                      <a:round/>
+                      <a:headEnd type="none" w="med" len="med"/>
+                      <a:tailEnd type="none" w="med" len="med"/>
+                    </a:lnR>
+                    <a:lnT cmpd="sng" algn="ctr" cap="flat">
+                      <a:solidFill>
+                        <a:srgbClr val="000000"/>
+                      </a:solidFill>
+                      <a:prstDash val="solid"/>
+                      <a:round/>
+                      <a:headEnd type="none" w="med" len="med"/>
+                      <a:tailEnd type="none" w="med" len="med"/>
+                    </a:lnT>
+                    <a:lnB cmpd="sng" algn="ctr" cap="flat">
+                      <a:solidFill>
+                        <a:srgbClr val="000000"/>
+                      </a:solidFill>
+                      <a:prstDash val="solid"/>
+                      <a:round/>
+                      <a:headEnd type="none" w="med" len="med"/>
+                      <a:tailEnd type="none" w="med" len="med"/>
+                    </a:lnB>
+                    <a:solidFill>
+                      <a:srgbClr val="00FF00"/>
+                    </a:solidFill>
+                  </a:tcPr>
+                </a:tc>
+                <a:tc>
+                  <a:txBody>
+                    <a:bodyPr anchor="t" rtlCol="false"/>
+                    <a:lstStyle/>
+                    <a:p>
+                      <a:pPr algn="ctr">
+                        <a:defRPr/>
+                      </a:pPr>
+                      <a:r>
+                        <a:rPr lang="en-US"/>
+                        <a:t>GREEN</a:t>
+                      </a:r>
+                      <a:endParaRPr lang="en-US" sz="1100"/>
+                    </a:p>
+                  </a:txBody>
+                  <a:tcPr>
+                    <a:lnL cmpd="sng" algn="ctr" cap="flat">
+                      <a:solidFill>
+                        <a:srgbClr val="000000"/>
+                      </a:solidFill>
+                      <a:prstDash val="solid"/>
+                      <a:round/>
+                      <a:headEnd type="none" w="med" len="med"/>
+                      <a:tailEnd type="none" w="med" len="med"/>
+                    </a:lnL>
+                    <a:lnR cmpd="sng" algn="ctr" cap="flat">
+                      <a:solidFill>
+                        <a:srgbClr val="000000"/>
+                      </a:solidFill>
+                      <a:prstDash val="solid"/>
+                      <a:round/>
+                      <a:headEnd type="none" w="med" len="med"/>
+                      <a:tailEnd type="none" w="med" len="med"/>
+                    </a:lnR>
+                    <a:lnT cmpd="sng" algn="ctr" cap="flat">
+                      <a:solidFill>
+                        <a:srgbClr val="000000"/>
+                      </a:solidFill>
+                      <a:prstDash val="solid"/>
+                      <a:round/>
+                      <a:headEnd type="none" w="med" len="med"/>
+                      <a:tailEnd type="none" w="med" len="med"/>
+                    </a:lnT>
+                    <a:lnB cmpd="sng" algn="ctr" cap="flat">
+                      <a:solidFill>
+                        <a:srgbClr val="000000"/>
+                      </a:solidFill>
+                      <a:prstDash val="solid"/>
+                      <a:round/>
+                      <a:headEnd type="none" w="med" len="med"/>
+                      <a:tailEnd type="none" w="med" len="med"/>
+                    </a:lnB>
+                    <a:solidFill>
+                      <a:srgbClr val="00FF00"/>
+                    </a:solidFill>
+                  </a:tcPr>
+                </a:tc>
+                <a:tc>
+                  <a:txBody>
+                    <a:bodyPr anchor="t" rtlCol="false"/>
+                    <a:lstStyle/>
+                    <a:p>
+                      <a:pPr algn="ctr">
+                        <a:defRPr/>
+                      </a:pPr>
+                      <a:r>
+                        <a:rPr lang="en-US"/>
+                        <a:t>GREEN</a:t>
+                      </a:r>
+                      <a:endParaRPr lang="en-US" sz="1100"/>
+                    </a:p>
+                  </a:txBody>
+                  <a:tcPr>
+                    <a:lnL cmpd="sng" algn="ctr" cap="flat">
+                      <a:solidFill>
+                        <a:srgbClr val="000000"/>
+                      </a:solidFill>
+                      <a:prstDash val="solid"/>
+                      <a:round/>
+                      <a:headEnd type="none" w="med" len="med"/>
+                      <a:tailEnd type="none" w="med" len="med"/>
+                    </a:lnL>
+                    <a:lnR cmpd="sng" algn="ctr" cap="flat">
+                      <a:solidFill>
+                        <a:srgbClr val="000000"/>
+                      </a:solidFill>
+                      <a:prstDash val="solid"/>
+                      <a:round/>
+                      <a:headEnd type="none" w="med" len="med"/>
+                      <a:tailEnd type="none" w="med" len="med"/>
+                    </a:lnR>
+                    <a:lnT cmpd="sng" algn="ctr" cap="flat">
+                      <a:solidFill>
+                        <a:srgbClr val="000000"/>
+                      </a:solidFill>
+                      <a:prstDash val="solid"/>
+                      <a:round/>
+                      <a:headEnd type="none" w="med" len="med"/>
+                      <a:tailEnd type="none" w="med" len="med"/>
+                    </a:lnT>
+                    <a:lnB cmpd="sng" algn="ctr" cap="flat">
+                      <a:solidFill>
+                        <a:srgbClr val="000000"/>
+                      </a:solidFill>
+                      <a:prstDash val="solid"/>
+                      <a:round/>
+                      <a:headEnd type="none" w="med" len="med"/>
+                      <a:tailEnd type="none" w="med" len="med"/>
+                    </a:lnB>
+                    <a:solidFill>
+                      <a:srgbClr val="00FF00"/>
+                    </a:solidFill>
+                  </a:tcPr>
+                </a:tc>
+              </a:tr>
+            </a:tbl>
+          </a:graphicData>
+        </a:graphic>
+      </p:graphicFrame>
     </p:spTree>
   </p:cSld>
   <p:clrMapOvr>
@@ -3460,8 +3887,8 @@
         </p:nvSpPr>
         <p:spPr>
           <a:xfrm>
-            <a:off x="254000" y="254000"/>
-            <a:ext cx="14986000" cy="8890000"/>
+            <a:off x="254000" y="393700"/>
+            <a:ext cx="15748000" cy="8382000"/>
           </a:xfrm>
           <a:prstGeom prst="rect">
             <a:avLst/>
@@ -3475,10 +3902,10 @@
               <a:defRPr/>
             </a:pPr>
             <a:r>
-              <a:rPr lang="en-US"/>
+              <a:rPr lang="ru-RU"/>
               <a:t/>
             </a:r>
-            <a:endParaRPr lang="ru-RU"/>
+            <a:endParaRPr lang="en-US" sz="1100"/>
           </a:p>
           <a:p>
             <a:pPr>
@@ -3489,19 +3916,7 @@
               <a:rPr lang="en-US" sz="1400">
                 <a:latin typeface="Calibri"/>
               </a:rPr>
-              <a:t>sss</a:t>
-            </a:r>
-            <a:r>
-              <a:rPr lang="en-US" sz="1400">
-                <a:latin typeface="Calibri"/>
-              </a:rPr>
-              <a:t> </a:t>
-            </a:r>
-            <a:r>
-              <a:rPr lang="en-US" sz="1400">
-                <a:latin typeface="Calibri"/>
-              </a:rPr>
-              <a:t> </a:t>
+              <a:t>e</a:t>
             </a:r>
             <a:r>
               <a:rPr lang="en-US" sz="1400">
@@ -3513,14 +3928,13 @@
           <a:p>
             <a:pPr>
               <a:buFont typeface="Arial"/>
-              <a:buAutoNum type="arabicPlain" startAt="1"/>
               <a:buChar char="•"/>
             </a:pPr>
             <a:r>
               <a:rPr lang="en-US" sz="1400">
                 <a:latin typeface="Calibri"/>
               </a:rPr>
-              <a:t>q</a:t>
+              <a:t>r</a:t>
             </a:r>
             <a:r>
               <a:rPr lang="en-US" sz="1400">
@@ -3532,14 +3946,13 @@
           <a:p>
             <a:pPr>
               <a:buFont typeface="Arial"/>
-              <a:buAutoNum type="arabicPlain" startAt="1"/>
               <a:buChar char="•"/>
             </a:pPr>
             <a:r>
               <a:rPr lang="en-US" sz="1400">
                 <a:latin typeface="Calibri"/>
               </a:rPr>
-              <a:t>w</a:t>
+              <a:t>a</a:t>
             </a:r>
             <a:r>
               <a:rPr lang="en-US" sz="1400">
@@ -3551,14 +3964,13 @@
           <a:p>
             <a:pPr>
               <a:buFont typeface="Arial"/>
-              <a:buAutoNum type="arabicPlain" startAt="1"/>
               <a:buChar char="•"/>
             </a:pPr>
             <a:r>
               <a:rPr lang="en-US" sz="1400">
                 <a:latin typeface="Calibri"/>
               </a:rPr>
-              <a:t>e</a:t>
+              <a:t>s</a:t>
             </a:r>
             <a:r>
               <a:rPr lang="en-US" sz="1400">
@@ -3570,14 +3982,13 @@
           <a:p>
             <a:pPr>
               <a:buFont typeface="Arial"/>
-              <a:buAutoNum type="arabicPlain" startAt="1"/>
               <a:buChar char="•"/>
             </a:pPr>
             <a:r>
               <a:rPr lang="en-US" sz="1400">
                 <a:latin typeface="Calibri"/>
               </a:rPr>
-              <a:t>r</a:t>
+              <a:t>d</a:t>
             </a:r>
             <a:r>
               <a:rPr lang="en-US" sz="1400">
@@ -3589,14 +4000,13 @@
           <a:p>
             <a:pPr>
               <a:buFont typeface="Arial"/>
-              <a:buAutoNum type="arabicPlain" startAt="1"/>
               <a:buChar char="•"/>
             </a:pPr>
             <a:r>
               <a:rPr lang="en-US" sz="1400">
                 <a:latin typeface="Calibri"/>
               </a:rPr>
-              <a:t>a</a:t>
+              <a:t>f</a:t>
             </a:r>
             <a:r>
               <a:rPr lang="en-US" sz="1400">
@@ -3608,14 +4018,25 @@
           <a:p>
             <a:pPr>
               <a:buFont typeface="Arial"/>
-              <a:buAutoNum type="arabicPlain" startAt="1"/>
               <a:buChar char="•"/>
             </a:pPr>
             <a:r>
               <a:rPr lang="en-US" sz="1400">
                 <a:latin typeface="Calibri"/>
               </a:rPr>
-              <a:t>s</a:t>
+              <a:t>sss</a:t>
+            </a:r>
+            <a:r>
+              <a:rPr lang="en-US" sz="1400">
+                <a:latin typeface="Calibri"/>
+              </a:rPr>
+              <a:t> </a:t>
+            </a:r>
+            <a:r>
+              <a:rPr lang="en-US" sz="1400">
+                <a:latin typeface="Calibri"/>
+              </a:rPr>
+              <a:t> </a:t>
             </a:r>
             <a:r>
               <a:rPr lang="en-US" sz="1400">
@@ -3627,14 +4048,13 @@
           <a:p>
             <a:pPr>
               <a:buFont typeface="Arial"/>
-              <a:buAutoNum type="arabicPlain" startAt="1"/>
               <a:buChar char="•"/>
             </a:pPr>
             <a:r>
               <a:rPr lang="en-US" sz="1400">
                 <a:latin typeface="Calibri"/>
               </a:rPr>
-              <a:t>d</a:t>
+              <a:t>q</a:t>
             </a:r>
             <a:r>
               <a:rPr lang="en-US" sz="1400">
@@ -3646,14 +4066,25 @@
           <a:p>
             <a:pPr>
               <a:buFont typeface="Arial"/>
-              <a:buAutoNum type="arabicPlain" startAt="1"/>
               <a:buChar char="•"/>
             </a:pPr>
             <a:r>
               <a:rPr lang="en-US" sz="1400">
                 <a:latin typeface="Calibri"/>
               </a:rPr>
-              <a:t>f</a:t>
+              <a:t>sss</a:t>
+            </a:r>
+            <a:r>
+              <a:rPr lang="en-US" sz="1400">
+                <a:latin typeface="Calibri"/>
+              </a:rPr>
+              <a:t> </a:t>
+            </a:r>
+            <a:r>
+              <a:rPr lang="en-US" sz="1400">
+                <a:latin typeface="Calibri"/>
+              </a:rPr>
+              <a:t> </a:t>
             </a:r>
             <a:r>
               <a:rPr lang="en-US" sz="1400">
@@ -3665,7 +4096,150 @@
           <a:p>
             <a:pPr>
               <a:buFont typeface="Arial"/>
-              <a:buAutoNum type="arabicPlain" startAt="1"/>
+              <a:buChar char="•"/>
+            </a:pPr>
+            <a:r>
+              <a:rPr lang="en-US" sz="1400">
+                <a:latin typeface="Calibri"/>
+              </a:rPr>
+              <a:t>q</a:t>
+            </a:r>
+            <a:r>
+              <a:rPr lang="en-US" sz="1400">
+                <a:latin typeface="Calibri"/>
+              </a:rPr>
+              <a:t> </a:t>
+            </a:r>
+          </a:p>
+          <a:p>
+            <a:pPr>
+              <a:buFont typeface="Arial"/>
+              <a:buChar char="•"/>
+            </a:pPr>
+            <a:r>
+              <a:rPr lang="en-US" sz="1400">
+                <a:latin typeface="Calibri"/>
+              </a:rPr>
+              <a:t>w</a:t>
+            </a:r>
+            <a:r>
+              <a:rPr lang="en-US" sz="1400">
+                <a:latin typeface="Calibri"/>
+              </a:rPr>
+              <a:t> </a:t>
+            </a:r>
+          </a:p>
+          <a:p>
+            <a:pPr>
+              <a:buFont typeface="Arial"/>
+              <a:buChar char="•"/>
+            </a:pPr>
+            <a:r>
+              <a:rPr lang="en-US" sz="1400">
+                <a:latin typeface="Calibri"/>
+              </a:rPr>
+              <a:t>e</a:t>
+            </a:r>
+            <a:r>
+              <a:rPr lang="en-US" sz="1400">
+                <a:latin typeface="Calibri"/>
+              </a:rPr>
+              <a:t> </a:t>
+            </a:r>
+          </a:p>
+          <a:p>
+            <a:pPr>
+              <a:buFont typeface="Arial"/>
+              <a:buChar char="•"/>
+            </a:pPr>
+            <a:r>
+              <a:rPr lang="en-US" sz="1400">
+                <a:latin typeface="Calibri"/>
+              </a:rPr>
+              <a:t>r</a:t>
+            </a:r>
+            <a:r>
+              <a:rPr lang="en-US" sz="1400">
+                <a:latin typeface="Calibri"/>
+              </a:rPr>
+              <a:t> </a:t>
+            </a:r>
+          </a:p>
+          <a:p>
+            <a:pPr>
+              <a:buFont typeface="Arial"/>
+              <a:buChar char="•"/>
+            </a:pPr>
+            <a:r>
+              <a:rPr lang="en-US" sz="1400">
+                <a:latin typeface="Calibri"/>
+              </a:rPr>
+              <a:t>a</a:t>
+            </a:r>
+            <a:r>
+              <a:rPr lang="en-US" sz="1400">
+                <a:latin typeface="Calibri"/>
+              </a:rPr>
+              <a:t> </a:t>
+            </a:r>
+          </a:p>
+          <a:p>
+            <a:pPr>
+              <a:buFont typeface="Arial"/>
+              <a:buChar char="•"/>
+            </a:pPr>
+            <a:r>
+              <a:rPr lang="en-US" sz="1400">
+                <a:latin typeface="Calibri"/>
+              </a:rPr>
+              <a:t>s</a:t>
+            </a:r>
+            <a:r>
+              <a:rPr lang="en-US" sz="1400">
+                <a:latin typeface="Calibri"/>
+              </a:rPr>
+              <a:t> </a:t>
+            </a:r>
+          </a:p>
+          <a:p>
+            <a:pPr>
+              <a:buFont typeface="Arial"/>
+              <a:buChar char="•"/>
+            </a:pPr>
+            <a:r>
+              <a:rPr lang="en-US" sz="1400">
+                <a:latin typeface="Calibri"/>
+              </a:rPr>
+              <a:t>d</a:t>
+            </a:r>
+            <a:r>
+              <a:rPr lang="en-US" sz="1400">
+                <a:latin typeface="Calibri"/>
+              </a:rPr>
+              <a:t> </a:t>
+            </a:r>
+          </a:p>
+          <a:p>
+            <a:pPr>
+              <a:buFont typeface="Arial"/>
+              <a:buChar char="•"/>
+            </a:pPr>
+            <a:r>
+              <a:rPr lang="en-US" sz="1400">
+                <a:latin typeface="Calibri"/>
+              </a:rPr>
+              <a:t>f</a:t>
+            </a:r>
+            <a:r>
+              <a:rPr lang="en-US" sz="1400">
+                <a:latin typeface="Calibri"/>
+              </a:rPr>
+              <a:t> </a:t>
+            </a:r>
+          </a:p>
+          <a:p>
+            <a:pPr>
+              <a:buFont typeface="Arial"/>
               <a:buChar char="•"/>
             </a:pPr>
             <a:r>

</xml_diff>

<commit_message>
footer, header and section name repeated if slide created due to overflow + refactor;
Still has problems with overflow calculating
</commit_message>
<xml_diff>
--- a/html-to-ppt/TextFormat.pptx
+++ b/html-to-ppt/TextFormat.pptx
@@ -7,6 +7,7 @@
   <p:sldIdLst>
     <p:sldId id="256" r:id="rId6"/>
     <p:sldId id="257" r:id="rId7"/>
+    <p:sldId id="258" r:id="rId8"/>
   </p:sldIdLst>
   <p:sldSz cx="16256000" cy="9144000"/>
   <p:notesSz cx="6858000" cy="9144000"/>
@@ -3069,7 +3070,7 @@
         <p:spPr>
           <a:xfrm>
             <a:off x="254000" y="254000"/>
-            <a:ext cx="6350000" cy="952500"/>
+            <a:ext cx="6350000" cy="762000"/>
           </a:xfrm>
           <a:prstGeom prst="rect">
             <a:avLst/>
@@ -3096,7 +3097,7 @@
               <a:rPr lang="en-US" sz="1400">
                 <a:latin typeface="Calibri"/>
               </a:rPr>
-              <a:t>Project Pineapple</a:t>
+              <a:t>Project Grape</a:t>
             </a:r>
             <a:br>
               <a:rPr lang="en-US" sz="1400">
@@ -3130,15 +3131,157 @@
               <a:rPr lang="en-US" sz="1400">
                 <a:latin typeface="Calibri"/>
               </a:rPr>
-              <a:t>2020-04-08</a:t>
+              <a:t>Sun Apr 12 19:42:53 MSK 2020</a:t>
             </a:r>
             <a:endParaRPr lang="en-US" sz="1100"/>
           </a:p>
         </p:txBody>
+      </p:sp>
+      <p:sp>
+        <p:nvSpPr>
+          <p:cNvPr name="TextBox 3" id="3"/>
+          <p:cNvSpPr txBox="true"/>
+          <p:nvPr/>
+        </p:nvSpPr>
+        <p:spPr>
+          <a:xfrm>
+            <a:off x="254000" y="1155700"/>
+            <a:ext cx="15748000" cy="215900"/>
+          </a:xfrm>
+          <a:prstGeom prst="rect">
+            <a:avLst/>
+          </a:prstGeom>
+        </p:spPr>
+        <p:txBody>
+          <a:bodyPr anchor="t" rtlCol="false"/>
+          <a:lstStyle/>
+          <a:p>
+            <a:pPr algn="l">
+              <a:defRPr/>
+            </a:pPr>
+            <a:r>
+              <a:rPr lang="ru-RU"/>
+              <a:t/>
+            </a:r>
+            <a:r>
+              <a:rPr lang="en-US" sz="1400" b="true">
+                <a:latin typeface="Calibri"/>
+              </a:rPr>
+              <a:t>Executive Status Summary</a:t>
+            </a:r>
+            <a:endParaRPr lang="en-US" sz="1100"/>
+          </a:p>
+        </p:txBody>
+      </p:sp>
+      <p:sp>
+        <p:nvSpPr>
+          <p:cNvPr name="AutoShape 4" id="4"/>
+          <p:cNvSpPr/>
+          <p:nvPr/>
+        </p:nvSpPr>
+        <p:spPr>
+          <a:xfrm>
+            <a:off x="254000" y="1422400"/>
+            <a:ext cx="15748000" cy="12700"/>
+          </a:xfrm>
+          <a:prstGeom prst="line">
+            <a:avLst/>
+          </a:prstGeom>
+          <a:ln>
+            <a:solidFill>
+              <a:srgbClr val="000000"/>
+            </a:solidFill>
+          </a:ln>
+        </p:spPr>
+      </p:sp>
+      <p:sp>
+        <p:nvSpPr>
+          <p:cNvPr name="TextBox 5" id="5"/>
+          <p:cNvSpPr txBox="true"/>
+          <p:nvPr/>
+        </p:nvSpPr>
+        <p:spPr>
+          <a:xfrm>
+            <a:off x="5905500" y="8191500"/>
+            <a:ext cx="4445000" cy="635000"/>
+          </a:xfrm>
+          <a:prstGeom prst="rect">
+            <a:avLst/>
+          </a:prstGeom>
+        </p:spPr>
+        <p:txBody>
+          <a:bodyPr anchor="t" rtlCol="false"/>
+          <a:lstStyle/>
+          <a:p>
+            <a:pPr algn="ctr">
+              <a:defRPr/>
+            </a:pPr>
+            <a:r>
+              <a:rPr lang="ru-RU"/>
+              <a:t/>
+            </a:r>
+            <a:r>
+              <a:rPr lang="en-US" sz="1200" i="true">
+                <a:solidFill>
+                  <a:srgbClr val="FF0000"/>
+                </a:solidFill>
+                <a:latin typeface="Calibri"/>
+              </a:rPr>
+              <a:t>Alcatel-Lucent Enterprise - Confidential</a:t>
+            </a:r>
+            <a:br>
+              <a:rPr lang="en-US" sz="1200" i="true">
+                <a:solidFill>
+                  <a:srgbClr val="FF0000"/>
+                </a:solidFill>
+                <a:latin typeface="Calibri"/>
+              </a:rPr>
+            </a:br>
+            <a:r>
+              <a:rPr lang="en-US" sz="1200" b="true">
+                <a:latin typeface="Calibri"/>
+              </a:rPr>
+              <a:t>Solely for authorized persons having a need to know</a:t>
+            </a:r>
+            <a:br>
+              <a:rPr lang="en-US" sz="1200" b="true">
+                <a:latin typeface="Calibri"/>
+              </a:rPr>
+            </a:br>
+            <a:r>
+              <a:rPr lang="en-US" sz="1200">
+                <a:latin typeface="Calibri"/>
+              </a:rPr>
+              <a:t>Proprietary - Use pursuant to Company Instruction</a:t>
+            </a:r>
+            <a:endParaRPr lang="en-US" sz="1100"/>
+          </a:p>
+        </p:txBody>
+      </p:sp>
+      <p:sp>
+        <p:nvSpPr>
+          <p:cNvPr name="AutoShape 6" id="6"/>
+          <p:cNvSpPr/>
+          <p:nvPr/>
+        </p:nvSpPr>
+        <p:spPr>
+          <a:xfrm>
+            <a:off x="254000" y="8064500"/>
+            <a:ext cx="15748000" cy="12700"/>
+          </a:xfrm>
+          <a:prstGeom prst="line">
+            <a:avLst/>
+          </a:prstGeom>
+          <a:ln>
+            <a:solidFill>
+              <a:srgbClr val="000000"/>
+            </a:solidFill>
+          </a:ln>
+        </p:spPr>
       </p:sp>
       <p:graphicFrame>
         <p:nvGraphicFramePr>
-          <p:cNvPr name="Table 3" id="3"/>
+          <p:cNvPr name="Table 7" id="7"/>
           <p:cNvGraphicFramePr>
             <a:graphicFrameLocks noGrp="true"/>
           </p:cNvGraphicFramePr>
@@ -3168,7 +3311,7 @@
                         <a:defRPr/>
                       </a:pPr>
                       <a:r>
-                        <a:rPr lang="en-US"/>
+                        <a:rPr lang="en-US" sz="1400"/>
                         <a:t>Schedule</a:t>
                       </a:r>
                       <a:endParaRPr lang="en-US" sz="1100"/>
@@ -3222,7 +3365,7 @@
                         <a:defRPr/>
                       </a:pPr>
                       <a:r>
-                        <a:rPr lang="en-US"/>
+                        <a:rPr lang="en-US" sz="1400"/>
                         <a:t>Scope</a:t>
                       </a:r>
                       <a:endParaRPr lang="en-US" sz="1100"/>
@@ -3276,7 +3419,7 @@
                         <a:defRPr/>
                       </a:pPr>
                       <a:r>
-                        <a:rPr lang="en-US"/>
+                        <a:rPr lang="en-US" sz="1400"/>
                         <a:t>Quality</a:t>
                       </a:r>
                       <a:endParaRPr lang="en-US" sz="1100"/>
@@ -3330,7 +3473,7 @@
                         <a:defRPr/>
                       </a:pPr>
                       <a:r>
-                        <a:rPr lang="en-US"/>
+                        <a:rPr lang="en-US" sz="1400"/>
                         <a:t>Cost</a:t>
                       </a:r>
                       <a:endParaRPr lang="en-US" sz="1100"/>
@@ -3386,7 +3529,7 @@
                         <a:defRPr/>
                       </a:pPr>
                       <a:r>
-                        <a:rPr lang="en-US"/>
+                        <a:rPr lang="en-US" sz="1400"/>
                         <a:t>GREEN</a:t>
                       </a:r>
                       <a:endParaRPr lang="en-US" sz="1100"/>
@@ -3443,7 +3586,7 @@
                         <a:defRPr/>
                       </a:pPr>
                       <a:r>
-                        <a:rPr lang="en-US"/>
+                        <a:rPr lang="en-US" sz="1400"/>
                         <a:t>GREEN</a:t>
                       </a:r>
                       <a:endParaRPr lang="en-US" sz="1100"/>
@@ -3500,7 +3643,7 @@
                         <a:defRPr/>
                       </a:pPr>
                       <a:r>
-                        <a:rPr lang="en-US"/>
+                        <a:rPr lang="en-US" sz="1400"/>
                         <a:t>GREEN</a:t>
                       </a:r>
                       <a:endParaRPr lang="en-US" sz="1100"/>
@@ -3557,7 +3700,7 @@
                         <a:defRPr/>
                       </a:pPr>
                       <a:r>
-                        <a:rPr lang="en-US"/>
+                        <a:rPr lang="en-US" sz="1400"/>
                         <a:t>GREEN</a:t>
                       </a:r>
                       <a:endParaRPr lang="en-US" sz="1100"/>
@@ -3612,14 +3755,14 @@
       </p:graphicFrame>
       <p:sp>
         <p:nvSpPr>
-          <p:cNvPr name="TextBox 4" id="4"/>
+          <p:cNvPr name="TextBox 8" id="8"/>
           <p:cNvSpPr txBox="true"/>
           <p:nvPr/>
         </p:nvSpPr>
         <p:spPr>
           <a:xfrm>
-            <a:off x="5905500" y="8191500"/>
-            <a:ext cx="4445000" cy="635000"/>
+            <a:off x="254000" y="1409700"/>
+            <a:ext cx="15748000" cy="7035800"/>
           </a:xfrm>
           <a:prstGeom prst="rect">
             <a:avLst/>
@@ -3629,91 +3772,6 @@
           <a:bodyPr anchor="t" rtlCol="false"/>
           <a:lstStyle/>
           <a:p>
-            <a:pPr algn="ctr">
-              <a:defRPr/>
-            </a:pPr>
-            <a:r>
-              <a:rPr lang="ru-RU"/>
-              <a:t/>
-            </a:r>
-            <a:r>
-              <a:rPr lang="en-US" sz="1200" i="true">
-                <a:solidFill>
-                  <a:srgbClr val="FF0000"/>
-                </a:solidFill>
-                <a:latin typeface="Calibri"/>
-              </a:rPr>
-              <a:t>Alcatel-Lucent Enterprise - Confidential</a:t>
-            </a:r>
-            <a:br>
-              <a:rPr lang="en-US" sz="1200" i="true">
-                <a:solidFill>
-                  <a:srgbClr val="FF0000"/>
-                </a:solidFill>
-                <a:latin typeface="Calibri"/>
-              </a:rPr>
-            </a:br>
-            <a:r>
-              <a:rPr lang="en-US" sz="1200" b="true">
-                <a:latin typeface="Calibri"/>
-              </a:rPr>
-              <a:t>Solely for authorized persons having a need to know</a:t>
-            </a:r>
-            <a:br>
-              <a:rPr lang="en-US" sz="1200" b="true">
-                <a:latin typeface="Calibri"/>
-              </a:rPr>
-            </a:br>
-            <a:r>
-              <a:rPr lang="en-US" sz="1200">
-                <a:latin typeface="Calibri"/>
-              </a:rPr>
-              <a:t>Proprietary - Use pursuant to Company Instruction</a:t>
-            </a:r>
-            <a:endParaRPr lang="en-US" sz="1100"/>
-          </a:p>
-        </p:txBody>
-      </p:sp>
-      <p:sp>
-        <p:nvSpPr>
-          <p:cNvPr name="AutoShape 5" id="5"/>
-          <p:cNvSpPr/>
-          <p:nvPr/>
-        </p:nvSpPr>
-        <p:spPr>
-          <a:xfrm>
-            <a:off x="254000" y="8064500"/>
-            <a:ext cx="15748000" cy="12700"/>
-          </a:xfrm>
-          <a:prstGeom prst="line">
-            <a:avLst/>
-          </a:prstGeom>
-          <a:ln>
-            <a:solidFill>
-              <a:srgbClr val="000000"/>
-            </a:solidFill>
-          </a:ln>
-        </p:spPr>
-      </p:sp>
-      <p:sp>
-        <p:nvSpPr>
-          <p:cNvPr name="TextBox 6" id="6"/>
-          <p:cNvSpPr txBox="true"/>
-          <p:nvPr/>
-        </p:nvSpPr>
-        <p:spPr>
-          <a:xfrm>
-            <a:off x="254000" y="1549400"/>
-            <a:ext cx="15748000" cy="6134100"/>
-          </a:xfrm>
-          <a:prstGeom prst="rect">
-            <a:avLst/>
-          </a:prstGeom>
-        </p:spPr>
-        <p:txBody>
-          <a:bodyPr anchor="t" rtlCol="false"/>
-          <a:lstStyle/>
-          <a:p>
             <a:pPr algn="l">
               <a:defRPr/>
             </a:pPr>
@@ -4034,66 +4092,6 @@
                 <a:latin typeface="Calibri"/>
               </a:rPr>
               <a:t>PowerPoint documents are made up of a tree of records. A record may contain either other records (in which case it is a Container), or data (in which case it's an Atom). </a:t>
-            </a:r>
-            <a:r>
-              <a:rPr lang="en-US" sz="1400">
-                <a:latin typeface="Calibri"/>
-              </a:rPr>
-              <a:t> </a:t>
-            </a:r>
-            <a:r>
-              <a:rPr lang="en-US" sz="1400">
-                <a:latin typeface="Calibri"/>
-              </a:rPr>
-              <a:t>A record can't hold both. PowerPoint documents don't have one overall container record. Instead, there are a number of different container records to be found at the top level.</a:t>
-            </a:r>
-            <a:r>
-              <a:rPr lang="en-US" sz="1400">
-                <a:latin typeface="Calibri"/>
-              </a:rPr>
-              <a:t> </a:t>
-            </a:r>
-            <a:r>
-              <a:rPr lang="en-US" sz="1400">
-                <a:latin typeface="Calibri"/>
-              </a:rPr>
-              <a:t>Any numbers or strings stored in the records are always stored in Little Endian format (least important bytes first). This is the case no matter what platform the file was written on - be that a Little Endian or a Big Endian system. </a:t>
-            </a:r>
-            <a:r>
-              <a:rPr lang="en-US" sz="1400">
-                <a:latin typeface="Calibri"/>
-              </a:rPr>
-              <a:t> </a:t>
-            </a:r>
-            <a:r>
-              <a:rPr lang="en-US" sz="1400">
-                <a:latin typeface="Calibri"/>
-              </a:rPr>
-              <a:t>PowerPoint may have Escher (DDF) records embedded in it. These are always held as the children of a PPDrawing record (record type 1036). Escher records have the same format as PowerPoint records.</a:t>
-            </a:r>
-            <a:r>
-              <a:rPr lang="en-US" sz="1400">
-                <a:latin typeface="Calibri"/>
-              </a:rPr>
-              <a:t> </a:t>
-            </a:r>
-            <a:r>
-              <a:rPr lang="en-US" sz="1400">
-                <a:latin typeface="Calibri"/>
-              </a:rPr>
-              <a:t>Hello mate! Hello mate! Hello mate! Hello mate! Hello mate! Hello mate! Hello mate! Hello mate! Hello mate! This is bold and underscore and both and not true false PowerPoint documents are made up of a tree of records. </a:t>
-            </a:r>
-            <a:r>
-              <a:rPr lang="en-US" sz="1400">
-                <a:latin typeface="Calibri"/>
-              </a:rPr>
-              <a:t> </a:t>
-            </a:r>
-            <a:r>
-              <a:rPr lang="en-US" sz="1400">
-                <a:latin typeface="Calibri"/>
-              </a:rPr>
-              <a:t>A record may contain either other records (in which case it is a Container), or data (in which case it's an Atom). A record can't hold both. PowerPoint documents don't have one overall container record. Instead, there are a number of different container records to be found at the top level. Any numbers or strings stored in the records are always stored in Little Endian format (least important bytes first). </a:t>
             </a:r>
             <a:r>
               <a:rPr lang="en-US" sz="1400">
@@ -4138,7 +4136,7 @@
         <p:spPr>
           <a:xfrm>
             <a:off x="254000" y="254000"/>
-            <a:ext cx="15748000" cy="7429500"/>
+            <a:ext cx="6350000" cy="762000"/>
           </a:xfrm>
           <a:prstGeom prst="rect">
             <a:avLst/>
@@ -4156,6 +4154,284 @@
               <a:t/>
             </a:r>
             <a:r>
+              <a:rPr lang="en-US" sz="1400" b="true">
+                <a:latin typeface="Calibri"/>
+              </a:rPr>
+              <a:t>Project name: </a:t>
+            </a:r>
+            <a:r>
+              <a:rPr lang="en-US" sz="1400">
+                <a:latin typeface="Calibri"/>
+              </a:rPr>
+              <a:t>Project Grape</a:t>
+            </a:r>
+            <a:br>
+              <a:rPr lang="en-US" sz="1400">
+                <a:latin typeface="Calibri"/>
+              </a:rPr>
+            </a:br>
+            <a:r>
+              <a:rPr lang="en-US" sz="1400" b="true">
+                <a:latin typeface="Calibri"/>
+              </a:rPr>
+              <a:t>Project manager: </a:t>
+            </a:r>
+            <a:r>
+              <a:rPr lang="en-US" sz="1400">
+                <a:latin typeface="Calibri"/>
+              </a:rPr>
+              <a:t>IKSANOV Aleksandr</a:t>
+            </a:r>
+            <a:br>
+              <a:rPr lang="en-US" sz="1400">
+                <a:latin typeface="Calibri"/>
+              </a:rPr>
+            </a:br>
+            <a:r>
+              <a:rPr lang="en-US" sz="1400" b="true">
+                <a:latin typeface="Calibri"/>
+              </a:rPr>
+              <a:t>Last Updated: </a:t>
+            </a:r>
+            <a:r>
+              <a:rPr lang="en-US" sz="1400">
+                <a:latin typeface="Calibri"/>
+              </a:rPr>
+              <a:t>Sun Apr 12 19:42:53 MSK 2020</a:t>
+            </a:r>
+            <a:endParaRPr lang="en-US" sz="1100"/>
+          </a:p>
+        </p:txBody>
+      </p:sp>
+      <p:sp>
+        <p:nvSpPr>
+          <p:cNvPr name="TextBox 3" id="3"/>
+          <p:cNvSpPr txBox="true"/>
+          <p:nvPr/>
+        </p:nvSpPr>
+        <p:spPr>
+          <a:xfrm>
+            <a:off x="254000" y="1155700"/>
+            <a:ext cx="15748000" cy="215900"/>
+          </a:xfrm>
+          <a:prstGeom prst="rect">
+            <a:avLst/>
+          </a:prstGeom>
+        </p:spPr>
+        <p:txBody>
+          <a:bodyPr anchor="t" rtlCol="false"/>
+          <a:lstStyle/>
+          <a:p>
+            <a:pPr algn="l">
+              <a:defRPr/>
+            </a:pPr>
+            <a:r>
+              <a:rPr lang="ru-RU"/>
+              <a:t/>
+            </a:r>
+            <a:r>
+              <a:rPr lang="en-US" sz="1400" b="true">
+                <a:latin typeface="Calibri"/>
+              </a:rPr>
+              <a:t>Executive Status Summary</a:t>
+            </a:r>
+            <a:endParaRPr lang="en-US" sz="1100"/>
+          </a:p>
+        </p:txBody>
+      </p:sp>
+      <p:sp>
+        <p:nvSpPr>
+          <p:cNvPr name="AutoShape 4" id="4"/>
+          <p:cNvSpPr/>
+          <p:nvPr/>
+        </p:nvSpPr>
+        <p:spPr>
+          <a:xfrm>
+            <a:off x="254000" y="1422400"/>
+            <a:ext cx="15748000" cy="12700"/>
+          </a:xfrm>
+          <a:prstGeom prst="line">
+            <a:avLst/>
+          </a:prstGeom>
+          <a:ln>
+            <a:solidFill>
+              <a:srgbClr val="000000"/>
+            </a:solidFill>
+          </a:ln>
+        </p:spPr>
+      </p:sp>
+      <p:sp>
+        <p:nvSpPr>
+          <p:cNvPr name="TextBox 5" id="5"/>
+          <p:cNvSpPr txBox="true"/>
+          <p:nvPr/>
+        </p:nvSpPr>
+        <p:spPr>
+          <a:xfrm>
+            <a:off x="5905500" y="8191500"/>
+            <a:ext cx="4445000" cy="635000"/>
+          </a:xfrm>
+          <a:prstGeom prst="rect">
+            <a:avLst/>
+          </a:prstGeom>
+        </p:spPr>
+        <p:txBody>
+          <a:bodyPr anchor="t" rtlCol="false"/>
+          <a:lstStyle/>
+          <a:p>
+            <a:pPr algn="ctr">
+              <a:defRPr/>
+            </a:pPr>
+            <a:r>
+              <a:rPr lang="ru-RU"/>
+              <a:t/>
+            </a:r>
+            <a:r>
+              <a:rPr lang="en-US" sz="1200" i="true">
+                <a:solidFill>
+                  <a:srgbClr val="FF0000"/>
+                </a:solidFill>
+                <a:latin typeface="Calibri"/>
+              </a:rPr>
+              <a:t>Alcatel-Lucent Enterprise - Confidential</a:t>
+            </a:r>
+            <a:br>
+              <a:rPr lang="en-US" sz="1200" i="true">
+                <a:solidFill>
+                  <a:srgbClr val="FF0000"/>
+                </a:solidFill>
+                <a:latin typeface="Calibri"/>
+              </a:rPr>
+            </a:br>
+            <a:r>
+              <a:rPr lang="en-US" sz="1200" b="true">
+                <a:latin typeface="Calibri"/>
+              </a:rPr>
+              <a:t>Solely for authorized persons having a need to know</a:t>
+            </a:r>
+            <a:br>
+              <a:rPr lang="en-US" sz="1200" b="true">
+                <a:latin typeface="Calibri"/>
+              </a:rPr>
+            </a:br>
+            <a:r>
+              <a:rPr lang="en-US" sz="1200">
+                <a:latin typeface="Calibri"/>
+              </a:rPr>
+              <a:t>Proprietary - Use pursuant to Company Instruction</a:t>
+            </a:r>
+            <a:endParaRPr lang="en-US" sz="1100"/>
+          </a:p>
+        </p:txBody>
+      </p:sp>
+      <p:sp>
+        <p:nvSpPr>
+          <p:cNvPr name="AutoShape 6" id="6"/>
+          <p:cNvSpPr/>
+          <p:nvPr/>
+        </p:nvSpPr>
+        <p:spPr>
+          <a:xfrm>
+            <a:off x="254000" y="8064500"/>
+            <a:ext cx="15748000" cy="12700"/>
+          </a:xfrm>
+          <a:prstGeom prst="line">
+            <a:avLst/>
+          </a:prstGeom>
+          <a:ln>
+            <a:solidFill>
+              <a:srgbClr val="000000"/>
+            </a:solidFill>
+          </a:ln>
+        </p:spPr>
+      </p:sp>
+      <p:sp>
+        <p:nvSpPr>
+          <p:cNvPr name="TextBox 7" id="7"/>
+          <p:cNvSpPr txBox="true"/>
+          <p:nvPr/>
+        </p:nvSpPr>
+        <p:spPr>
+          <a:xfrm>
+            <a:off x="254000" y="1409700"/>
+            <a:ext cx="15748000" cy="7035800"/>
+          </a:xfrm>
+          <a:prstGeom prst="rect">
+            <a:avLst/>
+          </a:prstGeom>
+        </p:spPr>
+        <p:txBody>
+          <a:bodyPr anchor="t" rtlCol="false"/>
+          <a:lstStyle/>
+          <a:p>
+            <a:pPr algn="l">
+              <a:defRPr/>
+            </a:pPr>
+            <a:r>
+              <a:rPr lang="ru-RU"/>
+              <a:t/>
+            </a:r>
+            <a:r>
+              <a:rPr lang="en-US" sz="1400">
+                <a:latin typeface="Calibri"/>
+              </a:rPr>
+              <a:t>A record can't hold both. PowerPoint documents don't have one overall container record. Instead, there are a number of different container records to be found at the top level.</a:t>
+            </a:r>
+            <a:r>
+              <a:rPr lang="en-US" sz="1400">
+                <a:latin typeface="Calibri"/>
+              </a:rPr>
+              <a:t> </a:t>
+            </a:r>
+            <a:r>
+              <a:rPr lang="en-US" sz="1400">
+                <a:latin typeface="Calibri"/>
+              </a:rPr>
+              <a:t>Any numbers or strings stored in the records are always stored in Little Endian format (least important bytes first). This is the case no matter what platform the file was written on - be that a Little Endian or a Big Endian system. </a:t>
+            </a:r>
+            <a:r>
+              <a:rPr lang="en-US" sz="1400">
+                <a:latin typeface="Calibri"/>
+              </a:rPr>
+              <a:t> </a:t>
+            </a:r>
+            <a:r>
+              <a:rPr lang="en-US" sz="1400">
+                <a:latin typeface="Calibri"/>
+              </a:rPr>
+              <a:t>PowerPoint may have Escher (DDF) records embedded in it. These are always held as the children of a PPDrawing record (record type 1036). Escher records have the same format as PowerPoint records.</a:t>
+            </a:r>
+            <a:r>
+              <a:rPr lang="en-US" sz="1400">
+                <a:latin typeface="Calibri"/>
+              </a:rPr>
+              <a:t> </a:t>
+            </a:r>
+            <a:r>
+              <a:rPr lang="en-US" sz="1400">
+                <a:latin typeface="Calibri"/>
+              </a:rPr>
+              <a:t>Hello mate! Hello mate! Hello mate! Hello mate! Hello mate! Hello mate! Hello mate! Hello mate! Hello mate! This is bold and underscore and both and not true false PowerPoint documents are made up of a tree of records. </a:t>
+            </a:r>
+            <a:r>
+              <a:rPr lang="en-US" sz="1400">
+                <a:latin typeface="Calibri"/>
+              </a:rPr>
+              <a:t> </a:t>
+            </a:r>
+            <a:r>
+              <a:rPr lang="en-US" sz="1400">
+                <a:latin typeface="Calibri"/>
+              </a:rPr>
+              <a:t>A record may contain either other records (in which case it is a Container), or data (in which case it's an Atom). A record can't hold both. PowerPoint documents don't have one overall container record. Instead, there are a number of different container records to be found at the top level. Any numbers or strings stored in the records are always stored in Little Endian format (least important bytes first). </a:t>
+            </a:r>
+            <a:r>
+              <a:rPr lang="en-US" sz="1400">
+                <a:latin typeface="Calibri"/>
+              </a:rPr>
+              <a:t> </a:t>
+            </a:r>
+            <a:r>
               <a:rPr lang="en-US" sz="1400">
                 <a:solidFill>
                   <a:srgbClr val="18CB0C"/>
@@ -4603,6 +4879,278 @@
               <a:buFont typeface="Arial"/>
               <a:buChar char="•"/>
             </a:pPr>
+          </a:p>
+        </p:txBody>
+      </p:sp>
+    </p:spTree>
+  </p:cSld>
+  <p:clrMapOvr>
+    <a:masterClrMapping/>
+  </p:clrMapOvr>
+</p:sld>
+</file>
+
+<file path=ppt/slides/slide3.xml><?xml version="1.0" encoding="utf-8"?>
+<p:sld xmlns:p="http://schemas.openxmlformats.org/presentationml/2006/main" xmlns:a="http://schemas.openxmlformats.org/drawingml/2006/main">
+  <p:cSld>
+    <p:spTree>
+      <p:nvGrpSpPr>
+        <p:cNvPr id="1" name=""/>
+        <p:cNvGrpSpPr/>
+        <p:nvPr/>
+      </p:nvGrpSpPr>
+      <p:grpSpPr>
+        <a:xfrm>
+          <a:off x="0" y="0"/>
+          <a:ext cx="0" cy="0"/>
+          <a:chOff x="0" y="0"/>
+          <a:chExt cx="0" cy="0"/>
+        </a:xfrm>
+      </p:grpSpPr>
+      <p:sp>
+        <p:nvSpPr>
+          <p:cNvPr name="TextBox 2" id="2"/>
+          <p:cNvSpPr txBox="true"/>
+          <p:nvPr/>
+        </p:nvSpPr>
+        <p:spPr>
+          <a:xfrm>
+            <a:off x="254000" y="254000"/>
+            <a:ext cx="6350000" cy="762000"/>
+          </a:xfrm>
+          <a:prstGeom prst="rect">
+            <a:avLst/>
+          </a:prstGeom>
+        </p:spPr>
+        <p:txBody>
+          <a:bodyPr anchor="t" rtlCol="false"/>
+          <a:lstStyle/>
+          <a:p>
+            <a:pPr algn="l">
+              <a:defRPr/>
+            </a:pPr>
+            <a:r>
+              <a:rPr lang="ru-RU"/>
+              <a:t/>
+            </a:r>
+            <a:r>
+              <a:rPr lang="en-US" sz="1400" b="true">
+                <a:latin typeface="Calibri"/>
+              </a:rPr>
+              <a:t>Project name: </a:t>
+            </a:r>
+            <a:r>
+              <a:rPr lang="en-US" sz="1400">
+                <a:latin typeface="Calibri"/>
+              </a:rPr>
+              <a:t>Project Grape</a:t>
+            </a:r>
+            <a:br>
+              <a:rPr lang="en-US" sz="1400">
+                <a:latin typeface="Calibri"/>
+              </a:rPr>
+            </a:br>
+            <a:r>
+              <a:rPr lang="en-US" sz="1400" b="true">
+                <a:latin typeface="Calibri"/>
+              </a:rPr>
+              <a:t>Project manager: </a:t>
+            </a:r>
+            <a:r>
+              <a:rPr lang="en-US" sz="1400">
+                <a:latin typeface="Calibri"/>
+              </a:rPr>
+              <a:t>IKSANOV Aleksandr</a:t>
+            </a:r>
+            <a:br>
+              <a:rPr lang="en-US" sz="1400">
+                <a:latin typeface="Calibri"/>
+              </a:rPr>
+            </a:br>
+            <a:r>
+              <a:rPr lang="en-US" sz="1400" b="true">
+                <a:latin typeface="Calibri"/>
+              </a:rPr>
+              <a:t>Last Updated: </a:t>
+            </a:r>
+            <a:r>
+              <a:rPr lang="en-US" sz="1400">
+                <a:latin typeface="Calibri"/>
+              </a:rPr>
+              <a:t>Sun Apr 12 19:42:53 MSK 2020</a:t>
+            </a:r>
+            <a:endParaRPr lang="en-US" sz="1100"/>
+          </a:p>
+        </p:txBody>
+      </p:sp>
+      <p:sp>
+        <p:nvSpPr>
+          <p:cNvPr name="TextBox 3" id="3"/>
+          <p:cNvSpPr txBox="true"/>
+          <p:nvPr/>
+        </p:nvSpPr>
+        <p:spPr>
+          <a:xfrm>
+            <a:off x="254000" y="1155700"/>
+            <a:ext cx="15748000" cy="215900"/>
+          </a:xfrm>
+          <a:prstGeom prst="rect">
+            <a:avLst/>
+          </a:prstGeom>
+        </p:spPr>
+        <p:txBody>
+          <a:bodyPr anchor="t" rtlCol="false"/>
+          <a:lstStyle/>
+          <a:p>
+            <a:pPr algn="l">
+              <a:defRPr/>
+            </a:pPr>
+            <a:r>
+              <a:rPr lang="ru-RU"/>
+              <a:t/>
+            </a:r>
+            <a:r>
+              <a:rPr lang="en-US" sz="1400" b="true">
+                <a:latin typeface="Calibri"/>
+              </a:rPr>
+              <a:t>Executive Status Summary</a:t>
+            </a:r>
+            <a:endParaRPr lang="en-US" sz="1100"/>
+          </a:p>
+        </p:txBody>
+      </p:sp>
+      <p:sp>
+        <p:nvSpPr>
+          <p:cNvPr name="AutoShape 4" id="4"/>
+          <p:cNvSpPr/>
+          <p:nvPr/>
+        </p:nvSpPr>
+        <p:spPr>
+          <a:xfrm>
+            <a:off x="254000" y="1422400"/>
+            <a:ext cx="15748000" cy="12700"/>
+          </a:xfrm>
+          <a:prstGeom prst="line">
+            <a:avLst/>
+          </a:prstGeom>
+          <a:ln>
+            <a:solidFill>
+              <a:srgbClr val="000000"/>
+            </a:solidFill>
+          </a:ln>
+        </p:spPr>
+      </p:sp>
+      <p:sp>
+        <p:nvSpPr>
+          <p:cNvPr name="TextBox 5" id="5"/>
+          <p:cNvSpPr txBox="true"/>
+          <p:nvPr/>
+        </p:nvSpPr>
+        <p:spPr>
+          <a:xfrm>
+            <a:off x="5905500" y="8191500"/>
+            <a:ext cx="4445000" cy="635000"/>
+          </a:xfrm>
+          <a:prstGeom prst="rect">
+            <a:avLst/>
+          </a:prstGeom>
+        </p:spPr>
+        <p:txBody>
+          <a:bodyPr anchor="t" rtlCol="false"/>
+          <a:lstStyle/>
+          <a:p>
+            <a:pPr algn="ctr">
+              <a:defRPr/>
+            </a:pPr>
+            <a:r>
+              <a:rPr lang="ru-RU"/>
+              <a:t/>
+            </a:r>
+            <a:r>
+              <a:rPr lang="en-US" sz="1200" i="true">
+                <a:solidFill>
+                  <a:srgbClr val="FF0000"/>
+                </a:solidFill>
+                <a:latin typeface="Calibri"/>
+              </a:rPr>
+              <a:t>Alcatel-Lucent Enterprise - Confidential</a:t>
+            </a:r>
+            <a:br>
+              <a:rPr lang="en-US" sz="1200" i="true">
+                <a:solidFill>
+                  <a:srgbClr val="FF0000"/>
+                </a:solidFill>
+                <a:latin typeface="Calibri"/>
+              </a:rPr>
+            </a:br>
+            <a:r>
+              <a:rPr lang="en-US" sz="1200" b="true">
+                <a:latin typeface="Calibri"/>
+              </a:rPr>
+              <a:t>Solely for authorized persons having a need to know</a:t>
+            </a:r>
+            <a:br>
+              <a:rPr lang="en-US" sz="1200" b="true">
+                <a:latin typeface="Calibri"/>
+              </a:rPr>
+            </a:br>
+            <a:r>
+              <a:rPr lang="en-US" sz="1200">
+                <a:latin typeface="Calibri"/>
+              </a:rPr>
+              <a:t>Proprietary - Use pursuant to Company Instruction</a:t>
+            </a:r>
+            <a:endParaRPr lang="en-US" sz="1100"/>
+          </a:p>
+        </p:txBody>
+      </p:sp>
+      <p:sp>
+        <p:nvSpPr>
+          <p:cNvPr name="AutoShape 6" id="6"/>
+          <p:cNvSpPr/>
+          <p:nvPr/>
+        </p:nvSpPr>
+        <p:spPr>
+          <a:xfrm>
+            <a:off x="254000" y="8064500"/>
+            <a:ext cx="15748000" cy="12700"/>
+          </a:xfrm>
+          <a:prstGeom prst="line">
+            <a:avLst/>
+          </a:prstGeom>
+          <a:ln>
+            <a:solidFill>
+              <a:srgbClr val="000000"/>
+            </a:solidFill>
+          </a:ln>
+        </p:spPr>
+      </p:sp>
+      <p:sp>
+        <p:nvSpPr>
+          <p:cNvPr name="TextBox 7" id="7"/>
+          <p:cNvSpPr txBox="true"/>
+          <p:nvPr/>
+        </p:nvSpPr>
+        <p:spPr>
+          <a:xfrm>
+            <a:off x="254000" y="1409700"/>
+            <a:ext cx="15748000" cy="7035800"/>
+          </a:xfrm>
+          <a:prstGeom prst="rect">
+            <a:avLst/>
+          </a:prstGeom>
+        </p:spPr>
+        <p:txBody>
+          <a:bodyPr anchor="t" rtlCol="false"/>
+          <a:lstStyle/>
+          <a:p>
+            <a:pPr algn="l">
+              <a:defRPr/>
+            </a:pPr>
+            <a:r>
+              <a:rPr lang="ru-RU"/>
+              <a:t/>
+            </a:r>
             <a:r>
               <a:rPr lang="en-US" sz="1400">
                 <a:latin typeface="Calibri"/>
@@ -4615,6 +5163,7 @@
               </a:rPr>
               <a:t> </a:t>
             </a:r>
+            <a:endParaRPr lang="en-US" sz="1100"/>
           </a:p>
           <a:p>
             <a:pPr>
@@ -4656,6 +5205,24 @@
                 <a:latin typeface="Calibri"/>
               </a:rPr>
               <a:t>q</a:t>
+            </a:r>
+            <a:r>
+              <a:rPr lang="en-US" sz="1400">
+                <a:latin typeface="Calibri"/>
+              </a:rPr>
+              <a:t> </a:t>
+            </a:r>
+          </a:p>
+          <a:p>
+            <a:pPr>
+              <a:buFont typeface="Arial"/>
+              <a:buChar char="•"/>
+            </a:pPr>
+            <a:r>
+              <a:rPr lang="en-US" sz="1400">
+                <a:latin typeface="Calibri"/>
+              </a:rPr>
+              <a:t>sss</a:t>
             </a:r>
             <a:r>
               <a:rPr lang="en-US" sz="1400">

</xml_diff>

<commit_message>
checkpoint; current problem - wrong occupiedHeight value on new slides
</commit_message>
<xml_diff>
--- a/html-to-ppt/TextFormat.pptx
+++ b/html-to-ppt/TextFormat.pptx
@@ -7,7 +7,6 @@
   <p:sldIdLst>
     <p:sldId id="256" r:id="rId6"/>
     <p:sldId id="257" r:id="rId7"/>
-    <p:sldId id="258" r:id="rId8"/>
   </p:sldIdLst>
   <p:sldSz cx="16256000" cy="9144000"/>
   <p:notesSz cx="6858000" cy="9144000"/>
@@ -3131,7 +3130,7 @@
               <a:rPr lang="en-US" sz="1400">
                 <a:latin typeface="Calibri"/>
               </a:rPr>
-              <a:t>Sun Apr 12 19:42:53 MSK 2020</a:t>
+              <a:t>Mon Apr 13 14:58:13 MSK 2020</a:t>
             </a:r>
             <a:endParaRPr lang="en-US" sz="1100"/>
           </a:p>
@@ -3145,7 +3144,7 @@
         </p:nvSpPr>
         <p:spPr>
           <a:xfrm>
-            <a:off x="254000" y="1155700"/>
+            <a:off x="254000" y="1244600"/>
             <a:ext cx="15748000" cy="215900"/>
           </a:xfrm>
           <a:prstGeom prst="rect">
@@ -3181,7 +3180,7 @@
         </p:nvSpPr>
         <p:spPr>
           <a:xfrm>
-            <a:off x="254000" y="1422400"/>
+            <a:off x="254000" y="1562100"/>
             <a:ext cx="15748000" cy="12700"/>
           </a:xfrm>
           <a:prstGeom prst="line">
@@ -3761,8 +3760,8 @@
         </p:nvSpPr>
         <p:spPr>
           <a:xfrm>
-            <a:off x="254000" y="1409700"/>
-            <a:ext cx="15748000" cy="7035800"/>
+            <a:off x="254000" y="1562100"/>
+            <a:ext cx="15748000" cy="6375400"/>
           </a:xfrm>
           <a:prstGeom prst="rect">
             <a:avLst/>
@@ -3788,12 +3787,6 @@
               </a:rPr>
               <a:t>Hello mate! Hello mate! Hello mate! Hello mate! Hello mate! Hello mate! Hello mate! Hello mate! Hello mate!</a:t>
             </a:r>
-            <a:r>
-              <a:rPr lang="en-US" sz="1400">
-                <a:latin typeface="Calibri"/>
-              </a:rPr>
-              <a:t> </a:t>
-            </a:r>
           </a:p>
           <a:p>
             <a:r>
@@ -3860,26 +3853,196 @@
           <a:p>
             <a:r>
               <a:rPr lang="en-US" sz="1400">
-                <a:latin typeface="Calibri"/>
-              </a:rPr>
-              <a:t> </a:t>
-            </a:r>
-            <a:r>
-              <a:rPr lang="en-US" sz="1400">
+                <a:solidFill>
+                  <a:srgbClr val="FF0000"/>
+                </a:solidFill>
+                <a:latin typeface="Calibri"/>
+              </a:rPr>
+              <a:t> </a:t>
+            </a:r>
+            <a:r>
+              <a:rPr lang="en-US" sz="1400">
+                <a:solidFill>
+                  <a:srgbClr val="FF0000"/>
+                </a:solidFill>
                 <a:latin typeface="Calibri"/>
               </a:rPr>
               <a:t>PowerPoint documents are made up of a tree of records. A record may contain either other records (in which case it is a Container), or data (in which case it's an Atom). </a:t>
             </a:r>
             <a:r>
               <a:rPr lang="en-US" sz="1400">
-                <a:latin typeface="Calibri"/>
-              </a:rPr>
-              <a:t> </a:t>
-            </a:r>
-            <a:r>
-              <a:rPr lang="en-US" sz="1400">
-                <a:solidFill>
-                  <a:srgbClr val="18CB0C"/>
+                <a:solidFill>
+                  <a:srgbClr val="FF0000"/>
+                </a:solidFill>
+                <a:latin typeface="Calibri"/>
+              </a:rPr>
+              <a:t> </a:t>
+            </a:r>
+            <a:r>
+              <a:rPr lang="en-US" sz="1400">
+                <a:solidFill>
+                  <a:srgbClr val="FF0000"/>
+                </a:solidFill>
+                <a:latin typeface="Calibri"/>
+              </a:rPr>
+              <a:t> A record can't hold both. PowerPoint documents don't have one overall container record. Instead, there are a number of different container records to be found at the top level.</a:t>
+            </a:r>
+            <a:r>
+              <a:rPr lang="en-US" sz="1400">
+                <a:solidFill>
+                  <a:srgbClr val="FF0000"/>
+                </a:solidFill>
+                <a:latin typeface="Calibri"/>
+              </a:rPr>
+              <a:t> </a:t>
+            </a:r>
+            <a:r>
+              <a:rPr lang="en-US" sz="1400">
+                <a:solidFill>
+                  <a:srgbClr val="FF0000"/>
+                </a:solidFill>
+                <a:latin typeface="Calibri"/>
+              </a:rPr>
+              <a:t>Any numbers or strings stored in the records are always stored in Little Endian format (least important bytes first). This is the case no matter what platform the file was written on - be that a Little Endian or a Big Endian system. </a:t>
+            </a:r>
+            <a:r>
+              <a:rPr lang="en-US" sz="1400">
+                <a:solidFill>
+                  <a:srgbClr val="FF0000"/>
+                </a:solidFill>
+                <a:latin typeface="Calibri"/>
+              </a:rPr>
+              <a:t> </a:t>
+            </a:r>
+            <a:r>
+              <a:rPr lang="en-US" sz="1400">
+                <a:solidFill>
+                  <a:srgbClr val="FF0000"/>
+                </a:solidFill>
+                <a:latin typeface="Calibri"/>
+              </a:rPr>
+              <a:t>PowerPoint may have Escher (DDF) records embedded in it. These are always held as the children of a PPDrawing record (record type 1036). Escher records have the same format as PowerPoint records.</a:t>
+            </a:r>
+            <a:r>
+              <a:rPr lang="en-US" sz="1400">
+                <a:solidFill>
+                  <a:srgbClr val="FF0000"/>
+                </a:solidFill>
+                <a:latin typeface="Calibri"/>
+              </a:rPr>
+              <a:t> </a:t>
+            </a:r>
+            <a:r>
+              <a:rPr lang="en-US" sz="1400">
+                <a:solidFill>
+                  <a:srgbClr val="FF0000"/>
+                </a:solidFill>
+                <a:latin typeface="Calibri"/>
+              </a:rPr>
+              <a:t>Hello mate! Hello mate! Hello mate! Hello mate! Hello mate! Hello mate! Hello mate! Hello mate! Hello mate! This is bold and underscore and both and not true false PowerPoint documents are made up of a tree of records. </a:t>
+            </a:r>
+            <a:r>
+              <a:rPr lang="en-US" sz="1400">
+                <a:solidFill>
+                  <a:srgbClr val="FF0000"/>
+                </a:solidFill>
+                <a:latin typeface="Calibri"/>
+              </a:rPr>
+              <a:t> </a:t>
+            </a:r>
+            <a:r>
+              <a:rPr lang="en-US" sz="1400">
+                <a:solidFill>
+                  <a:srgbClr val="FF0000"/>
+                </a:solidFill>
+                <a:latin typeface="Calibri"/>
+              </a:rPr>
+              <a:t>A record may contain either other records (in which case it is a Container), or data (in which case it's an Atom). A record can't hold both. PowerPoint documents don't have one overall container record. Instead, there are a number of different container records to be found at the top level. Any numbers or strings stored in the records are always stored in Little Endian format (least important bytes first). </a:t>
+            </a:r>
+            <a:r>
+              <a:rPr lang="en-US" sz="1400">
+                <a:solidFill>
+                  <a:srgbClr val="FF0000"/>
+                </a:solidFill>
+                <a:latin typeface="Calibri"/>
+              </a:rPr>
+              <a:t> </a:t>
+            </a:r>
+            <a:r>
+              <a:rPr lang="en-US" sz="1400">
+                <a:solidFill>
+                  <a:srgbClr val="FF0000"/>
+                </a:solidFill>
+                <a:latin typeface="Calibri"/>
+              </a:rPr>
+              <a:t>This is the case no matter what platform the file was written on - be that a Little Endian or a Big Endian system. PowerPoint may have Escher (DDF) records embedded in it. These are always held as the children of a PPDrawing record (record type 1036). Escher records have the same format as PowerPoint records. Hello mate! Hello mate! Hello mate! Hello mate! Hello mate! Hello mate! Hello mate! Hello mate! Hello mate! This is bold and underscore and both and not true false PowerPoint documents are made up of a tree of records.</a:t>
+            </a:r>
+            <a:r>
+              <a:rPr lang="en-US" sz="1400">
+                <a:solidFill>
+                  <a:srgbClr val="FF0000"/>
+                </a:solidFill>
+                <a:latin typeface="Calibri"/>
+              </a:rPr>
+              <a:t> </a:t>
+            </a:r>
+            <a:r>
+              <a:rPr lang="en-US" sz="1400">
+                <a:solidFill>
+                  <a:srgbClr val="FF0000"/>
+                </a:solidFill>
+                <a:latin typeface="Calibri"/>
+              </a:rPr>
+              <a:t>A record may contain either other records (in which case it is a Container), or data (in which case it's an Atom). A record can't hold both. PowerPoint documents don't have one overall container record</a:t>
+            </a:r>
+            <a:r>
+              <a:rPr lang="en-US" sz="1400">
+                <a:solidFill>
+                  <a:srgbClr val="FF0000"/>
+                </a:solidFill>
+                <a:latin typeface="Calibri"/>
+              </a:rPr>
+              <a:t> </a:t>
+            </a:r>
+            <a:r>
+              <a:rPr lang="en-US" sz="1400">
+                <a:latin typeface="Calibri"/>
+              </a:rPr>
+              <a:t> </a:t>
+            </a:r>
+          </a:p>
+          <a:p>
+            <a:r>
+              <a:rPr lang="en-US" sz="1400">
+                <a:solidFill>
+                  <a:srgbClr val="00FF00"/>
+                </a:solidFill>
+                <a:latin typeface="Calibri"/>
+              </a:rPr>
+              <a:t> </a:t>
+            </a:r>
+            <a:r>
+              <a:rPr lang="en-US" sz="1400">
+                <a:solidFill>
+                  <a:srgbClr val="00FF00"/>
+                </a:solidFill>
+                <a:latin typeface="Calibri"/>
+              </a:rPr>
+              <a:t>PowerPoint documents are made up of a tree of records. A record may contain either other records (in which case it is a Container), or data (in which case it's an Atom). </a:t>
+            </a:r>
+            <a:r>
+              <a:rPr lang="en-US" sz="1400">
+                <a:solidFill>
+                  <a:srgbClr val="00FF00"/>
+                </a:solidFill>
+                <a:latin typeface="Calibri"/>
+              </a:rPr>
+              <a:t> </a:t>
+            </a:r>
+            <a:r>
+              <a:rPr lang="en-US" sz="1400">
+                <a:solidFill>
+                  <a:srgbClr val="00FF00"/>
                 </a:solidFill>
                 <a:latin typeface="Calibri"/>
               </a:rPr>
@@ -3887,214 +4050,242 @@
             </a:r>
             <a:r>
               <a:rPr lang="en-US" sz="1400">
-                <a:latin typeface="Calibri"/>
-              </a:rPr>
-              <a:t> </a:t>
-            </a:r>
-            <a:r>
-              <a:rPr lang="en-US" sz="1400">
+                <a:solidFill>
+                  <a:srgbClr val="00FF00"/>
+                </a:solidFill>
+                <a:latin typeface="Calibri"/>
+              </a:rPr>
+              <a:t> </a:t>
+            </a:r>
+            <a:r>
+              <a:rPr lang="en-US" sz="1400">
+                <a:solidFill>
+                  <a:srgbClr val="00FF00"/>
+                </a:solidFill>
                 <a:latin typeface="Calibri"/>
               </a:rPr>
               <a:t>Any numbers or strings stored in the records are always stored in Little Endian format (least important bytes first). This is the case no matter what platform the file was written on - be that a Little Endian or a Big Endian system. </a:t>
             </a:r>
             <a:r>
               <a:rPr lang="en-US" sz="1400">
-                <a:latin typeface="Calibri"/>
-              </a:rPr>
-              <a:t> </a:t>
-            </a:r>
-            <a:r>
-              <a:rPr lang="en-US" sz="1400">
+                <a:solidFill>
+                  <a:srgbClr val="00FF00"/>
+                </a:solidFill>
+                <a:latin typeface="Calibri"/>
+              </a:rPr>
+              <a:t> </a:t>
+            </a:r>
+            <a:r>
+              <a:rPr lang="en-US" sz="1400">
+                <a:solidFill>
+                  <a:srgbClr val="00FF00"/>
+                </a:solidFill>
                 <a:latin typeface="Calibri"/>
               </a:rPr>
               <a:t>PowerPoint may have Escher (DDF) records embedded in it. These are always held as the children of a PPDrawing record (record type 1036). Escher records have the same format as PowerPoint records.</a:t>
             </a:r>
             <a:r>
               <a:rPr lang="en-US" sz="1400">
-                <a:latin typeface="Calibri"/>
-              </a:rPr>
-              <a:t> </a:t>
-            </a:r>
-            <a:r>
-              <a:rPr lang="en-US" sz="1400">
+                <a:solidFill>
+                  <a:srgbClr val="00FF00"/>
+                </a:solidFill>
+                <a:latin typeface="Calibri"/>
+              </a:rPr>
+              <a:t> </a:t>
+            </a:r>
+            <a:r>
+              <a:rPr lang="en-US" sz="1400">
+                <a:solidFill>
+                  <a:srgbClr val="00FF00"/>
+                </a:solidFill>
                 <a:latin typeface="Calibri"/>
               </a:rPr>
               <a:t>Hello mate! Hello mate! Hello mate! Hello mate! Hello mate! Hello mate! Hello mate! Hello mate! Hello mate! This is bold and underscore and both and not true false PowerPoint documents are made up of a tree of records. </a:t>
             </a:r>
             <a:r>
               <a:rPr lang="en-US" sz="1400">
-                <a:latin typeface="Calibri"/>
-              </a:rPr>
-              <a:t> </a:t>
-            </a:r>
-            <a:r>
-              <a:rPr lang="en-US" sz="1400">
+                <a:solidFill>
+                  <a:srgbClr val="00FF00"/>
+                </a:solidFill>
+                <a:latin typeface="Calibri"/>
+              </a:rPr>
+              <a:t> </a:t>
+            </a:r>
+            <a:r>
+              <a:rPr lang="en-US" sz="1400">
+                <a:solidFill>
+                  <a:srgbClr val="00FF00"/>
+                </a:solidFill>
                 <a:latin typeface="Calibri"/>
               </a:rPr>
               <a:t>A record may contain either other records (in which case it is a Container), or data (in which case it's an Atom). A record can't hold both. PowerPoint documents don't have one overall container record. Instead, there are a number of different container records to be found at the top level. Any numbers or strings stored in the records are always stored in Little Endian format (least important bytes first). </a:t>
             </a:r>
             <a:r>
               <a:rPr lang="en-US" sz="1400">
-                <a:latin typeface="Calibri"/>
-              </a:rPr>
-              <a:t> </a:t>
-            </a:r>
-            <a:r>
-              <a:rPr lang="en-US" sz="1400">
+                <a:solidFill>
+                  <a:srgbClr val="00FF00"/>
+                </a:solidFill>
+                <a:latin typeface="Calibri"/>
+              </a:rPr>
+              <a:t> </a:t>
+            </a:r>
+            <a:r>
+              <a:rPr lang="en-US" sz="1400">
+                <a:solidFill>
+                  <a:srgbClr val="00FF00"/>
+                </a:solidFill>
                 <a:latin typeface="Calibri"/>
               </a:rPr>
               <a:t>This is the case no matter what platform the file was written on - be that a Little Endian or a Big Endian system. PowerPoint may have Escher (DDF) records embedded in it. These are always held as the children of a PPDrawing record (record type 1036). Escher records have the same format as PowerPoint records. Hello mate! Hello mate! Hello mate! Hello mate! Hello mate! Hello mate! Hello mate! Hello mate! Hello mate! This is bold and underscore and both and not true false PowerPoint documents are made up of a tree of records.</a:t>
             </a:r>
             <a:r>
               <a:rPr lang="en-US" sz="1400">
-                <a:latin typeface="Calibri"/>
-              </a:rPr>
-              <a:t> </a:t>
-            </a:r>
-            <a:r>
-              <a:rPr lang="en-US" sz="1400">
+                <a:solidFill>
+                  <a:srgbClr val="00FF00"/>
+                </a:solidFill>
+                <a:latin typeface="Calibri"/>
+              </a:rPr>
+              <a:t> </a:t>
+            </a:r>
+            <a:r>
+              <a:rPr lang="en-US" sz="1400">
+                <a:solidFill>
+                  <a:srgbClr val="00FF00"/>
+                </a:solidFill>
                 <a:latin typeface="Calibri"/>
               </a:rPr>
               <a:t>A record may contain either other records (in which case it is a Container), or data (in which case it's an Atom). A record can't hold both. PowerPoint documents don't have one overall container record</a:t>
             </a:r>
             <a:r>
               <a:rPr lang="en-US" sz="1400">
-                <a:latin typeface="Calibri"/>
-              </a:rPr>
-              <a:t> </a:t>
-            </a:r>
-            <a:r>
-              <a:rPr lang="en-US" sz="1400">
-                <a:latin typeface="Calibri"/>
-              </a:rPr>
-              <a:t> </a:t>
-            </a:r>
-          </a:p>
-          <a:p>
-            <a:r>
-              <a:rPr lang="en-US" sz="1400">
-                <a:latin typeface="Calibri"/>
-              </a:rPr>
-              <a:t> </a:t>
-            </a:r>
-            <a:r>
-              <a:rPr lang="en-US" sz="1400">
+                <a:solidFill>
+                  <a:srgbClr val="00FF00"/>
+                </a:solidFill>
+                <a:latin typeface="Calibri"/>
+              </a:rPr>
+              <a:t> </a:t>
+            </a:r>
+            <a:r>
+              <a:rPr lang="en-US" sz="1400">
+                <a:latin typeface="Calibri"/>
+              </a:rPr>
+              <a:t> </a:t>
+            </a:r>
+          </a:p>
+          <a:p>
+            <a:r>
+              <a:rPr lang="en-US" sz="1400">
+                <a:solidFill>
+                  <a:srgbClr val="0000FF"/>
+                </a:solidFill>
+                <a:latin typeface="Calibri"/>
+              </a:rPr>
+              <a:t> </a:t>
+            </a:r>
+            <a:r>
+              <a:rPr lang="en-US" sz="1400">
+                <a:solidFill>
+                  <a:srgbClr val="0000FF"/>
+                </a:solidFill>
                 <a:latin typeface="Calibri"/>
               </a:rPr>
               <a:t>PowerPoint documents are made up of a tree of records. A record may contain either other records (in which case it is a Container), or data (in which case it's an Atom). </a:t>
             </a:r>
             <a:r>
               <a:rPr lang="en-US" sz="1400">
-                <a:latin typeface="Calibri"/>
-              </a:rPr>
-              <a:t> </a:t>
-            </a:r>
-            <a:r>
-              <a:rPr lang="en-US" sz="1400">
+                <a:solidFill>
+                  <a:srgbClr val="0000FF"/>
+                </a:solidFill>
+                <a:latin typeface="Calibri"/>
+              </a:rPr>
+              <a:t> </a:t>
+            </a:r>
+            <a:r>
+              <a:rPr lang="en-US" sz="1400">
+                <a:solidFill>
+                  <a:srgbClr val="0000FF"/>
+                </a:solidFill>
                 <a:latin typeface="Calibri"/>
               </a:rPr>
               <a:t>A record can't hold both. PowerPoint documents don't have one overall container record. Instead, there are a number of different container records to be found at the top level.</a:t>
             </a:r>
             <a:r>
               <a:rPr lang="en-US" sz="1400">
-                <a:latin typeface="Calibri"/>
-              </a:rPr>
-              <a:t> </a:t>
-            </a:r>
-            <a:r>
-              <a:rPr lang="en-US" sz="1400">
+                <a:solidFill>
+                  <a:srgbClr val="0000FF"/>
+                </a:solidFill>
+                <a:latin typeface="Calibri"/>
+              </a:rPr>
+              <a:t> </a:t>
+            </a:r>
+            <a:r>
+              <a:rPr lang="en-US" sz="1400">
+                <a:solidFill>
+                  <a:srgbClr val="0000FF"/>
+                </a:solidFill>
                 <a:latin typeface="Calibri"/>
               </a:rPr>
               <a:t>Any numbers or strings stored in the records are always stored in Little Endian format (least important bytes first). This is the case no matter what platform the file was written on - be that a Little Endian or a Big Endian system. </a:t>
             </a:r>
             <a:r>
               <a:rPr lang="en-US" sz="1400">
-                <a:latin typeface="Calibri"/>
-              </a:rPr>
-              <a:t> </a:t>
-            </a:r>
-            <a:r>
-              <a:rPr lang="en-US" sz="1400">
+                <a:solidFill>
+                  <a:srgbClr val="0000FF"/>
+                </a:solidFill>
+                <a:latin typeface="Calibri"/>
+              </a:rPr>
+              <a:t> </a:t>
+            </a:r>
+            <a:r>
+              <a:rPr lang="en-US" sz="1400">
+                <a:solidFill>
+                  <a:srgbClr val="0000FF"/>
+                </a:solidFill>
                 <a:latin typeface="Calibri"/>
               </a:rPr>
               <a:t>PowerPoint may have Escher (DDF) records embedded in it. These are always held as the children of a PPDrawing record (record type 1036). Escher records have the same format as PowerPoint records.</a:t>
             </a:r>
             <a:r>
               <a:rPr lang="en-US" sz="1400">
-                <a:latin typeface="Calibri"/>
-              </a:rPr>
-              <a:t> </a:t>
-            </a:r>
-            <a:r>
-              <a:rPr lang="en-US" sz="1400">
+                <a:solidFill>
+                  <a:srgbClr val="0000FF"/>
+                </a:solidFill>
+                <a:latin typeface="Calibri"/>
+              </a:rPr>
+              <a:t> </a:t>
+            </a:r>
+            <a:r>
+              <a:rPr lang="en-US" sz="1400">
+                <a:solidFill>
+                  <a:srgbClr val="0000FF"/>
+                </a:solidFill>
                 <a:latin typeface="Calibri"/>
               </a:rPr>
               <a:t>Hello mate! Hello mate! Hello mate! Hello mate! Hello mate! Hello mate! Hello mate! Hello mate! Hello mate! This is bold and underscore and both and not true false PowerPoint documents are made up of a tree of records. </a:t>
             </a:r>
             <a:r>
               <a:rPr lang="en-US" sz="1400">
-                <a:latin typeface="Calibri"/>
-              </a:rPr>
-              <a:t> </a:t>
-            </a:r>
-            <a:r>
-              <a:rPr lang="en-US" sz="1400">
+                <a:solidFill>
+                  <a:srgbClr val="0000FF"/>
+                </a:solidFill>
+                <a:latin typeface="Calibri"/>
+              </a:rPr>
+              <a:t> </a:t>
+            </a:r>
+            <a:r>
+              <a:rPr lang="en-US" sz="1400">
+                <a:solidFill>
+                  <a:srgbClr val="0000FF"/>
+                </a:solidFill>
                 <a:latin typeface="Calibri"/>
               </a:rPr>
               <a:t>A record may contain either other records (in which case it is a Container), or data (in which case it's an Atom). A record can't hold both. PowerPoint documents don't have one overall container record. Instead, there are a number of different container records to be found at the top level. Any numbers or strings stored in the records are always stored in Little Endian format (least important bytes first). </a:t>
             </a:r>
             <a:r>
               <a:rPr lang="en-US" sz="1400">
-                <a:latin typeface="Calibri"/>
-              </a:rPr>
-              <a:t> </a:t>
-            </a:r>
-            <a:r>
-              <a:rPr lang="en-US" sz="1400">
-                <a:latin typeface="Calibri"/>
-              </a:rPr>
-              <a:t>This is the case no matter what platform the file was written on - be that a Little Endian or a Big Endian system. PowerPoint may have Escher (DDF) records embedded in it. These are always held as the children of a PPDrawing record (record type 1036). Escher records have the same format as PowerPoint records. Hello mate! Hello mate! Hello mate! Hello mate! Hello mate! Hello mate! Hello mate! Hello mate! Hello mate! This is bold and underscore and both and not true false PowerPoint documents are made up of a tree of records.</a:t>
-            </a:r>
-            <a:r>
-              <a:rPr lang="en-US" sz="1400">
-                <a:latin typeface="Calibri"/>
-              </a:rPr>
-              <a:t> </a:t>
-            </a:r>
-            <a:r>
-              <a:rPr lang="en-US" sz="1400">
-                <a:latin typeface="Calibri"/>
-              </a:rPr>
-              <a:t>A record may contain either other records (in which case it is a Container), or data (in which case it's an Atom). A record can't hold both. PowerPoint documents don't have one overall container record</a:t>
-            </a:r>
-            <a:r>
-              <a:rPr lang="en-US" sz="1400">
-                <a:latin typeface="Calibri"/>
-              </a:rPr>
-              <a:t> </a:t>
-            </a:r>
-            <a:r>
-              <a:rPr lang="en-US" sz="1400">
-                <a:latin typeface="Calibri"/>
-              </a:rPr>
-              <a:t> </a:t>
-            </a:r>
-          </a:p>
-          <a:p>
-            <a:r>
-              <a:rPr lang="en-US" sz="1400">
-                <a:latin typeface="Calibri"/>
-              </a:rPr>
-              <a:t> </a:t>
-            </a:r>
-            <a:r>
-              <a:rPr lang="en-US" sz="1400">
-                <a:latin typeface="Calibri"/>
-              </a:rPr>
-              <a:t>PowerPoint documents are made up of a tree of records. A record may contain either other records (in which case it is a Container), or data (in which case it's an Atom). </a:t>
-            </a:r>
-            <a:r>
-              <a:rPr lang="en-US" sz="1400">
+                <a:solidFill>
+                  <a:srgbClr val="0000FF"/>
+                </a:solidFill>
                 <a:latin typeface="Calibri"/>
               </a:rPr>
               <a:t> </a:t>
@@ -4197,7 +4388,7 @@
               <a:rPr lang="en-US" sz="1400">
                 <a:latin typeface="Calibri"/>
               </a:rPr>
-              <a:t>Sun Apr 12 19:42:53 MSK 2020</a:t>
+              <a:t>Mon Apr 13 14:58:13 MSK 2020</a:t>
             </a:r>
             <a:endParaRPr lang="en-US" sz="1100"/>
           </a:p>
@@ -4211,7 +4402,7 @@
         </p:nvSpPr>
         <p:spPr>
           <a:xfrm>
-            <a:off x="254000" y="1155700"/>
+            <a:off x="254000" y="1244600"/>
             <a:ext cx="15748000" cy="215900"/>
           </a:xfrm>
           <a:prstGeom prst="rect">
@@ -4247,7 +4438,7 @@
         </p:nvSpPr>
         <p:spPr>
           <a:xfrm>
-            <a:off x="254000" y="1422400"/>
+            <a:off x="254000" y="1562100"/>
             <a:ext cx="15748000" cy="12700"/>
           </a:xfrm>
           <a:prstGeom prst="line">
@@ -4353,8 +4544,8 @@
         </p:nvSpPr>
         <p:spPr>
           <a:xfrm>
-            <a:off x="254000" y="1409700"/>
-            <a:ext cx="15748000" cy="7035800"/>
+            <a:off x="254000" y="1562100"/>
+            <a:ext cx="15748000" cy="6375400"/>
           </a:xfrm>
           <a:prstGeom prst="rect">
             <a:avLst/>
@@ -4373,66 +4564,6 @@
             </a:r>
             <a:r>
               <a:rPr lang="en-US" sz="1400">
-                <a:latin typeface="Calibri"/>
-              </a:rPr>
-              <a:t>A record can't hold both. PowerPoint documents don't have one overall container record. Instead, there are a number of different container records to be found at the top level.</a:t>
-            </a:r>
-            <a:r>
-              <a:rPr lang="en-US" sz="1400">
-                <a:latin typeface="Calibri"/>
-              </a:rPr>
-              <a:t> </a:t>
-            </a:r>
-            <a:r>
-              <a:rPr lang="en-US" sz="1400">
-                <a:latin typeface="Calibri"/>
-              </a:rPr>
-              <a:t>Any numbers or strings stored in the records are always stored in Little Endian format (least important bytes first). This is the case no matter what platform the file was written on - be that a Little Endian or a Big Endian system. </a:t>
-            </a:r>
-            <a:r>
-              <a:rPr lang="en-US" sz="1400">
-                <a:latin typeface="Calibri"/>
-              </a:rPr>
-              <a:t> </a:t>
-            </a:r>
-            <a:r>
-              <a:rPr lang="en-US" sz="1400">
-                <a:latin typeface="Calibri"/>
-              </a:rPr>
-              <a:t>PowerPoint may have Escher (DDF) records embedded in it. These are always held as the children of a PPDrawing record (record type 1036). Escher records have the same format as PowerPoint records.</a:t>
-            </a:r>
-            <a:r>
-              <a:rPr lang="en-US" sz="1400">
-                <a:latin typeface="Calibri"/>
-              </a:rPr>
-              <a:t> </a:t>
-            </a:r>
-            <a:r>
-              <a:rPr lang="en-US" sz="1400">
-                <a:latin typeface="Calibri"/>
-              </a:rPr>
-              <a:t>Hello mate! Hello mate! Hello mate! Hello mate! Hello mate! Hello mate! Hello mate! Hello mate! Hello mate! This is bold and underscore and both and not true false PowerPoint documents are made up of a tree of records. </a:t>
-            </a:r>
-            <a:r>
-              <a:rPr lang="en-US" sz="1400">
-                <a:latin typeface="Calibri"/>
-              </a:rPr>
-              <a:t> </a:t>
-            </a:r>
-            <a:r>
-              <a:rPr lang="en-US" sz="1400">
-                <a:latin typeface="Calibri"/>
-              </a:rPr>
-              <a:t>A record may contain either other records (in which case it is a Container), or data (in which case it's an Atom). A record can't hold both. PowerPoint documents don't have one overall container record. Instead, there are a number of different container records to be found at the top level. Any numbers or strings stored in the records are always stored in Little Endian format (least important bytes first). </a:t>
-            </a:r>
-            <a:r>
-              <a:rPr lang="en-US" sz="1400">
-                <a:latin typeface="Calibri"/>
-              </a:rPr>
-              <a:t> </a:t>
-            </a:r>
-            <a:r>
-              <a:rPr lang="en-US" sz="1400">
                 <a:solidFill>
                   <a:srgbClr val="18CB0C"/>
                 </a:solidFill>
@@ -4442,18 +4573,27 @@
             </a:r>
             <a:r>
               <a:rPr lang="en-US" sz="1400">
-                <a:latin typeface="Calibri"/>
-              </a:rPr>
-              <a:t> </a:t>
-            </a:r>
-            <a:r>
-              <a:rPr lang="en-US" sz="1400">
+                <a:solidFill>
+                  <a:srgbClr val="0000FF"/>
+                </a:solidFill>
+                <a:latin typeface="Calibri"/>
+              </a:rPr>
+              <a:t> </a:t>
+            </a:r>
+            <a:r>
+              <a:rPr lang="en-US" sz="1400">
+                <a:solidFill>
+                  <a:srgbClr val="0000FF"/>
+                </a:solidFill>
                 <a:latin typeface="Calibri"/>
               </a:rPr>
               <a:t>A record may contain either other records (in which case it is a Container), or data (in which case it's an Atom). A record can't hold both. PowerPoint documents don't have one overall container record</a:t>
             </a:r>
             <a:r>
               <a:rPr lang="en-US" sz="1400">
+                <a:solidFill>
+                  <a:srgbClr val="0000FF"/>
+                </a:solidFill>
                 <a:latin typeface="Calibri"/>
               </a:rPr>
               <a:t> </a:t>
@@ -4879,278 +5019,6 @@
               <a:buFont typeface="Arial"/>
               <a:buChar char="•"/>
             </a:pPr>
-          </a:p>
-        </p:txBody>
-      </p:sp>
-    </p:spTree>
-  </p:cSld>
-  <p:clrMapOvr>
-    <a:masterClrMapping/>
-  </p:clrMapOvr>
-</p:sld>
-</file>
-
-<file path=ppt/slides/slide3.xml><?xml version="1.0" encoding="utf-8"?>
-<p:sld xmlns:p="http://schemas.openxmlformats.org/presentationml/2006/main" xmlns:a="http://schemas.openxmlformats.org/drawingml/2006/main">
-  <p:cSld>
-    <p:spTree>
-      <p:nvGrpSpPr>
-        <p:cNvPr id="1" name=""/>
-        <p:cNvGrpSpPr/>
-        <p:nvPr/>
-      </p:nvGrpSpPr>
-      <p:grpSpPr>
-        <a:xfrm>
-          <a:off x="0" y="0"/>
-          <a:ext cx="0" cy="0"/>
-          <a:chOff x="0" y="0"/>
-          <a:chExt cx="0" cy="0"/>
-        </a:xfrm>
-      </p:grpSpPr>
-      <p:sp>
-        <p:nvSpPr>
-          <p:cNvPr name="TextBox 2" id="2"/>
-          <p:cNvSpPr txBox="true"/>
-          <p:nvPr/>
-        </p:nvSpPr>
-        <p:spPr>
-          <a:xfrm>
-            <a:off x="254000" y="254000"/>
-            <a:ext cx="6350000" cy="762000"/>
-          </a:xfrm>
-          <a:prstGeom prst="rect">
-            <a:avLst/>
-          </a:prstGeom>
-        </p:spPr>
-        <p:txBody>
-          <a:bodyPr anchor="t" rtlCol="false"/>
-          <a:lstStyle/>
-          <a:p>
-            <a:pPr algn="l">
-              <a:defRPr/>
-            </a:pPr>
-            <a:r>
-              <a:rPr lang="ru-RU"/>
-              <a:t/>
-            </a:r>
-            <a:r>
-              <a:rPr lang="en-US" sz="1400" b="true">
-                <a:latin typeface="Calibri"/>
-              </a:rPr>
-              <a:t>Project name: </a:t>
-            </a:r>
-            <a:r>
-              <a:rPr lang="en-US" sz="1400">
-                <a:latin typeface="Calibri"/>
-              </a:rPr>
-              <a:t>Project Grape</a:t>
-            </a:r>
-            <a:br>
-              <a:rPr lang="en-US" sz="1400">
-                <a:latin typeface="Calibri"/>
-              </a:rPr>
-            </a:br>
-            <a:r>
-              <a:rPr lang="en-US" sz="1400" b="true">
-                <a:latin typeface="Calibri"/>
-              </a:rPr>
-              <a:t>Project manager: </a:t>
-            </a:r>
-            <a:r>
-              <a:rPr lang="en-US" sz="1400">
-                <a:latin typeface="Calibri"/>
-              </a:rPr>
-              <a:t>IKSANOV Aleksandr</a:t>
-            </a:r>
-            <a:br>
-              <a:rPr lang="en-US" sz="1400">
-                <a:latin typeface="Calibri"/>
-              </a:rPr>
-            </a:br>
-            <a:r>
-              <a:rPr lang="en-US" sz="1400" b="true">
-                <a:latin typeface="Calibri"/>
-              </a:rPr>
-              <a:t>Last Updated: </a:t>
-            </a:r>
-            <a:r>
-              <a:rPr lang="en-US" sz="1400">
-                <a:latin typeface="Calibri"/>
-              </a:rPr>
-              <a:t>Sun Apr 12 19:42:53 MSK 2020</a:t>
-            </a:r>
-            <a:endParaRPr lang="en-US" sz="1100"/>
-          </a:p>
-        </p:txBody>
-      </p:sp>
-      <p:sp>
-        <p:nvSpPr>
-          <p:cNvPr name="TextBox 3" id="3"/>
-          <p:cNvSpPr txBox="true"/>
-          <p:nvPr/>
-        </p:nvSpPr>
-        <p:spPr>
-          <a:xfrm>
-            <a:off x="254000" y="1155700"/>
-            <a:ext cx="15748000" cy="215900"/>
-          </a:xfrm>
-          <a:prstGeom prst="rect">
-            <a:avLst/>
-          </a:prstGeom>
-        </p:spPr>
-        <p:txBody>
-          <a:bodyPr anchor="t" rtlCol="false"/>
-          <a:lstStyle/>
-          <a:p>
-            <a:pPr algn="l">
-              <a:defRPr/>
-            </a:pPr>
-            <a:r>
-              <a:rPr lang="ru-RU"/>
-              <a:t/>
-            </a:r>
-            <a:r>
-              <a:rPr lang="en-US" sz="1400" b="true">
-                <a:latin typeface="Calibri"/>
-              </a:rPr>
-              <a:t>Executive Status Summary</a:t>
-            </a:r>
-            <a:endParaRPr lang="en-US" sz="1100"/>
-          </a:p>
-        </p:txBody>
-      </p:sp>
-      <p:sp>
-        <p:nvSpPr>
-          <p:cNvPr name="AutoShape 4" id="4"/>
-          <p:cNvSpPr/>
-          <p:nvPr/>
-        </p:nvSpPr>
-        <p:spPr>
-          <a:xfrm>
-            <a:off x="254000" y="1422400"/>
-            <a:ext cx="15748000" cy="12700"/>
-          </a:xfrm>
-          <a:prstGeom prst="line">
-            <a:avLst/>
-          </a:prstGeom>
-          <a:ln>
-            <a:solidFill>
-              <a:srgbClr val="000000"/>
-            </a:solidFill>
-          </a:ln>
-        </p:spPr>
-      </p:sp>
-      <p:sp>
-        <p:nvSpPr>
-          <p:cNvPr name="TextBox 5" id="5"/>
-          <p:cNvSpPr txBox="true"/>
-          <p:nvPr/>
-        </p:nvSpPr>
-        <p:spPr>
-          <a:xfrm>
-            <a:off x="5905500" y="8191500"/>
-            <a:ext cx="4445000" cy="635000"/>
-          </a:xfrm>
-          <a:prstGeom prst="rect">
-            <a:avLst/>
-          </a:prstGeom>
-        </p:spPr>
-        <p:txBody>
-          <a:bodyPr anchor="t" rtlCol="false"/>
-          <a:lstStyle/>
-          <a:p>
-            <a:pPr algn="ctr">
-              <a:defRPr/>
-            </a:pPr>
-            <a:r>
-              <a:rPr lang="ru-RU"/>
-              <a:t/>
-            </a:r>
-            <a:r>
-              <a:rPr lang="en-US" sz="1200" i="true">
-                <a:solidFill>
-                  <a:srgbClr val="FF0000"/>
-                </a:solidFill>
-                <a:latin typeface="Calibri"/>
-              </a:rPr>
-              <a:t>Alcatel-Lucent Enterprise - Confidential</a:t>
-            </a:r>
-            <a:br>
-              <a:rPr lang="en-US" sz="1200" i="true">
-                <a:solidFill>
-                  <a:srgbClr val="FF0000"/>
-                </a:solidFill>
-                <a:latin typeface="Calibri"/>
-              </a:rPr>
-            </a:br>
-            <a:r>
-              <a:rPr lang="en-US" sz="1200" b="true">
-                <a:latin typeface="Calibri"/>
-              </a:rPr>
-              <a:t>Solely for authorized persons having a need to know</a:t>
-            </a:r>
-            <a:br>
-              <a:rPr lang="en-US" sz="1200" b="true">
-                <a:latin typeface="Calibri"/>
-              </a:rPr>
-            </a:br>
-            <a:r>
-              <a:rPr lang="en-US" sz="1200">
-                <a:latin typeface="Calibri"/>
-              </a:rPr>
-              <a:t>Proprietary - Use pursuant to Company Instruction</a:t>
-            </a:r>
-            <a:endParaRPr lang="en-US" sz="1100"/>
-          </a:p>
-        </p:txBody>
-      </p:sp>
-      <p:sp>
-        <p:nvSpPr>
-          <p:cNvPr name="AutoShape 6" id="6"/>
-          <p:cNvSpPr/>
-          <p:nvPr/>
-        </p:nvSpPr>
-        <p:spPr>
-          <a:xfrm>
-            <a:off x="254000" y="8064500"/>
-            <a:ext cx="15748000" cy="12700"/>
-          </a:xfrm>
-          <a:prstGeom prst="line">
-            <a:avLst/>
-          </a:prstGeom>
-          <a:ln>
-            <a:solidFill>
-              <a:srgbClr val="000000"/>
-            </a:solidFill>
-          </a:ln>
-        </p:spPr>
-      </p:sp>
-      <p:sp>
-        <p:nvSpPr>
-          <p:cNvPr name="TextBox 7" id="7"/>
-          <p:cNvSpPr txBox="true"/>
-          <p:nvPr/>
-        </p:nvSpPr>
-        <p:spPr>
-          <a:xfrm>
-            <a:off x="254000" y="1409700"/>
-            <a:ext cx="15748000" cy="7035800"/>
-          </a:xfrm>
-          <a:prstGeom prst="rect">
-            <a:avLst/>
-          </a:prstGeom>
-        </p:spPr>
-        <p:txBody>
-          <a:bodyPr anchor="t" rtlCol="false"/>
-          <a:lstStyle/>
-          <a:p>
-            <a:pPr algn="l">
-              <a:defRPr/>
-            </a:pPr>
-            <a:r>
-              <a:rPr lang="ru-RU"/>
-              <a:t/>
-            </a:r>
             <a:r>
               <a:rPr lang="en-US" sz="1400">
                 <a:latin typeface="Calibri"/>
@@ -5163,7 +5031,6 @@
               </a:rPr>
               <a:t> </a:t>
             </a:r>
-            <a:endParaRPr lang="en-US" sz="1100"/>
           </a:p>
           <a:p>
             <a:pPr>

</xml_diff>

<commit_message>
fixed problem with occupationHeight value + refactor
</commit_message>
<xml_diff>
--- a/html-to-ppt/TextFormat.pptx
+++ b/html-to-ppt/TextFormat.pptx
@@ -7,6 +7,7 @@
   <p:sldIdLst>
     <p:sldId id="256" r:id="rId6"/>
     <p:sldId id="257" r:id="rId7"/>
+    <p:sldId id="258" r:id="rId8"/>
   </p:sldIdLst>
   <p:sldSz cx="16256000" cy="9144000"/>
   <p:notesSz cx="6858000" cy="9144000"/>
@@ -3130,7 +3131,7 @@
               <a:rPr lang="en-US" sz="1400">
                 <a:latin typeface="Calibri"/>
               </a:rPr>
-              <a:t>Mon Apr 13 14:58:13 MSK 2020</a:t>
+              <a:t>Mon Apr 13 16:12:57 MSK 2020</a:t>
             </a:r>
             <a:endParaRPr lang="en-US" sz="1100"/>
           </a:p>
@@ -4272,24 +4273,6 @@
               </a:rPr>
               <a:t> </a:t>
             </a:r>
-            <a:r>
-              <a:rPr lang="en-US" sz="1400">
-                <a:solidFill>
-                  <a:srgbClr val="0000FF"/>
-                </a:solidFill>
-                <a:latin typeface="Calibri"/>
-              </a:rPr>
-              <a:t>A record may contain either other records (in which case it is a Container), or data (in which case it's an Atom). A record can't hold both. PowerPoint documents don't have one overall container record. Instead, there are a number of different container records to be found at the top level. Any numbers or strings stored in the records are always stored in Little Endian format (least important bytes first). </a:t>
-            </a:r>
-            <a:r>
-              <a:rPr lang="en-US" sz="1400">
-                <a:solidFill>
-                  <a:srgbClr val="0000FF"/>
-                </a:solidFill>
-                <a:latin typeface="Calibri"/>
-              </a:rPr>
-              <a:t> </a:t>
-            </a:r>
           </a:p>
         </p:txBody>
       </p:sp>
@@ -4388,7 +4371,7 @@
               <a:rPr lang="en-US" sz="1400">
                 <a:latin typeface="Calibri"/>
               </a:rPr>
-              <a:t>Mon Apr 13 14:58:13 MSK 2020</a:t>
+              <a:t>Mon Apr 13 16:12:57 MSK 2020</a:t>
             </a:r>
             <a:endParaRPr lang="en-US" sz="1100"/>
           </a:p>
@@ -4565,6 +4548,24 @@
             <a:r>
               <a:rPr lang="en-US" sz="1400">
                 <a:solidFill>
+                  <a:srgbClr val="0000FF"/>
+                </a:solidFill>
+                <a:latin typeface="Calibri"/>
+              </a:rPr>
+              <a:t>A record may contain either other records (in which case it is a Container), or data (in which case it's an Atom). A record can't hold both. PowerPoint documents don't have one overall container record. Instead, there are a number of different container records to be found at the top level. Any numbers or strings stored in the records are always stored in Little Endian format (least important bytes first). </a:t>
+            </a:r>
+            <a:r>
+              <a:rPr lang="en-US" sz="1400">
+                <a:solidFill>
+                  <a:srgbClr val="0000FF"/>
+                </a:solidFill>
+                <a:latin typeface="Calibri"/>
+              </a:rPr>
+              <a:t> </a:t>
+            </a:r>
+            <a:r>
+              <a:rPr lang="en-US" sz="1400">
+                <a:solidFill>
                   <a:srgbClr val="18CB0C"/>
                 </a:solidFill>
                 <a:latin typeface="Calibri"/>
@@ -5067,6 +5068,278 @@
               <a:buFont typeface="Arial"/>
               <a:buChar char="•"/>
             </a:pPr>
+          </a:p>
+        </p:txBody>
+      </p:sp>
+    </p:spTree>
+  </p:cSld>
+  <p:clrMapOvr>
+    <a:masterClrMapping/>
+  </p:clrMapOvr>
+</p:sld>
+</file>
+
+<file path=ppt/slides/slide3.xml><?xml version="1.0" encoding="utf-8"?>
+<p:sld xmlns:p="http://schemas.openxmlformats.org/presentationml/2006/main" xmlns:a="http://schemas.openxmlformats.org/drawingml/2006/main">
+  <p:cSld>
+    <p:spTree>
+      <p:nvGrpSpPr>
+        <p:cNvPr id="1" name=""/>
+        <p:cNvGrpSpPr/>
+        <p:nvPr/>
+      </p:nvGrpSpPr>
+      <p:grpSpPr>
+        <a:xfrm>
+          <a:off x="0" y="0"/>
+          <a:ext cx="0" cy="0"/>
+          <a:chOff x="0" y="0"/>
+          <a:chExt cx="0" cy="0"/>
+        </a:xfrm>
+      </p:grpSpPr>
+      <p:sp>
+        <p:nvSpPr>
+          <p:cNvPr name="TextBox 2" id="2"/>
+          <p:cNvSpPr txBox="true"/>
+          <p:nvPr/>
+        </p:nvSpPr>
+        <p:spPr>
+          <a:xfrm>
+            <a:off x="254000" y="254000"/>
+            <a:ext cx="6350000" cy="762000"/>
+          </a:xfrm>
+          <a:prstGeom prst="rect">
+            <a:avLst/>
+          </a:prstGeom>
+        </p:spPr>
+        <p:txBody>
+          <a:bodyPr anchor="t" rtlCol="false"/>
+          <a:lstStyle/>
+          <a:p>
+            <a:pPr algn="l">
+              <a:defRPr/>
+            </a:pPr>
+            <a:r>
+              <a:rPr lang="ru-RU"/>
+              <a:t/>
+            </a:r>
+            <a:r>
+              <a:rPr lang="en-US" sz="1400" b="true">
+                <a:latin typeface="Calibri"/>
+              </a:rPr>
+              <a:t>Project name: </a:t>
+            </a:r>
+            <a:r>
+              <a:rPr lang="en-US" sz="1400">
+                <a:latin typeface="Calibri"/>
+              </a:rPr>
+              <a:t>Project Grape</a:t>
+            </a:r>
+            <a:br>
+              <a:rPr lang="en-US" sz="1400">
+                <a:latin typeface="Calibri"/>
+              </a:rPr>
+            </a:br>
+            <a:r>
+              <a:rPr lang="en-US" sz="1400" b="true">
+                <a:latin typeface="Calibri"/>
+              </a:rPr>
+              <a:t>Project manager: </a:t>
+            </a:r>
+            <a:r>
+              <a:rPr lang="en-US" sz="1400">
+                <a:latin typeface="Calibri"/>
+              </a:rPr>
+              <a:t>IKSANOV Aleksandr</a:t>
+            </a:r>
+            <a:br>
+              <a:rPr lang="en-US" sz="1400">
+                <a:latin typeface="Calibri"/>
+              </a:rPr>
+            </a:br>
+            <a:r>
+              <a:rPr lang="en-US" sz="1400" b="true">
+                <a:latin typeface="Calibri"/>
+              </a:rPr>
+              <a:t>Last Updated: </a:t>
+            </a:r>
+            <a:r>
+              <a:rPr lang="en-US" sz="1400">
+                <a:latin typeface="Calibri"/>
+              </a:rPr>
+              <a:t>Mon Apr 13 16:12:57 MSK 2020</a:t>
+            </a:r>
+            <a:endParaRPr lang="en-US" sz="1100"/>
+          </a:p>
+        </p:txBody>
+      </p:sp>
+      <p:sp>
+        <p:nvSpPr>
+          <p:cNvPr name="TextBox 3" id="3"/>
+          <p:cNvSpPr txBox="true"/>
+          <p:nvPr/>
+        </p:nvSpPr>
+        <p:spPr>
+          <a:xfrm>
+            <a:off x="254000" y="1244600"/>
+            <a:ext cx="15748000" cy="215900"/>
+          </a:xfrm>
+          <a:prstGeom prst="rect">
+            <a:avLst/>
+          </a:prstGeom>
+        </p:spPr>
+        <p:txBody>
+          <a:bodyPr anchor="t" rtlCol="false"/>
+          <a:lstStyle/>
+          <a:p>
+            <a:pPr algn="l">
+              <a:defRPr/>
+            </a:pPr>
+            <a:r>
+              <a:rPr lang="ru-RU"/>
+              <a:t/>
+            </a:r>
+            <a:r>
+              <a:rPr lang="en-US" sz="1400" b="true">
+                <a:latin typeface="Calibri"/>
+              </a:rPr>
+              <a:t>Executive Status Summary</a:t>
+            </a:r>
+            <a:endParaRPr lang="en-US" sz="1100"/>
+          </a:p>
+        </p:txBody>
+      </p:sp>
+      <p:sp>
+        <p:nvSpPr>
+          <p:cNvPr name="AutoShape 4" id="4"/>
+          <p:cNvSpPr/>
+          <p:nvPr/>
+        </p:nvSpPr>
+        <p:spPr>
+          <a:xfrm>
+            <a:off x="254000" y="1562100"/>
+            <a:ext cx="15748000" cy="12700"/>
+          </a:xfrm>
+          <a:prstGeom prst="line">
+            <a:avLst/>
+          </a:prstGeom>
+          <a:ln>
+            <a:solidFill>
+              <a:srgbClr val="000000"/>
+            </a:solidFill>
+          </a:ln>
+        </p:spPr>
+      </p:sp>
+      <p:sp>
+        <p:nvSpPr>
+          <p:cNvPr name="TextBox 5" id="5"/>
+          <p:cNvSpPr txBox="true"/>
+          <p:nvPr/>
+        </p:nvSpPr>
+        <p:spPr>
+          <a:xfrm>
+            <a:off x="5905500" y="8191500"/>
+            <a:ext cx="4445000" cy="635000"/>
+          </a:xfrm>
+          <a:prstGeom prst="rect">
+            <a:avLst/>
+          </a:prstGeom>
+        </p:spPr>
+        <p:txBody>
+          <a:bodyPr anchor="t" rtlCol="false"/>
+          <a:lstStyle/>
+          <a:p>
+            <a:pPr algn="ctr">
+              <a:defRPr/>
+            </a:pPr>
+            <a:r>
+              <a:rPr lang="ru-RU"/>
+              <a:t/>
+            </a:r>
+            <a:r>
+              <a:rPr lang="en-US" sz="1200" i="true">
+                <a:solidFill>
+                  <a:srgbClr val="FF0000"/>
+                </a:solidFill>
+                <a:latin typeface="Calibri"/>
+              </a:rPr>
+              <a:t>Alcatel-Lucent Enterprise - Confidential</a:t>
+            </a:r>
+            <a:br>
+              <a:rPr lang="en-US" sz="1200" i="true">
+                <a:solidFill>
+                  <a:srgbClr val="FF0000"/>
+                </a:solidFill>
+                <a:latin typeface="Calibri"/>
+              </a:rPr>
+            </a:br>
+            <a:r>
+              <a:rPr lang="en-US" sz="1200" b="true">
+                <a:latin typeface="Calibri"/>
+              </a:rPr>
+              <a:t>Solely for authorized persons having a need to know</a:t>
+            </a:r>
+            <a:br>
+              <a:rPr lang="en-US" sz="1200" b="true">
+                <a:latin typeface="Calibri"/>
+              </a:rPr>
+            </a:br>
+            <a:r>
+              <a:rPr lang="en-US" sz="1200">
+                <a:latin typeface="Calibri"/>
+              </a:rPr>
+              <a:t>Proprietary - Use pursuant to Company Instruction</a:t>
+            </a:r>
+            <a:endParaRPr lang="en-US" sz="1100"/>
+          </a:p>
+        </p:txBody>
+      </p:sp>
+      <p:sp>
+        <p:nvSpPr>
+          <p:cNvPr name="AutoShape 6" id="6"/>
+          <p:cNvSpPr/>
+          <p:nvPr/>
+        </p:nvSpPr>
+        <p:spPr>
+          <a:xfrm>
+            <a:off x="254000" y="8064500"/>
+            <a:ext cx="15748000" cy="12700"/>
+          </a:xfrm>
+          <a:prstGeom prst="line">
+            <a:avLst/>
+          </a:prstGeom>
+          <a:ln>
+            <a:solidFill>
+              <a:srgbClr val="000000"/>
+            </a:solidFill>
+          </a:ln>
+        </p:spPr>
+      </p:sp>
+      <p:sp>
+        <p:nvSpPr>
+          <p:cNvPr name="TextBox 7" id="7"/>
+          <p:cNvSpPr txBox="true"/>
+          <p:nvPr/>
+        </p:nvSpPr>
+        <p:spPr>
+          <a:xfrm>
+            <a:off x="254000" y="1562100"/>
+            <a:ext cx="15748000" cy="6375400"/>
+          </a:xfrm>
+          <a:prstGeom prst="rect">
+            <a:avLst/>
+          </a:prstGeom>
+        </p:spPr>
+        <p:txBody>
+          <a:bodyPr anchor="t" rtlCol="false"/>
+          <a:lstStyle/>
+          <a:p>
+            <a:pPr algn="l">
+              <a:defRPr/>
+            </a:pPr>
+            <a:r>
+              <a:rPr lang="ru-RU"/>
+              <a:t/>
+            </a:r>
             <a:r>
               <a:rPr lang="en-US" sz="1400">
                 <a:latin typeface="Calibri"/>
@@ -5079,6 +5352,7 @@
               </a:rPr>
               <a:t> </a:t>
             </a:r>
+            <a:endParaRPr lang="en-US" sz="1100"/>
           </a:p>
           <a:p>
             <a:pPr>

</xml_diff>